<commit_message>
add how-it-works diagrams and why-use slides
</commit_message>
<xml_diff>
--- a/slides/HTMapWorkshop.pptx
+++ b/slides/HTMapWorkshop.pptx
@@ -6,34 +6,38 @@
     <p:sldMasterId id="2147483663" r:id="rId2"/>
   </p:sldMasterIdLst>
   <p:notesMasterIdLst>
-    <p:notesMasterId r:id="rId6"/>
+    <p:notesMasterId r:id="rId10"/>
   </p:notesMasterIdLst>
   <p:sldIdLst>
     <p:sldId id="256" r:id="rId3"/>
     <p:sldId id="258" r:id="rId4"/>
-    <p:sldId id="257" r:id="rId5"/>
+    <p:sldId id="259" r:id="rId5"/>
+    <p:sldId id="261" r:id="rId6"/>
+    <p:sldId id="262" r:id="rId7"/>
+    <p:sldId id="264" r:id="rId8"/>
+    <p:sldId id="257" r:id="rId9"/>
   </p:sldIdLst>
   <p:sldSz cx="12192000" cy="6858000"/>
   <p:notesSz cx="6858000" cy="9144000"/>
   <p:embeddedFontLst>
     <p:embeddedFont>
       <p:font typeface="Calibri" panose="020F0502020204030204" pitchFamily="34" charset="0"/>
-      <p:regular r:id="rId7"/>
-      <p:bold r:id="rId8"/>
-      <p:italic r:id="rId9"/>
-      <p:boldItalic r:id="rId10"/>
+      <p:regular r:id="rId11"/>
+      <p:bold r:id="rId12"/>
+      <p:italic r:id="rId13"/>
+      <p:boldItalic r:id="rId14"/>
     </p:embeddedFont>
     <p:embeddedFont>
       <p:font typeface="Source Code Pro" panose="020B0509030403020204" pitchFamily="49" charset="0"/>
-      <p:regular r:id="rId11"/>
-      <p:bold r:id="rId12"/>
+      <p:regular r:id="rId15"/>
+      <p:bold r:id="rId16"/>
     </p:embeddedFont>
     <p:embeddedFont>
       <p:font typeface="Source Sans Pro" panose="020B0503030403020204" pitchFamily="34" charset="0"/>
-      <p:regular r:id="rId13"/>
-      <p:bold r:id="rId14"/>
-      <p:italic r:id="rId15"/>
-      <p:boldItalic r:id="rId16"/>
+      <p:regular r:id="rId17"/>
+      <p:bold r:id="rId18"/>
+      <p:italic r:id="rId19"/>
+      <p:boldItalic r:id="rId20"/>
     </p:embeddedFont>
   </p:embeddedFontLst>
   <p:defaultTextStyle>
@@ -138,6 +142,10 @@
           <p14:sldIdLst>
             <p14:sldId id="256"/>
             <p14:sldId id="258"/>
+            <p14:sldId id="259"/>
+            <p14:sldId id="261"/>
+            <p14:sldId id="262"/>
+            <p14:sldId id="264"/>
           </p14:sldIdLst>
         </p14:section>
         <p14:section name="Conclusion" id="{023BC29C-4F1E-4B60-97CA-DF59EF9FF856}">
@@ -5154,7 +5162,7 @@
           <p:cNvPr id="2" name="Title 1">
             <a:extLst>
               <a:ext uri="{FF2B5EF4-FFF2-40B4-BE49-F238E27FC236}">
-                <a16:creationId xmlns:a16="http://schemas.microsoft.com/office/drawing/2014/main" id="{AF87598A-1002-492C-9FC6-D037361BB257}"/>
+                <a16:creationId xmlns:a16="http://schemas.microsoft.com/office/drawing/2014/main" id="{D23803D1-28BF-48B0-A3D2-40049EE4728A}"/>
               </a:ext>
             </a:extLst>
           </p:cNvPr>
@@ -5172,17 +5180,1817 @@
           <a:p>
             <a:r>
               <a:rPr lang="en-US" dirty="0"/>
-              <a:t>Further Resources</a:t>
-            </a:r>
-          </a:p>
-        </p:txBody>
-      </p:sp>
-      <p:sp>
-        <p:nvSpPr>
-          <p:cNvPr id="3" name="TextBox 2">
-            <a:extLst>
-              <a:ext uri="{FF2B5EF4-FFF2-40B4-BE49-F238E27FC236}">
-                <a16:creationId xmlns:a16="http://schemas.microsoft.com/office/drawing/2014/main" id="{A87FC421-6AAF-4B19-B37F-9F75B12543B0}"/>
+              <a:t>What Just Happened?</a:t>
+            </a:r>
+          </a:p>
+        </p:txBody>
+      </p:sp>
+      <p:sp>
+        <p:nvSpPr>
+          <p:cNvPr id="3" name="Footer Placeholder 2">
+            <a:extLst>
+              <a:ext uri="{FF2B5EF4-FFF2-40B4-BE49-F238E27FC236}">
+                <a16:creationId xmlns:a16="http://schemas.microsoft.com/office/drawing/2014/main" id="{FCF3F4C5-3CD6-418F-8421-3A141D6DCE7F}"/>
+              </a:ext>
+            </a:extLst>
+          </p:cNvPr>
+          <p:cNvSpPr>
+            <a:spLocks noGrp="1"/>
+          </p:cNvSpPr>
+          <p:nvPr>
+            <p:ph type="ftr" sz="quarter" idx="10"/>
+          </p:nvPr>
+        </p:nvSpPr>
+        <p:spPr/>
+        <p:txBody>
+          <a:bodyPr/>
+          <a:lstStyle/>
+          <a:p>
+            <a:r>
+              <a:rPr lang="en-US"/>
+              <a:t>HTMap Workshop 2019-9-16</a:t>
+            </a:r>
+            <a:endParaRPr lang="en-US" dirty="0"/>
+          </a:p>
+        </p:txBody>
+      </p:sp>
+      <p:sp>
+        <p:nvSpPr>
+          <p:cNvPr id="4" name="Slide Number Placeholder 3">
+            <a:extLst>
+              <a:ext uri="{FF2B5EF4-FFF2-40B4-BE49-F238E27FC236}">
+                <a16:creationId xmlns:a16="http://schemas.microsoft.com/office/drawing/2014/main" id="{22D5E63F-4EBF-4719-8A3E-1D599CD42D5C}"/>
+              </a:ext>
+            </a:extLst>
+          </p:cNvPr>
+          <p:cNvSpPr>
+            <a:spLocks noGrp="1"/>
+          </p:cNvSpPr>
+          <p:nvPr>
+            <p:ph type="sldNum" sz="quarter" idx="11"/>
+          </p:nvPr>
+        </p:nvSpPr>
+        <p:spPr/>
+        <p:txBody>
+          <a:bodyPr/>
+          <a:lstStyle/>
+          <a:p>
+            <a:fld id="{65011DE2-3A5B-41D4-A661-103799ABD939}" type="slidenum">
+              <a:rPr lang="en-US" smtClean="0"/>
+              <a:t>3</a:t>
+            </a:fld>
+            <a:endParaRPr lang="en-US"/>
+          </a:p>
+        </p:txBody>
+      </p:sp>
+      <p:sp>
+        <p:nvSpPr>
+          <p:cNvPr id="6" name="Rectangle 5">
+            <a:extLst>
+              <a:ext uri="{FF2B5EF4-FFF2-40B4-BE49-F238E27FC236}">
+                <a16:creationId xmlns:a16="http://schemas.microsoft.com/office/drawing/2014/main" id="{15B535FA-2AE8-41B9-99ED-ED4ECDD2A462}"/>
+              </a:ext>
+            </a:extLst>
+          </p:cNvPr>
+          <p:cNvSpPr/>
+          <p:nvPr/>
+        </p:nvSpPr>
+        <p:spPr>
+          <a:xfrm>
+            <a:off x="609600" y="809644"/>
+            <a:ext cx="10972800" cy="2267093"/>
+          </a:xfrm>
+          <a:prstGeom prst="rect">
+            <a:avLst/>
+          </a:prstGeom>
+          <a:solidFill>
+            <a:srgbClr val="1B9E77">
+              <a:alpha val="90000"/>
+            </a:srgbClr>
+          </a:solidFill>
+          <a:ln>
+            <a:noFill/>
+          </a:ln>
+        </p:spPr>
+        <p:style>
+          <a:lnRef idx="2">
+            <a:schemeClr val="accent1">
+              <a:shade val="50000"/>
+            </a:schemeClr>
+          </a:lnRef>
+          <a:fillRef idx="1">
+            <a:schemeClr val="accent1"/>
+          </a:fillRef>
+          <a:effectRef idx="0">
+            <a:schemeClr val="accent1"/>
+          </a:effectRef>
+          <a:fontRef idx="minor">
+            <a:schemeClr val="lt1"/>
+          </a:fontRef>
+        </p:style>
+        <p:txBody>
+          <a:bodyPr rtlCol="0" anchor="t"/>
+          <a:lstStyle/>
+          <a:p>
+            <a:pPr algn="ctr"/>
+            <a:r>
+              <a:rPr lang="en-US" sz="3600" b="1" dirty="0">
+                <a:solidFill>
+                  <a:schemeClr val="bg1"/>
+                </a:solidFill>
+              </a:rPr>
+              <a:t>Python</a:t>
+            </a:r>
+          </a:p>
+        </p:txBody>
+      </p:sp>
+      <p:sp>
+        <p:nvSpPr>
+          <p:cNvPr id="13" name="Rectangle: Diagonal Corners Snipped 12">
+            <a:extLst>
+              <a:ext uri="{FF2B5EF4-FFF2-40B4-BE49-F238E27FC236}">
+                <a16:creationId xmlns:a16="http://schemas.microsoft.com/office/drawing/2014/main" id="{9C2CD00A-7E63-42FA-B1A7-6733F170EDD2}"/>
+              </a:ext>
+            </a:extLst>
+          </p:cNvPr>
+          <p:cNvSpPr/>
+          <p:nvPr/>
+        </p:nvSpPr>
+        <p:spPr>
+          <a:xfrm>
+            <a:off x="5190894" y="1538368"/>
+            <a:ext cx="1810211" cy="858981"/>
+          </a:xfrm>
+          <a:prstGeom prst="snip2DiagRect">
+            <a:avLst>
+              <a:gd name="adj1" fmla="val 0"/>
+              <a:gd name="adj2" fmla="val 40323"/>
+            </a:avLst>
+          </a:prstGeom>
+        </p:spPr>
+        <p:style>
+          <a:lnRef idx="2">
+            <a:schemeClr val="accent1">
+              <a:shade val="50000"/>
+            </a:schemeClr>
+          </a:lnRef>
+          <a:fillRef idx="1">
+            <a:schemeClr val="accent1"/>
+          </a:fillRef>
+          <a:effectRef idx="0">
+            <a:schemeClr val="accent1"/>
+          </a:effectRef>
+          <a:fontRef idx="minor">
+            <a:schemeClr val="lt1"/>
+          </a:fontRef>
+        </p:style>
+        <p:txBody>
+          <a:bodyPr rtlCol="0" anchor="ctr"/>
+          <a:lstStyle/>
+          <a:p>
+            <a:pPr algn="ctr"/>
+            <a:r>
+              <a:rPr lang="en-US" sz="2400" b="1" dirty="0"/>
+              <a:t>Function</a:t>
+            </a:r>
+            <a:endParaRPr lang="en-US" b="1" dirty="0"/>
+          </a:p>
+        </p:txBody>
+      </p:sp>
+      <p:sp>
+        <p:nvSpPr>
+          <p:cNvPr id="16" name="Flowchart: Decision 15">
+            <a:extLst>
+              <a:ext uri="{FF2B5EF4-FFF2-40B4-BE49-F238E27FC236}">
+                <a16:creationId xmlns:a16="http://schemas.microsoft.com/office/drawing/2014/main" id="{1F99FB29-0796-4F0E-AED8-F4DB677BF363}"/>
+              </a:ext>
+            </a:extLst>
+          </p:cNvPr>
+          <p:cNvSpPr/>
+          <p:nvPr/>
+        </p:nvSpPr>
+        <p:spPr>
+          <a:xfrm>
+            <a:off x="8587560" y="867559"/>
+            <a:ext cx="2907468" cy="1270000"/>
+          </a:xfrm>
+          <a:prstGeom prst="flowChartDecision">
+            <a:avLst/>
+          </a:prstGeom>
+        </p:spPr>
+        <p:style>
+          <a:lnRef idx="2">
+            <a:schemeClr val="accent1">
+              <a:shade val="50000"/>
+            </a:schemeClr>
+          </a:lnRef>
+          <a:fillRef idx="1">
+            <a:schemeClr val="accent1"/>
+          </a:fillRef>
+          <a:effectRef idx="0">
+            <a:schemeClr val="accent1"/>
+          </a:effectRef>
+          <a:fontRef idx="minor">
+            <a:schemeClr val="lt1"/>
+          </a:fontRef>
+        </p:style>
+        <p:txBody>
+          <a:bodyPr rtlCol="0" anchor="ctr"/>
+          <a:lstStyle/>
+          <a:p>
+            <a:pPr algn="ctr"/>
+            <a:r>
+              <a:rPr lang="en-US" sz="2800" b="1" dirty="0"/>
+              <a:t>Outputs</a:t>
+            </a:r>
+          </a:p>
+        </p:txBody>
+      </p:sp>
+      <p:sp>
+        <p:nvSpPr>
+          <p:cNvPr id="18" name="Flowchart: Manual Operation 17">
+            <a:extLst>
+              <a:ext uri="{FF2B5EF4-FFF2-40B4-BE49-F238E27FC236}">
+                <a16:creationId xmlns:a16="http://schemas.microsoft.com/office/drawing/2014/main" id="{DCA26AFB-D063-4DE9-AEE9-3E7279AB8FF1}"/>
+              </a:ext>
+            </a:extLst>
+          </p:cNvPr>
+          <p:cNvSpPr/>
+          <p:nvPr/>
+        </p:nvSpPr>
+        <p:spPr>
+          <a:xfrm>
+            <a:off x="762000" y="1934723"/>
+            <a:ext cx="1643361" cy="982134"/>
+          </a:xfrm>
+          <a:prstGeom prst="flowChartManualOperation">
+            <a:avLst/>
+          </a:prstGeom>
+        </p:spPr>
+        <p:style>
+          <a:lnRef idx="2">
+            <a:schemeClr val="accent1">
+              <a:shade val="50000"/>
+            </a:schemeClr>
+          </a:lnRef>
+          <a:fillRef idx="1">
+            <a:schemeClr val="accent1"/>
+          </a:fillRef>
+          <a:effectRef idx="0">
+            <a:schemeClr val="accent1"/>
+          </a:effectRef>
+          <a:fontRef idx="minor">
+            <a:schemeClr val="lt1"/>
+          </a:fontRef>
+        </p:style>
+        <p:txBody>
+          <a:bodyPr rtlCol="0" anchor="ctr"/>
+          <a:lstStyle/>
+          <a:p>
+            <a:pPr algn="ctr"/>
+            <a:r>
+              <a:rPr lang="en-US" sz="2400" b="1" dirty="0"/>
+              <a:t>Inputs</a:t>
+            </a:r>
+          </a:p>
+        </p:txBody>
+      </p:sp>
+      <p:cxnSp>
+        <p:nvCxnSpPr>
+          <p:cNvPr id="20" name="Connector: Curved 19">
+            <a:extLst>
+              <a:ext uri="{FF2B5EF4-FFF2-40B4-BE49-F238E27FC236}">
+                <a16:creationId xmlns:a16="http://schemas.microsoft.com/office/drawing/2014/main" id="{653B61F7-5048-47A5-BEF8-352C402994B2}"/>
+              </a:ext>
+            </a:extLst>
+          </p:cNvPr>
+          <p:cNvCxnSpPr>
+            <a:cxnSpLocks/>
+            <a:stCxn id="18" idx="3"/>
+            <a:endCxn id="13" idx="2"/>
+          </p:cNvCxnSpPr>
+          <p:nvPr/>
+        </p:nvCxnSpPr>
+        <p:spPr>
+          <a:xfrm flipV="1">
+            <a:off x="2241025" y="1967859"/>
+            <a:ext cx="2949869" cy="457931"/>
+          </a:xfrm>
+          <a:prstGeom prst="curvedConnector3">
+            <a:avLst>
+              <a:gd name="adj1" fmla="val 50000"/>
+            </a:avLst>
+          </a:prstGeom>
+          <a:ln w="88900">
+            <a:tailEnd type="triangle"/>
+          </a:ln>
+        </p:spPr>
+        <p:style>
+          <a:lnRef idx="1">
+            <a:schemeClr val="accent1"/>
+          </a:lnRef>
+          <a:fillRef idx="0">
+            <a:schemeClr val="accent1"/>
+          </a:fillRef>
+          <a:effectRef idx="0">
+            <a:schemeClr val="accent1"/>
+          </a:effectRef>
+          <a:fontRef idx="minor">
+            <a:schemeClr val="tx1"/>
+          </a:fontRef>
+        </p:style>
+      </p:cxnSp>
+      <p:cxnSp>
+        <p:nvCxnSpPr>
+          <p:cNvPr id="22" name="Connector: Curved 21">
+            <a:extLst>
+              <a:ext uri="{FF2B5EF4-FFF2-40B4-BE49-F238E27FC236}">
+                <a16:creationId xmlns:a16="http://schemas.microsoft.com/office/drawing/2014/main" id="{9E98CD5D-F328-4C34-862A-C1E1ED535DFC}"/>
+              </a:ext>
+            </a:extLst>
+          </p:cNvPr>
+          <p:cNvCxnSpPr>
+            <a:cxnSpLocks/>
+            <a:stCxn id="13" idx="0"/>
+            <a:endCxn id="16" idx="1"/>
+          </p:cNvCxnSpPr>
+          <p:nvPr/>
+        </p:nvCxnSpPr>
+        <p:spPr>
+          <a:xfrm flipV="1">
+            <a:off x="7001105" y="1502559"/>
+            <a:ext cx="1586455" cy="465300"/>
+          </a:xfrm>
+          <a:prstGeom prst="curvedConnector3">
+            <a:avLst>
+              <a:gd name="adj1" fmla="val 50000"/>
+            </a:avLst>
+          </a:prstGeom>
+          <a:ln w="88900">
+            <a:tailEnd type="triangle"/>
+          </a:ln>
+        </p:spPr>
+        <p:style>
+          <a:lnRef idx="1">
+            <a:schemeClr val="accent1"/>
+          </a:lnRef>
+          <a:fillRef idx="0">
+            <a:schemeClr val="accent1"/>
+          </a:fillRef>
+          <a:effectRef idx="0">
+            <a:schemeClr val="accent1"/>
+          </a:effectRef>
+          <a:fontRef idx="minor">
+            <a:schemeClr val="tx1"/>
+          </a:fontRef>
+        </p:style>
+      </p:cxnSp>
+    </p:spTree>
+    <p:extLst>
+      <p:ext uri="{BB962C8B-B14F-4D97-AF65-F5344CB8AC3E}">
+        <p14:creationId xmlns:p14="http://schemas.microsoft.com/office/powerpoint/2010/main" val="392150846"/>
+      </p:ext>
+    </p:extLst>
+  </p:cSld>
+  <p:clrMapOvr>
+    <a:masterClrMapping/>
+  </p:clrMapOvr>
+</p:sld>
+</file>
+
+<file path=ppt/slides/slide4.xml><?xml version="1.0" encoding="utf-8"?>
+<p:sld xmlns:a="http://schemas.openxmlformats.org/drawingml/2006/main" xmlns:r="http://schemas.openxmlformats.org/officeDocument/2006/relationships" xmlns:p="http://schemas.openxmlformats.org/presentationml/2006/main">
+  <p:cSld>
+    <p:spTree>
+      <p:nvGrpSpPr>
+        <p:cNvPr id="1" name=""/>
+        <p:cNvGrpSpPr/>
+        <p:nvPr/>
+      </p:nvGrpSpPr>
+      <p:grpSpPr>
+        <a:xfrm>
+          <a:off x="0" y="0"/>
+          <a:ext cx="0" cy="0"/>
+          <a:chOff x="0" y="0"/>
+          <a:chExt cx="0" cy="0"/>
+        </a:xfrm>
+      </p:grpSpPr>
+      <p:sp>
+        <p:nvSpPr>
+          <p:cNvPr id="2" name="Title 1">
+            <a:extLst>
+              <a:ext uri="{FF2B5EF4-FFF2-40B4-BE49-F238E27FC236}">
+                <a16:creationId xmlns:a16="http://schemas.microsoft.com/office/drawing/2014/main" id="{D23803D1-28BF-48B0-A3D2-40049EE4728A}"/>
+              </a:ext>
+            </a:extLst>
+          </p:cNvPr>
+          <p:cNvSpPr>
+            <a:spLocks noGrp="1"/>
+          </p:cNvSpPr>
+          <p:nvPr>
+            <p:ph type="title"/>
+          </p:nvPr>
+        </p:nvSpPr>
+        <p:spPr/>
+        <p:txBody>
+          <a:bodyPr/>
+          <a:lstStyle/>
+          <a:p>
+            <a:r>
+              <a:rPr lang="en-US" dirty="0"/>
+              <a:t>What Just Happened?</a:t>
+            </a:r>
+          </a:p>
+        </p:txBody>
+      </p:sp>
+      <p:sp>
+        <p:nvSpPr>
+          <p:cNvPr id="3" name="Footer Placeholder 2">
+            <a:extLst>
+              <a:ext uri="{FF2B5EF4-FFF2-40B4-BE49-F238E27FC236}">
+                <a16:creationId xmlns:a16="http://schemas.microsoft.com/office/drawing/2014/main" id="{FCF3F4C5-3CD6-418F-8421-3A141D6DCE7F}"/>
+              </a:ext>
+            </a:extLst>
+          </p:cNvPr>
+          <p:cNvSpPr>
+            <a:spLocks noGrp="1"/>
+          </p:cNvSpPr>
+          <p:nvPr>
+            <p:ph type="ftr" sz="quarter" idx="10"/>
+          </p:nvPr>
+        </p:nvSpPr>
+        <p:spPr/>
+        <p:txBody>
+          <a:bodyPr/>
+          <a:lstStyle/>
+          <a:p>
+            <a:r>
+              <a:rPr lang="en-US"/>
+              <a:t>HTMap Workshop 2019-9-16</a:t>
+            </a:r>
+            <a:endParaRPr lang="en-US" dirty="0"/>
+          </a:p>
+        </p:txBody>
+      </p:sp>
+      <p:sp>
+        <p:nvSpPr>
+          <p:cNvPr id="4" name="Slide Number Placeholder 3">
+            <a:extLst>
+              <a:ext uri="{FF2B5EF4-FFF2-40B4-BE49-F238E27FC236}">
+                <a16:creationId xmlns:a16="http://schemas.microsoft.com/office/drawing/2014/main" id="{22D5E63F-4EBF-4719-8A3E-1D599CD42D5C}"/>
+              </a:ext>
+            </a:extLst>
+          </p:cNvPr>
+          <p:cNvSpPr>
+            <a:spLocks noGrp="1"/>
+          </p:cNvSpPr>
+          <p:nvPr>
+            <p:ph type="sldNum" sz="quarter" idx="11"/>
+          </p:nvPr>
+        </p:nvSpPr>
+        <p:spPr/>
+        <p:txBody>
+          <a:bodyPr/>
+          <a:lstStyle/>
+          <a:p>
+            <a:fld id="{65011DE2-3A5B-41D4-A661-103799ABD939}" type="slidenum">
+              <a:rPr lang="en-US" smtClean="0"/>
+              <a:t>4</a:t>
+            </a:fld>
+            <a:endParaRPr lang="en-US"/>
+          </a:p>
+        </p:txBody>
+      </p:sp>
+      <p:sp>
+        <p:nvSpPr>
+          <p:cNvPr id="6" name="Rectangle 5">
+            <a:extLst>
+              <a:ext uri="{FF2B5EF4-FFF2-40B4-BE49-F238E27FC236}">
+                <a16:creationId xmlns:a16="http://schemas.microsoft.com/office/drawing/2014/main" id="{15B535FA-2AE8-41B9-99ED-ED4ECDD2A462}"/>
+              </a:ext>
+            </a:extLst>
+          </p:cNvPr>
+          <p:cNvSpPr/>
+          <p:nvPr/>
+        </p:nvSpPr>
+        <p:spPr>
+          <a:xfrm>
+            <a:off x="609600" y="809644"/>
+            <a:ext cx="10972800" cy="2267093"/>
+          </a:xfrm>
+          <a:prstGeom prst="rect">
+            <a:avLst/>
+          </a:prstGeom>
+          <a:solidFill>
+            <a:srgbClr val="1B9E77">
+              <a:alpha val="90000"/>
+            </a:srgbClr>
+          </a:solidFill>
+          <a:ln>
+            <a:noFill/>
+          </a:ln>
+        </p:spPr>
+        <p:style>
+          <a:lnRef idx="2">
+            <a:schemeClr val="accent1">
+              <a:shade val="50000"/>
+            </a:schemeClr>
+          </a:lnRef>
+          <a:fillRef idx="1">
+            <a:schemeClr val="accent1"/>
+          </a:fillRef>
+          <a:effectRef idx="0">
+            <a:schemeClr val="accent1"/>
+          </a:effectRef>
+          <a:fontRef idx="minor">
+            <a:schemeClr val="lt1"/>
+          </a:fontRef>
+        </p:style>
+        <p:txBody>
+          <a:bodyPr rtlCol="0" anchor="t"/>
+          <a:lstStyle/>
+          <a:p>
+            <a:pPr algn="ctr"/>
+            <a:r>
+              <a:rPr lang="en-US" sz="3600" b="1" dirty="0">
+                <a:solidFill>
+                  <a:schemeClr val="bg1"/>
+                </a:solidFill>
+              </a:rPr>
+              <a:t>Python</a:t>
+            </a:r>
+          </a:p>
+        </p:txBody>
+      </p:sp>
+      <p:sp>
+        <p:nvSpPr>
+          <p:cNvPr id="13" name="Rectangle: Diagonal Corners Snipped 12">
+            <a:extLst>
+              <a:ext uri="{FF2B5EF4-FFF2-40B4-BE49-F238E27FC236}">
+                <a16:creationId xmlns:a16="http://schemas.microsoft.com/office/drawing/2014/main" id="{9C2CD00A-7E63-42FA-B1A7-6733F170EDD2}"/>
+              </a:ext>
+            </a:extLst>
+          </p:cNvPr>
+          <p:cNvSpPr/>
+          <p:nvPr/>
+        </p:nvSpPr>
+        <p:spPr>
+          <a:xfrm>
+            <a:off x="2505718" y="983563"/>
+            <a:ext cx="1810211" cy="858981"/>
+          </a:xfrm>
+          <a:prstGeom prst="snip2DiagRect">
+            <a:avLst>
+              <a:gd name="adj1" fmla="val 0"/>
+              <a:gd name="adj2" fmla="val 40323"/>
+            </a:avLst>
+          </a:prstGeom>
+        </p:spPr>
+        <p:style>
+          <a:lnRef idx="2">
+            <a:schemeClr val="accent1">
+              <a:shade val="50000"/>
+            </a:schemeClr>
+          </a:lnRef>
+          <a:fillRef idx="1">
+            <a:schemeClr val="accent1"/>
+          </a:fillRef>
+          <a:effectRef idx="0">
+            <a:schemeClr val="accent1"/>
+          </a:effectRef>
+          <a:fontRef idx="minor">
+            <a:schemeClr val="lt1"/>
+          </a:fontRef>
+        </p:style>
+        <p:txBody>
+          <a:bodyPr rtlCol="0" anchor="ctr"/>
+          <a:lstStyle/>
+          <a:p>
+            <a:pPr algn="ctr"/>
+            <a:r>
+              <a:rPr lang="en-US" sz="2400" b="1" dirty="0"/>
+              <a:t>Function</a:t>
+            </a:r>
+            <a:endParaRPr lang="en-US" b="1" dirty="0"/>
+          </a:p>
+        </p:txBody>
+      </p:sp>
+      <p:sp>
+        <p:nvSpPr>
+          <p:cNvPr id="16" name="Flowchart: Decision 15">
+            <a:extLst>
+              <a:ext uri="{FF2B5EF4-FFF2-40B4-BE49-F238E27FC236}">
+                <a16:creationId xmlns:a16="http://schemas.microsoft.com/office/drawing/2014/main" id="{1F99FB29-0796-4F0E-AED8-F4DB677BF363}"/>
+              </a:ext>
+            </a:extLst>
+          </p:cNvPr>
+          <p:cNvSpPr/>
+          <p:nvPr/>
+        </p:nvSpPr>
+        <p:spPr>
+          <a:xfrm>
+            <a:off x="8646351" y="895260"/>
+            <a:ext cx="2907468" cy="1270000"/>
+          </a:xfrm>
+          <a:prstGeom prst="flowChartDecision">
+            <a:avLst/>
+          </a:prstGeom>
+        </p:spPr>
+        <p:style>
+          <a:lnRef idx="2">
+            <a:schemeClr val="accent1">
+              <a:shade val="50000"/>
+            </a:schemeClr>
+          </a:lnRef>
+          <a:fillRef idx="1">
+            <a:schemeClr val="accent1"/>
+          </a:fillRef>
+          <a:effectRef idx="0">
+            <a:schemeClr val="accent1"/>
+          </a:effectRef>
+          <a:fontRef idx="minor">
+            <a:schemeClr val="lt1"/>
+          </a:fontRef>
+        </p:style>
+        <p:txBody>
+          <a:bodyPr rtlCol="0" anchor="ctr"/>
+          <a:lstStyle/>
+          <a:p>
+            <a:pPr algn="ctr"/>
+            <a:r>
+              <a:rPr lang="en-US" sz="2800" b="1" dirty="0"/>
+              <a:t>Outputs</a:t>
+            </a:r>
+          </a:p>
+        </p:txBody>
+      </p:sp>
+      <p:sp>
+        <p:nvSpPr>
+          <p:cNvPr id="18" name="Flowchart: Manual Operation 17">
+            <a:extLst>
+              <a:ext uri="{FF2B5EF4-FFF2-40B4-BE49-F238E27FC236}">
+                <a16:creationId xmlns:a16="http://schemas.microsoft.com/office/drawing/2014/main" id="{DCA26AFB-D063-4DE9-AEE9-3E7279AB8FF1}"/>
+              </a:ext>
+            </a:extLst>
+          </p:cNvPr>
+          <p:cNvSpPr/>
+          <p:nvPr/>
+        </p:nvSpPr>
+        <p:spPr>
+          <a:xfrm>
+            <a:off x="762000" y="1934723"/>
+            <a:ext cx="1643361" cy="982134"/>
+          </a:xfrm>
+          <a:prstGeom prst="flowChartManualOperation">
+            <a:avLst/>
+          </a:prstGeom>
+        </p:spPr>
+        <p:style>
+          <a:lnRef idx="2">
+            <a:schemeClr val="accent1">
+              <a:shade val="50000"/>
+            </a:schemeClr>
+          </a:lnRef>
+          <a:fillRef idx="1">
+            <a:schemeClr val="accent1"/>
+          </a:fillRef>
+          <a:effectRef idx="0">
+            <a:schemeClr val="accent1"/>
+          </a:effectRef>
+          <a:fontRef idx="minor">
+            <a:schemeClr val="lt1"/>
+          </a:fontRef>
+        </p:style>
+        <p:txBody>
+          <a:bodyPr rtlCol="0" anchor="ctr"/>
+          <a:lstStyle/>
+          <a:p>
+            <a:pPr algn="ctr"/>
+            <a:r>
+              <a:rPr lang="en-US" sz="2400" b="1" dirty="0"/>
+              <a:t>Inputs</a:t>
+            </a:r>
+          </a:p>
+        </p:txBody>
+      </p:sp>
+      <p:cxnSp>
+        <p:nvCxnSpPr>
+          <p:cNvPr id="20" name="Connector: Curved 19">
+            <a:extLst>
+              <a:ext uri="{FF2B5EF4-FFF2-40B4-BE49-F238E27FC236}">
+                <a16:creationId xmlns:a16="http://schemas.microsoft.com/office/drawing/2014/main" id="{653B61F7-5048-47A5-BEF8-352C402994B2}"/>
+              </a:ext>
+            </a:extLst>
+          </p:cNvPr>
+          <p:cNvCxnSpPr>
+            <a:cxnSpLocks/>
+            <a:stCxn id="18" idx="3"/>
+          </p:cNvCxnSpPr>
+          <p:nvPr/>
+        </p:nvCxnSpPr>
+        <p:spPr>
+          <a:xfrm>
+            <a:off x="2241025" y="2425790"/>
+            <a:ext cx="941613" cy="402077"/>
+          </a:xfrm>
+          <a:prstGeom prst="curvedConnector3">
+            <a:avLst>
+              <a:gd name="adj1" fmla="val 50000"/>
+            </a:avLst>
+          </a:prstGeom>
+          <a:ln w="88900">
+            <a:tailEnd type="triangle"/>
+          </a:ln>
+        </p:spPr>
+        <p:style>
+          <a:lnRef idx="1">
+            <a:schemeClr val="accent1"/>
+          </a:lnRef>
+          <a:fillRef idx="0">
+            <a:schemeClr val="accent1"/>
+          </a:fillRef>
+          <a:effectRef idx="0">
+            <a:schemeClr val="accent1"/>
+          </a:effectRef>
+          <a:fontRef idx="minor">
+            <a:schemeClr val="tx1"/>
+          </a:fontRef>
+        </p:style>
+      </p:cxnSp>
+      <p:cxnSp>
+        <p:nvCxnSpPr>
+          <p:cNvPr id="22" name="Connector: Curved 21">
+            <a:extLst>
+              <a:ext uri="{FF2B5EF4-FFF2-40B4-BE49-F238E27FC236}">
+                <a16:creationId xmlns:a16="http://schemas.microsoft.com/office/drawing/2014/main" id="{9E98CD5D-F328-4C34-862A-C1E1ED535DFC}"/>
+              </a:ext>
+            </a:extLst>
+          </p:cNvPr>
+          <p:cNvCxnSpPr>
+            <a:cxnSpLocks/>
+            <a:stCxn id="15" idx="0"/>
+            <a:endCxn id="16" idx="1"/>
+          </p:cNvCxnSpPr>
+          <p:nvPr/>
+        </p:nvCxnSpPr>
+        <p:spPr>
+          <a:xfrm rot="5400000" flipH="1" flipV="1">
+            <a:off x="7991518" y="1726427"/>
+            <a:ext cx="850999" cy="458667"/>
+          </a:xfrm>
+          <a:prstGeom prst="curvedConnector2">
+            <a:avLst/>
+          </a:prstGeom>
+          <a:ln w="88900">
+            <a:tailEnd type="triangle"/>
+          </a:ln>
+        </p:spPr>
+        <p:style>
+          <a:lnRef idx="1">
+            <a:schemeClr val="accent1"/>
+          </a:lnRef>
+          <a:fillRef idx="0">
+            <a:schemeClr val="accent1"/>
+          </a:fillRef>
+          <a:effectRef idx="0">
+            <a:schemeClr val="accent1"/>
+          </a:effectRef>
+          <a:fontRef idx="minor">
+            <a:schemeClr val="tx1"/>
+          </a:fontRef>
+        </p:style>
+      </p:cxnSp>
+      <p:sp>
+        <p:nvSpPr>
+          <p:cNvPr id="11" name="Oval 10">
+            <a:extLst>
+              <a:ext uri="{FF2B5EF4-FFF2-40B4-BE49-F238E27FC236}">
+                <a16:creationId xmlns:a16="http://schemas.microsoft.com/office/drawing/2014/main" id="{80A3101F-5716-485D-9FAD-A606BAF3EDE3}"/>
+              </a:ext>
+            </a:extLst>
+          </p:cNvPr>
+          <p:cNvSpPr/>
+          <p:nvPr/>
+        </p:nvSpPr>
+        <p:spPr>
+          <a:xfrm>
+            <a:off x="4520009" y="4759569"/>
+            <a:ext cx="3372227" cy="1872317"/>
+          </a:xfrm>
+          <a:prstGeom prst="ellipse">
+            <a:avLst/>
+          </a:prstGeom>
+          <a:solidFill>
+            <a:srgbClr val="D31245">
+              <a:alpha val="90000"/>
+            </a:srgbClr>
+          </a:solidFill>
+        </p:spPr>
+        <p:style>
+          <a:lnRef idx="2">
+            <a:schemeClr val="accent1">
+              <a:shade val="50000"/>
+            </a:schemeClr>
+          </a:lnRef>
+          <a:fillRef idx="1">
+            <a:schemeClr val="accent1"/>
+          </a:fillRef>
+          <a:effectRef idx="0">
+            <a:schemeClr val="accent1"/>
+          </a:effectRef>
+          <a:fontRef idx="minor">
+            <a:schemeClr val="lt1"/>
+          </a:fontRef>
+        </p:style>
+        <p:txBody>
+          <a:bodyPr rtlCol="0" anchor="b"/>
+          <a:lstStyle/>
+          <a:p>
+            <a:pPr algn="ctr"/>
+            <a:r>
+              <a:rPr lang="en-US" sz="3600" b="1" dirty="0">
+                <a:latin typeface="Source Sans Pro" panose="020B0503030403020204" pitchFamily="34" charset="0"/>
+                <a:ea typeface="Source Sans Pro" panose="020B0503030403020204" pitchFamily="34" charset="0"/>
+              </a:rPr>
+              <a:t>HTCondor Pool</a:t>
+            </a:r>
+          </a:p>
+        </p:txBody>
+      </p:sp>
+      <p:sp>
+        <p:nvSpPr>
+          <p:cNvPr id="14" name="Rectangle: Rounded Corners 13">
+            <a:extLst>
+              <a:ext uri="{FF2B5EF4-FFF2-40B4-BE49-F238E27FC236}">
+                <a16:creationId xmlns:a16="http://schemas.microsoft.com/office/drawing/2014/main" id="{835C8B9C-515B-4334-815B-6018B81D3DEF}"/>
+              </a:ext>
+            </a:extLst>
+          </p:cNvPr>
+          <p:cNvSpPr/>
+          <p:nvPr/>
+        </p:nvSpPr>
+        <p:spPr>
+          <a:xfrm>
+            <a:off x="3182638" y="2418093"/>
+            <a:ext cx="1643361" cy="2230260"/>
+          </a:xfrm>
+          <a:prstGeom prst="roundRect">
+            <a:avLst/>
+          </a:prstGeom>
+        </p:spPr>
+        <p:style>
+          <a:lnRef idx="2">
+            <a:schemeClr val="accent1">
+              <a:shade val="50000"/>
+            </a:schemeClr>
+          </a:lnRef>
+          <a:fillRef idx="1">
+            <a:schemeClr val="accent1"/>
+          </a:fillRef>
+          <a:effectRef idx="0">
+            <a:schemeClr val="accent1"/>
+          </a:effectRef>
+          <a:fontRef idx="minor">
+            <a:schemeClr val="lt1"/>
+          </a:fontRef>
+        </p:style>
+        <p:txBody>
+          <a:bodyPr rtlCol="0" anchor="ctr"/>
+          <a:lstStyle/>
+          <a:p>
+            <a:pPr algn="ctr"/>
+            <a:r>
+              <a:rPr lang="en-US" sz="3200" b="1" dirty="0"/>
+              <a:t>HTMap</a:t>
+            </a:r>
+          </a:p>
+          <a:p>
+            <a:pPr algn="ctr"/>
+            <a:r>
+              <a:rPr lang="en-US" sz="3200" dirty="0"/>
+              <a:t>↓</a:t>
+            </a:r>
+          </a:p>
+        </p:txBody>
+      </p:sp>
+      <p:sp>
+        <p:nvSpPr>
+          <p:cNvPr id="15" name="Rectangle: Rounded Corners 14">
+            <a:extLst>
+              <a:ext uri="{FF2B5EF4-FFF2-40B4-BE49-F238E27FC236}">
+                <a16:creationId xmlns:a16="http://schemas.microsoft.com/office/drawing/2014/main" id="{2C72E1F2-C239-4CC2-B606-8ACF2313154C}"/>
+              </a:ext>
+            </a:extLst>
+          </p:cNvPr>
+          <p:cNvSpPr/>
+          <p:nvPr/>
+        </p:nvSpPr>
+        <p:spPr>
+          <a:xfrm>
+            <a:off x="7366003" y="2381259"/>
+            <a:ext cx="1643361" cy="2230260"/>
+          </a:xfrm>
+          <a:prstGeom prst="roundRect">
+            <a:avLst/>
+          </a:prstGeom>
+        </p:spPr>
+        <p:style>
+          <a:lnRef idx="2">
+            <a:schemeClr val="accent1">
+              <a:shade val="50000"/>
+            </a:schemeClr>
+          </a:lnRef>
+          <a:fillRef idx="1">
+            <a:schemeClr val="accent1"/>
+          </a:fillRef>
+          <a:effectRef idx="0">
+            <a:schemeClr val="accent1"/>
+          </a:effectRef>
+          <a:fontRef idx="minor">
+            <a:schemeClr val="lt1"/>
+          </a:fontRef>
+        </p:style>
+        <p:txBody>
+          <a:bodyPr rtlCol="0" anchor="ctr"/>
+          <a:lstStyle/>
+          <a:p>
+            <a:pPr algn="ctr"/>
+            <a:r>
+              <a:rPr lang="en-US" sz="3200" dirty="0"/>
+              <a:t>↑</a:t>
+            </a:r>
+          </a:p>
+          <a:p>
+            <a:pPr algn="ctr"/>
+            <a:r>
+              <a:rPr lang="en-US" sz="3200" b="1" dirty="0"/>
+              <a:t>HTMap</a:t>
+            </a:r>
+          </a:p>
+        </p:txBody>
+      </p:sp>
+      <p:cxnSp>
+        <p:nvCxnSpPr>
+          <p:cNvPr id="17" name="Connector: Curved 16">
+            <a:extLst>
+              <a:ext uri="{FF2B5EF4-FFF2-40B4-BE49-F238E27FC236}">
+                <a16:creationId xmlns:a16="http://schemas.microsoft.com/office/drawing/2014/main" id="{B9B3AAB5-430E-4A8E-96F0-590E75A37CA9}"/>
+              </a:ext>
+            </a:extLst>
+          </p:cNvPr>
+          <p:cNvCxnSpPr>
+            <a:cxnSpLocks/>
+            <a:stCxn id="13" idx="1"/>
+            <a:endCxn id="14" idx="0"/>
+          </p:cNvCxnSpPr>
+          <p:nvPr/>
+        </p:nvCxnSpPr>
+        <p:spPr>
+          <a:xfrm rot="16200000" flipH="1">
+            <a:off x="3419797" y="1833570"/>
+            <a:ext cx="575549" cy="593495"/>
+          </a:xfrm>
+          <a:prstGeom prst="curvedConnector3">
+            <a:avLst>
+              <a:gd name="adj1" fmla="val 50000"/>
+            </a:avLst>
+          </a:prstGeom>
+          <a:ln w="88900">
+            <a:tailEnd type="triangle"/>
+          </a:ln>
+        </p:spPr>
+        <p:style>
+          <a:lnRef idx="1">
+            <a:schemeClr val="accent1"/>
+          </a:lnRef>
+          <a:fillRef idx="0">
+            <a:schemeClr val="accent1"/>
+          </a:fillRef>
+          <a:effectRef idx="0">
+            <a:schemeClr val="accent1"/>
+          </a:effectRef>
+          <a:fontRef idx="minor">
+            <a:schemeClr val="tx1"/>
+          </a:fontRef>
+        </p:style>
+      </p:cxnSp>
+      <p:cxnSp>
+        <p:nvCxnSpPr>
+          <p:cNvPr id="21" name="Connector: Curved 20">
+            <a:extLst>
+              <a:ext uri="{FF2B5EF4-FFF2-40B4-BE49-F238E27FC236}">
+                <a16:creationId xmlns:a16="http://schemas.microsoft.com/office/drawing/2014/main" id="{FD8CB989-9BCE-42E0-8677-AD278D85B970}"/>
+              </a:ext>
+            </a:extLst>
+          </p:cNvPr>
+          <p:cNvCxnSpPr>
+            <a:cxnSpLocks/>
+            <a:stCxn id="14" idx="2"/>
+            <a:endCxn id="11" idx="1"/>
+          </p:cNvCxnSpPr>
+          <p:nvPr/>
+        </p:nvCxnSpPr>
+        <p:spPr>
+          <a:xfrm rot="16200000" flipH="1">
+            <a:off x="4316384" y="4336287"/>
+            <a:ext cx="385410" cy="1009541"/>
+          </a:xfrm>
+          <a:prstGeom prst="curvedConnector3">
+            <a:avLst>
+              <a:gd name="adj1" fmla="val 50000"/>
+            </a:avLst>
+          </a:prstGeom>
+          <a:ln w="88900">
+            <a:solidFill>
+              <a:srgbClr val="D31245"/>
+            </a:solidFill>
+            <a:tailEnd type="triangle"/>
+          </a:ln>
+        </p:spPr>
+        <p:style>
+          <a:lnRef idx="1">
+            <a:schemeClr val="accent1"/>
+          </a:lnRef>
+          <a:fillRef idx="0">
+            <a:schemeClr val="accent1"/>
+          </a:fillRef>
+          <a:effectRef idx="0">
+            <a:schemeClr val="accent1"/>
+          </a:effectRef>
+          <a:fontRef idx="minor">
+            <a:schemeClr val="tx1"/>
+          </a:fontRef>
+        </p:style>
+      </p:cxnSp>
+      <p:cxnSp>
+        <p:nvCxnSpPr>
+          <p:cNvPr id="26" name="Connector: Curved 25">
+            <a:extLst>
+              <a:ext uri="{FF2B5EF4-FFF2-40B4-BE49-F238E27FC236}">
+                <a16:creationId xmlns:a16="http://schemas.microsoft.com/office/drawing/2014/main" id="{6B7E91FB-FBF0-4E6A-93EA-C57E3E0BBD5C}"/>
+              </a:ext>
+            </a:extLst>
+          </p:cNvPr>
+          <p:cNvCxnSpPr>
+            <a:cxnSpLocks/>
+            <a:endCxn id="31" idx="1"/>
+          </p:cNvCxnSpPr>
+          <p:nvPr/>
+        </p:nvCxnSpPr>
+        <p:spPr>
+          <a:xfrm flipV="1">
+            <a:off x="4799367" y="2143996"/>
+            <a:ext cx="670155" cy="537720"/>
+          </a:xfrm>
+          <a:prstGeom prst="curvedConnector3">
+            <a:avLst>
+              <a:gd name="adj1" fmla="val 50000"/>
+            </a:avLst>
+          </a:prstGeom>
+          <a:ln w="88900">
+            <a:tailEnd type="triangle"/>
+          </a:ln>
+        </p:spPr>
+        <p:style>
+          <a:lnRef idx="1">
+            <a:schemeClr val="accent1"/>
+          </a:lnRef>
+          <a:fillRef idx="0">
+            <a:schemeClr val="accent1"/>
+          </a:fillRef>
+          <a:effectRef idx="0">
+            <a:schemeClr val="accent1"/>
+          </a:effectRef>
+          <a:fontRef idx="minor">
+            <a:schemeClr val="tx1"/>
+          </a:fontRef>
+        </p:style>
+      </p:cxnSp>
+      <p:sp>
+        <p:nvSpPr>
+          <p:cNvPr id="31" name="Flowchart: Punched Tape 30">
+            <a:extLst>
+              <a:ext uri="{FF2B5EF4-FFF2-40B4-BE49-F238E27FC236}">
+                <a16:creationId xmlns:a16="http://schemas.microsoft.com/office/drawing/2014/main" id="{FC9FC52B-C528-44C6-B62D-F2A13FB89C25}"/>
+              </a:ext>
+            </a:extLst>
+          </p:cNvPr>
+          <p:cNvSpPr/>
+          <p:nvPr/>
+        </p:nvSpPr>
+        <p:spPr>
+          <a:xfrm>
+            <a:off x="5469522" y="1572496"/>
+            <a:ext cx="1473202" cy="1143000"/>
+          </a:xfrm>
+          <a:prstGeom prst="flowChartPunchedTape">
+            <a:avLst/>
+          </a:prstGeom>
+        </p:spPr>
+        <p:style>
+          <a:lnRef idx="2">
+            <a:schemeClr val="accent1">
+              <a:shade val="50000"/>
+            </a:schemeClr>
+          </a:lnRef>
+          <a:fillRef idx="1">
+            <a:schemeClr val="accent1"/>
+          </a:fillRef>
+          <a:effectRef idx="0">
+            <a:schemeClr val="accent1"/>
+          </a:effectRef>
+          <a:fontRef idx="minor">
+            <a:schemeClr val="lt1"/>
+          </a:fontRef>
+        </p:style>
+        <p:txBody>
+          <a:bodyPr rtlCol="0" anchor="ctr"/>
+          <a:lstStyle/>
+          <a:p>
+            <a:pPr algn="ctr"/>
+            <a:r>
+              <a:rPr lang="en-US" sz="2400" b="1" dirty="0"/>
+              <a:t>Map</a:t>
+            </a:r>
+          </a:p>
+        </p:txBody>
+      </p:sp>
+      <p:cxnSp>
+        <p:nvCxnSpPr>
+          <p:cNvPr id="33" name="Connector: Curved 32">
+            <a:extLst>
+              <a:ext uri="{FF2B5EF4-FFF2-40B4-BE49-F238E27FC236}">
+                <a16:creationId xmlns:a16="http://schemas.microsoft.com/office/drawing/2014/main" id="{20D69D77-5F38-4CBC-B075-0354240BF4E8}"/>
+              </a:ext>
+            </a:extLst>
+          </p:cNvPr>
+          <p:cNvCxnSpPr>
+            <a:cxnSpLocks/>
+            <a:stCxn id="31" idx="3"/>
+            <a:endCxn id="16" idx="1"/>
+          </p:cNvCxnSpPr>
+          <p:nvPr/>
+        </p:nvCxnSpPr>
+        <p:spPr>
+          <a:xfrm flipV="1">
+            <a:off x="6942724" y="1530260"/>
+            <a:ext cx="1703627" cy="613736"/>
+          </a:xfrm>
+          <a:prstGeom prst="curvedConnector3">
+            <a:avLst>
+              <a:gd name="adj1" fmla="val 50000"/>
+            </a:avLst>
+          </a:prstGeom>
+          <a:ln w="88900">
+            <a:tailEnd type="triangle"/>
+          </a:ln>
+        </p:spPr>
+        <p:style>
+          <a:lnRef idx="1">
+            <a:schemeClr val="accent1"/>
+          </a:lnRef>
+          <a:fillRef idx="0">
+            <a:schemeClr val="accent1"/>
+          </a:fillRef>
+          <a:effectRef idx="0">
+            <a:schemeClr val="accent1"/>
+          </a:effectRef>
+          <a:fontRef idx="minor">
+            <a:schemeClr val="tx1"/>
+          </a:fontRef>
+        </p:style>
+      </p:cxnSp>
+      <p:cxnSp>
+        <p:nvCxnSpPr>
+          <p:cNvPr id="43" name="Connector: Curved 42">
+            <a:extLst>
+              <a:ext uri="{FF2B5EF4-FFF2-40B4-BE49-F238E27FC236}">
+                <a16:creationId xmlns:a16="http://schemas.microsoft.com/office/drawing/2014/main" id="{90146499-F421-41EF-BAF7-C49408D3B836}"/>
+              </a:ext>
+            </a:extLst>
+          </p:cNvPr>
+          <p:cNvCxnSpPr>
+            <a:cxnSpLocks/>
+            <a:stCxn id="11" idx="0"/>
+            <a:endCxn id="31" idx="2"/>
+          </p:cNvCxnSpPr>
+          <p:nvPr/>
+        </p:nvCxnSpPr>
+        <p:spPr>
+          <a:xfrm rot="5400000" flipH="1" flipV="1">
+            <a:off x="5126937" y="3680383"/>
+            <a:ext cx="2158373" cy="12700"/>
+          </a:xfrm>
+          <a:prstGeom prst="curvedConnector3">
+            <a:avLst>
+              <a:gd name="adj1" fmla="val 50000"/>
+            </a:avLst>
+          </a:prstGeom>
+          <a:ln w="88900">
+            <a:solidFill>
+              <a:srgbClr val="D31245"/>
+            </a:solidFill>
+            <a:headEnd type="triangle"/>
+            <a:tailEnd type="triangle"/>
+          </a:ln>
+        </p:spPr>
+        <p:style>
+          <a:lnRef idx="1">
+            <a:schemeClr val="accent1"/>
+          </a:lnRef>
+          <a:fillRef idx="0">
+            <a:schemeClr val="accent1"/>
+          </a:fillRef>
+          <a:effectRef idx="0">
+            <a:schemeClr val="accent1"/>
+          </a:effectRef>
+          <a:fontRef idx="minor">
+            <a:schemeClr val="tx1"/>
+          </a:fontRef>
+        </p:style>
+      </p:cxnSp>
+      <p:cxnSp>
+        <p:nvCxnSpPr>
+          <p:cNvPr id="50" name="Connector: Curved 49">
+            <a:extLst>
+              <a:ext uri="{FF2B5EF4-FFF2-40B4-BE49-F238E27FC236}">
+                <a16:creationId xmlns:a16="http://schemas.microsoft.com/office/drawing/2014/main" id="{53274FD2-224C-4911-8D21-DDBC5C514F8C}"/>
+              </a:ext>
+            </a:extLst>
+          </p:cNvPr>
+          <p:cNvCxnSpPr>
+            <a:cxnSpLocks/>
+            <a:stCxn id="11" idx="7"/>
+            <a:endCxn id="15" idx="2"/>
+          </p:cNvCxnSpPr>
+          <p:nvPr/>
+        </p:nvCxnSpPr>
+        <p:spPr>
+          <a:xfrm rot="5400000" flipH="1" flipV="1">
+            <a:off x="7581912" y="4427992"/>
+            <a:ext cx="422244" cy="789299"/>
+          </a:xfrm>
+          <a:prstGeom prst="curvedConnector3">
+            <a:avLst>
+              <a:gd name="adj1" fmla="val 50000"/>
+            </a:avLst>
+          </a:prstGeom>
+          <a:ln w="88900">
+            <a:solidFill>
+              <a:srgbClr val="D31245"/>
+            </a:solidFill>
+            <a:tailEnd type="triangle"/>
+          </a:ln>
+        </p:spPr>
+        <p:style>
+          <a:lnRef idx="1">
+            <a:schemeClr val="accent1"/>
+          </a:lnRef>
+          <a:fillRef idx="0">
+            <a:schemeClr val="accent1"/>
+          </a:fillRef>
+          <a:effectRef idx="0">
+            <a:schemeClr val="accent1"/>
+          </a:effectRef>
+          <a:fontRef idx="minor">
+            <a:schemeClr val="tx1"/>
+          </a:fontRef>
+        </p:style>
+      </p:cxnSp>
+    </p:spTree>
+    <p:extLst>
+      <p:ext uri="{BB962C8B-B14F-4D97-AF65-F5344CB8AC3E}">
+        <p14:creationId xmlns:p14="http://schemas.microsoft.com/office/powerpoint/2010/main" val="2463493504"/>
+      </p:ext>
+    </p:extLst>
+  </p:cSld>
+  <p:clrMapOvr>
+    <a:masterClrMapping/>
+  </p:clrMapOvr>
+  <mc:AlternateContent xmlns:mc="http://schemas.openxmlformats.org/markup-compatibility/2006">
+    <mc:Choice xmlns:p14="http://schemas.microsoft.com/office/powerpoint/2010/main" Requires="p14">
+      <p:transition spd="med" p14:dur="700">
+        <p:fade/>
+      </p:transition>
+    </mc:Choice>
+    <mc:Fallback>
+      <p:transition spd="med">
+        <p:fade/>
+      </p:transition>
+    </mc:Fallback>
+  </mc:AlternateContent>
+  <p:timing>
+    <p:tnLst>
+      <p:par>
+        <p:cTn id="1" dur="indefinite" restart="never" nodeType="tmRoot">
+          <p:childTnLst>
+            <p:seq concurrent="1" nextAc="seek">
+              <p:cTn id="2" dur="indefinite" nodeType="mainSeq">
+                <p:childTnLst>
+                  <p:par>
+                    <p:cTn id="3" fill="hold">
+                      <p:stCondLst>
+                        <p:cond delay="indefinite"/>
+                      </p:stCondLst>
+                      <p:childTnLst>
+                        <p:par>
+                          <p:cTn id="4" fill="hold">
+                            <p:stCondLst>
+                              <p:cond delay="0"/>
+                            </p:stCondLst>
+                            <p:childTnLst>
+                              <p:par>
+                                <p:cTn id="5" presetID="1" presetClass="entr" presetSubtype="0" fill="hold" nodeType="clickEffect">
+                                  <p:stCondLst>
+                                    <p:cond delay="0"/>
+                                  </p:stCondLst>
+                                  <p:childTnLst>
+                                    <p:set>
+                                      <p:cBhvr>
+                                        <p:cTn id="6" dur="1" fill="hold">
+                                          <p:stCondLst>
+                                            <p:cond delay="0"/>
+                                          </p:stCondLst>
+                                        </p:cTn>
+                                        <p:tgtEl>
+                                          <p:spTgt spid="21"/>
+                                        </p:tgtEl>
+                                        <p:attrNameLst>
+                                          <p:attrName>style.visibility</p:attrName>
+                                        </p:attrNameLst>
+                                      </p:cBhvr>
+                                      <p:to>
+                                        <p:strVal val="visible"/>
+                                      </p:to>
+                                    </p:set>
+                                  </p:childTnLst>
+                                </p:cTn>
+                              </p:par>
+                              <p:par>
+                                <p:cTn id="7" presetID="1" presetClass="entr" presetSubtype="0" fill="hold" grpId="0" nodeType="withEffect">
+                                  <p:stCondLst>
+                                    <p:cond delay="0"/>
+                                  </p:stCondLst>
+                                  <p:childTnLst>
+                                    <p:set>
+                                      <p:cBhvr>
+                                        <p:cTn id="8" dur="1" fill="hold">
+                                          <p:stCondLst>
+                                            <p:cond delay="0"/>
+                                          </p:stCondLst>
+                                        </p:cTn>
+                                        <p:tgtEl>
+                                          <p:spTgt spid="11"/>
+                                        </p:tgtEl>
+                                        <p:attrNameLst>
+                                          <p:attrName>style.visibility</p:attrName>
+                                        </p:attrNameLst>
+                                      </p:cBhvr>
+                                      <p:to>
+                                        <p:strVal val="visible"/>
+                                      </p:to>
+                                    </p:set>
+                                  </p:childTnLst>
+                                </p:cTn>
+                              </p:par>
+                            </p:childTnLst>
+                          </p:cTn>
+                        </p:par>
+                      </p:childTnLst>
+                    </p:cTn>
+                  </p:par>
+                  <p:par>
+                    <p:cTn id="9" fill="hold">
+                      <p:stCondLst>
+                        <p:cond delay="indefinite"/>
+                      </p:stCondLst>
+                      <p:childTnLst>
+                        <p:par>
+                          <p:cTn id="10" fill="hold">
+                            <p:stCondLst>
+                              <p:cond delay="0"/>
+                            </p:stCondLst>
+                            <p:childTnLst>
+                              <p:par>
+                                <p:cTn id="11" presetID="1" presetClass="entr" presetSubtype="0" fill="hold" nodeType="clickEffect">
+                                  <p:stCondLst>
+                                    <p:cond delay="0"/>
+                                  </p:stCondLst>
+                                  <p:childTnLst>
+                                    <p:set>
+                                      <p:cBhvr>
+                                        <p:cTn id="12" dur="1" fill="hold">
+                                          <p:stCondLst>
+                                            <p:cond delay="0"/>
+                                          </p:stCondLst>
+                                        </p:cTn>
+                                        <p:tgtEl>
+                                          <p:spTgt spid="26"/>
+                                        </p:tgtEl>
+                                        <p:attrNameLst>
+                                          <p:attrName>style.visibility</p:attrName>
+                                        </p:attrNameLst>
+                                      </p:cBhvr>
+                                      <p:to>
+                                        <p:strVal val="visible"/>
+                                      </p:to>
+                                    </p:set>
+                                  </p:childTnLst>
+                                </p:cTn>
+                              </p:par>
+                              <p:par>
+                                <p:cTn id="13" presetID="1" presetClass="entr" presetSubtype="0" fill="hold" nodeType="withEffect">
+                                  <p:stCondLst>
+                                    <p:cond delay="0"/>
+                                  </p:stCondLst>
+                                  <p:childTnLst>
+                                    <p:set>
+                                      <p:cBhvr>
+                                        <p:cTn id="14" dur="1" fill="hold">
+                                          <p:stCondLst>
+                                            <p:cond delay="0"/>
+                                          </p:stCondLst>
+                                        </p:cTn>
+                                        <p:tgtEl>
+                                          <p:spTgt spid="43"/>
+                                        </p:tgtEl>
+                                        <p:attrNameLst>
+                                          <p:attrName>style.visibility</p:attrName>
+                                        </p:attrNameLst>
+                                      </p:cBhvr>
+                                      <p:to>
+                                        <p:strVal val="visible"/>
+                                      </p:to>
+                                    </p:set>
+                                  </p:childTnLst>
+                                </p:cTn>
+                              </p:par>
+                              <p:par>
+                                <p:cTn id="15" presetID="1" presetClass="entr" presetSubtype="0" fill="hold" grpId="0" nodeType="withEffect">
+                                  <p:stCondLst>
+                                    <p:cond delay="0"/>
+                                  </p:stCondLst>
+                                  <p:childTnLst>
+                                    <p:set>
+                                      <p:cBhvr>
+                                        <p:cTn id="16" dur="1" fill="hold">
+                                          <p:stCondLst>
+                                            <p:cond delay="0"/>
+                                          </p:stCondLst>
+                                        </p:cTn>
+                                        <p:tgtEl>
+                                          <p:spTgt spid="31"/>
+                                        </p:tgtEl>
+                                        <p:attrNameLst>
+                                          <p:attrName>style.visibility</p:attrName>
+                                        </p:attrNameLst>
+                                      </p:cBhvr>
+                                      <p:to>
+                                        <p:strVal val="visible"/>
+                                      </p:to>
+                                    </p:set>
+                                  </p:childTnLst>
+                                </p:cTn>
+                              </p:par>
+                            </p:childTnLst>
+                          </p:cTn>
+                        </p:par>
+                      </p:childTnLst>
+                    </p:cTn>
+                  </p:par>
+                  <p:par>
+                    <p:cTn id="17" fill="hold">
+                      <p:stCondLst>
+                        <p:cond delay="indefinite"/>
+                      </p:stCondLst>
+                      <p:childTnLst>
+                        <p:par>
+                          <p:cTn id="18" fill="hold">
+                            <p:stCondLst>
+                              <p:cond delay="0"/>
+                            </p:stCondLst>
+                            <p:childTnLst>
+                              <p:par>
+                                <p:cTn id="19" presetID="10" presetClass="entr" presetSubtype="0" fill="hold" nodeType="clickEffect">
+                                  <p:stCondLst>
+                                    <p:cond delay="0"/>
+                                  </p:stCondLst>
+                                  <p:childTnLst>
+                                    <p:set>
+                                      <p:cBhvr>
+                                        <p:cTn id="20" dur="1" fill="hold">
+                                          <p:stCondLst>
+                                            <p:cond delay="0"/>
+                                          </p:stCondLst>
+                                        </p:cTn>
+                                        <p:tgtEl>
+                                          <p:spTgt spid="50"/>
+                                        </p:tgtEl>
+                                        <p:attrNameLst>
+                                          <p:attrName>style.visibility</p:attrName>
+                                        </p:attrNameLst>
+                                      </p:cBhvr>
+                                      <p:to>
+                                        <p:strVal val="visible"/>
+                                      </p:to>
+                                    </p:set>
+                                    <p:animEffect transition="in" filter="fade">
+                                      <p:cBhvr>
+                                        <p:cTn id="21" dur="500"/>
+                                        <p:tgtEl>
+                                          <p:spTgt spid="50"/>
+                                        </p:tgtEl>
+                                      </p:cBhvr>
+                                    </p:animEffect>
+                                  </p:childTnLst>
+                                </p:cTn>
+                              </p:par>
+                              <p:par>
+                                <p:cTn id="22" presetID="10" presetClass="entr" presetSubtype="0" fill="hold" grpId="0" nodeType="withEffect">
+                                  <p:stCondLst>
+                                    <p:cond delay="0"/>
+                                  </p:stCondLst>
+                                  <p:childTnLst>
+                                    <p:set>
+                                      <p:cBhvr>
+                                        <p:cTn id="23" dur="1" fill="hold">
+                                          <p:stCondLst>
+                                            <p:cond delay="0"/>
+                                          </p:stCondLst>
+                                        </p:cTn>
+                                        <p:tgtEl>
+                                          <p:spTgt spid="15"/>
+                                        </p:tgtEl>
+                                        <p:attrNameLst>
+                                          <p:attrName>style.visibility</p:attrName>
+                                        </p:attrNameLst>
+                                      </p:cBhvr>
+                                      <p:to>
+                                        <p:strVal val="visible"/>
+                                      </p:to>
+                                    </p:set>
+                                    <p:animEffect transition="in" filter="fade">
+                                      <p:cBhvr>
+                                        <p:cTn id="24" dur="500"/>
+                                        <p:tgtEl>
+                                          <p:spTgt spid="15"/>
+                                        </p:tgtEl>
+                                      </p:cBhvr>
+                                    </p:animEffect>
+                                  </p:childTnLst>
+                                </p:cTn>
+                              </p:par>
+                              <p:par>
+                                <p:cTn id="25" presetID="10" presetClass="entr" presetSubtype="0" fill="hold" nodeType="withEffect">
+                                  <p:stCondLst>
+                                    <p:cond delay="0"/>
+                                  </p:stCondLst>
+                                  <p:childTnLst>
+                                    <p:set>
+                                      <p:cBhvr>
+                                        <p:cTn id="26" dur="1" fill="hold">
+                                          <p:stCondLst>
+                                            <p:cond delay="0"/>
+                                          </p:stCondLst>
+                                        </p:cTn>
+                                        <p:tgtEl>
+                                          <p:spTgt spid="22"/>
+                                        </p:tgtEl>
+                                        <p:attrNameLst>
+                                          <p:attrName>style.visibility</p:attrName>
+                                        </p:attrNameLst>
+                                      </p:cBhvr>
+                                      <p:to>
+                                        <p:strVal val="visible"/>
+                                      </p:to>
+                                    </p:set>
+                                    <p:animEffect transition="in" filter="fade">
+                                      <p:cBhvr>
+                                        <p:cTn id="27" dur="500"/>
+                                        <p:tgtEl>
+                                          <p:spTgt spid="22"/>
+                                        </p:tgtEl>
+                                      </p:cBhvr>
+                                    </p:animEffect>
+                                  </p:childTnLst>
+                                </p:cTn>
+                              </p:par>
+                              <p:par>
+                                <p:cTn id="28" presetID="10" presetClass="entr" presetSubtype="0" fill="hold" nodeType="withEffect">
+                                  <p:stCondLst>
+                                    <p:cond delay="0"/>
+                                  </p:stCondLst>
+                                  <p:childTnLst>
+                                    <p:set>
+                                      <p:cBhvr>
+                                        <p:cTn id="29" dur="1" fill="hold">
+                                          <p:stCondLst>
+                                            <p:cond delay="0"/>
+                                          </p:stCondLst>
+                                        </p:cTn>
+                                        <p:tgtEl>
+                                          <p:spTgt spid="33"/>
+                                        </p:tgtEl>
+                                        <p:attrNameLst>
+                                          <p:attrName>style.visibility</p:attrName>
+                                        </p:attrNameLst>
+                                      </p:cBhvr>
+                                      <p:to>
+                                        <p:strVal val="visible"/>
+                                      </p:to>
+                                    </p:set>
+                                    <p:animEffect transition="in" filter="fade">
+                                      <p:cBhvr>
+                                        <p:cTn id="30" dur="500"/>
+                                        <p:tgtEl>
+                                          <p:spTgt spid="33"/>
+                                        </p:tgtEl>
+                                      </p:cBhvr>
+                                    </p:animEffect>
+                                  </p:childTnLst>
+                                </p:cTn>
+                              </p:par>
+                              <p:par>
+                                <p:cTn id="31" presetID="10" presetClass="entr" presetSubtype="0" fill="hold" grpId="0" nodeType="withEffect">
+                                  <p:stCondLst>
+                                    <p:cond delay="0"/>
+                                  </p:stCondLst>
+                                  <p:childTnLst>
+                                    <p:set>
+                                      <p:cBhvr>
+                                        <p:cTn id="32" dur="1" fill="hold">
+                                          <p:stCondLst>
+                                            <p:cond delay="0"/>
+                                          </p:stCondLst>
+                                        </p:cTn>
+                                        <p:tgtEl>
+                                          <p:spTgt spid="16"/>
+                                        </p:tgtEl>
+                                        <p:attrNameLst>
+                                          <p:attrName>style.visibility</p:attrName>
+                                        </p:attrNameLst>
+                                      </p:cBhvr>
+                                      <p:to>
+                                        <p:strVal val="visible"/>
+                                      </p:to>
+                                    </p:set>
+                                    <p:animEffect transition="in" filter="fade">
+                                      <p:cBhvr>
+                                        <p:cTn id="33" dur="500"/>
+                                        <p:tgtEl>
+                                          <p:spTgt spid="16"/>
+                                        </p:tgtEl>
+                                      </p:cBhvr>
+                                    </p:animEffect>
+                                  </p:childTnLst>
+                                </p:cTn>
+                              </p:par>
+                            </p:childTnLst>
+                          </p:cTn>
+                        </p:par>
+                      </p:childTnLst>
+                    </p:cTn>
+                  </p:par>
+                </p:childTnLst>
+              </p:cTn>
+              <p:prevCondLst>
+                <p:cond evt="onPrev" delay="0">
+                  <p:tgtEl>
+                    <p:sldTgt/>
+                  </p:tgtEl>
+                </p:cond>
+              </p:prevCondLst>
+              <p:nextCondLst>
+                <p:cond evt="onNext" delay="0">
+                  <p:tgtEl>
+                    <p:sldTgt/>
+                  </p:tgtEl>
+                </p:cond>
+              </p:nextCondLst>
+            </p:seq>
+          </p:childTnLst>
+        </p:cTn>
+      </p:par>
+    </p:tnLst>
+    <p:bldLst>
+      <p:bldP spid="16" grpId="0" animBg="1"/>
+      <p:bldP spid="11" grpId="0" animBg="1"/>
+      <p:bldP spid="15" grpId="0" animBg="1"/>
+      <p:bldP spid="31" grpId="0" animBg="1"/>
+    </p:bldLst>
+  </p:timing>
+</p:sld>
+</file>
+
+<file path=ppt/slides/slide5.xml><?xml version="1.0" encoding="utf-8"?>
+<p:sld xmlns:a="http://schemas.openxmlformats.org/drawingml/2006/main" xmlns:r="http://schemas.openxmlformats.org/officeDocument/2006/relationships" xmlns:p="http://schemas.openxmlformats.org/presentationml/2006/main">
+  <p:cSld>
+    <p:spTree>
+      <p:nvGrpSpPr>
+        <p:cNvPr id="1" name=""/>
+        <p:cNvGrpSpPr/>
+        <p:nvPr/>
+      </p:nvGrpSpPr>
+      <p:grpSpPr>
+        <a:xfrm>
+          <a:off x="0" y="0"/>
+          <a:ext cx="0" cy="0"/>
+          <a:chOff x="0" y="0"/>
+          <a:chExt cx="0" cy="0"/>
+        </a:xfrm>
+      </p:grpSpPr>
+      <p:sp>
+        <p:nvSpPr>
+          <p:cNvPr id="2" name="Title 1">
+            <a:extLst>
+              <a:ext uri="{FF2B5EF4-FFF2-40B4-BE49-F238E27FC236}">
+                <a16:creationId xmlns:a16="http://schemas.microsoft.com/office/drawing/2014/main" id="{B8DCEF56-AC3E-477F-8BF0-5BE3AFC2269F}"/>
+              </a:ext>
+            </a:extLst>
+          </p:cNvPr>
+          <p:cNvSpPr>
+            <a:spLocks noGrp="1"/>
+          </p:cNvSpPr>
+          <p:nvPr>
+            <p:ph type="title"/>
+          </p:nvPr>
+        </p:nvSpPr>
+        <p:spPr/>
+        <p:txBody>
+          <a:bodyPr/>
+          <a:lstStyle/>
+          <a:p>
+            <a:r>
+              <a:rPr lang="en-US" dirty="0"/>
+              <a:t>Why use HTMap?</a:t>
+            </a:r>
+          </a:p>
+        </p:txBody>
+      </p:sp>
+      <p:sp>
+        <p:nvSpPr>
+          <p:cNvPr id="3" name="Footer Placeholder 2">
+            <a:extLst>
+              <a:ext uri="{FF2B5EF4-FFF2-40B4-BE49-F238E27FC236}">
+                <a16:creationId xmlns:a16="http://schemas.microsoft.com/office/drawing/2014/main" id="{F5C6BACE-1F1D-4609-81F1-76BD7CE9C92C}"/>
+              </a:ext>
+            </a:extLst>
+          </p:cNvPr>
+          <p:cNvSpPr>
+            <a:spLocks noGrp="1"/>
+          </p:cNvSpPr>
+          <p:nvPr>
+            <p:ph type="ftr" sz="quarter" idx="10"/>
+          </p:nvPr>
+        </p:nvSpPr>
+        <p:spPr/>
+        <p:txBody>
+          <a:bodyPr/>
+          <a:lstStyle/>
+          <a:p>
+            <a:r>
+              <a:rPr lang="en-US"/>
+              <a:t>HTMap Workshop 2019-9-16</a:t>
+            </a:r>
+            <a:endParaRPr lang="en-US" dirty="0"/>
+          </a:p>
+        </p:txBody>
+      </p:sp>
+      <p:sp>
+        <p:nvSpPr>
+          <p:cNvPr id="4" name="Slide Number Placeholder 3">
+            <a:extLst>
+              <a:ext uri="{FF2B5EF4-FFF2-40B4-BE49-F238E27FC236}">
+                <a16:creationId xmlns:a16="http://schemas.microsoft.com/office/drawing/2014/main" id="{9F0E4118-7A52-4EE2-9C7B-3A570D484D18}"/>
+              </a:ext>
+            </a:extLst>
+          </p:cNvPr>
+          <p:cNvSpPr>
+            <a:spLocks noGrp="1"/>
+          </p:cNvSpPr>
+          <p:nvPr>
+            <p:ph type="sldNum" sz="quarter" idx="11"/>
+          </p:nvPr>
+        </p:nvSpPr>
+        <p:spPr/>
+        <p:txBody>
+          <a:bodyPr/>
+          <a:lstStyle/>
+          <a:p>
+            <a:fld id="{65011DE2-3A5B-41D4-A661-103799ABD939}" type="slidenum">
+              <a:rPr lang="en-US" smtClean="0"/>
+              <a:t>5</a:t>
+            </a:fld>
+            <a:endParaRPr lang="en-US"/>
+          </a:p>
+        </p:txBody>
+      </p:sp>
+      <p:sp>
+        <p:nvSpPr>
+          <p:cNvPr id="5" name="TextBox 4">
+            <a:extLst>
+              <a:ext uri="{FF2B5EF4-FFF2-40B4-BE49-F238E27FC236}">
+                <a16:creationId xmlns:a16="http://schemas.microsoft.com/office/drawing/2014/main" id="{3610684D-AEFD-47DF-B21F-27E8B2515A1E}"/>
               </a:ext>
             </a:extLst>
           </p:cNvPr>
@@ -5191,8 +6999,8 @@
         </p:nvSpPr>
         <p:spPr>
           <a:xfrm>
-            <a:off x="771167" y="858981"/>
-            <a:ext cx="10243266" cy="4832092"/>
+            <a:off x="1211274" y="1668763"/>
+            <a:ext cx="9769452" cy="1872179"/>
           </a:xfrm>
           <a:prstGeom prst="rect">
             <a:avLst/>
@@ -5207,7 +7015,307 @@
           <a:p>
             <a:pPr algn="ctr"/>
             <a:r>
-              <a:rPr lang="en-US" sz="2800" b="1" dirty="0">
+              <a:rPr lang="en-US" sz="3600" b="1" dirty="0"/>
+              <a:t>Your Work is Already Python-Based</a:t>
+            </a:r>
+            <a:endParaRPr lang="en-US" sz="2800" b="1" dirty="0"/>
+          </a:p>
+          <a:p>
+            <a:pPr marL="342900" indent="-342900" algn="ctr">
+              <a:lnSpc>
+                <a:spcPct val="150000"/>
+              </a:lnSpc>
+              <a:buFont typeface="Arial" panose="020B0604020202020204" pitchFamily="34" charset="0"/>
+              <a:buChar char="•"/>
+            </a:pPr>
+            <a:r>
+              <a:rPr lang="en-US" sz="2800" dirty="0"/>
+              <a:t>Run any Python function in the pool with minimal setup</a:t>
+            </a:r>
+          </a:p>
+          <a:p>
+            <a:pPr marL="342900" indent="-342900" algn="ctr">
+              <a:lnSpc>
+                <a:spcPct val="150000"/>
+              </a:lnSpc>
+              <a:buFont typeface="Arial" panose="020B0604020202020204" pitchFamily="34" charset="0"/>
+              <a:buChar char="•"/>
+            </a:pPr>
+            <a:r>
+              <a:rPr lang="en-US" sz="2800" dirty="0"/>
+              <a:t>Use Python to seamlessly set up, execute, and process work</a:t>
+            </a:r>
+          </a:p>
+        </p:txBody>
+      </p:sp>
+    </p:spTree>
+    <p:extLst>
+      <p:ext uri="{BB962C8B-B14F-4D97-AF65-F5344CB8AC3E}">
+        <p14:creationId xmlns:p14="http://schemas.microsoft.com/office/powerpoint/2010/main" val="2827798998"/>
+      </p:ext>
+    </p:extLst>
+  </p:cSld>
+  <p:clrMapOvr>
+    <a:masterClrMapping/>
+  </p:clrMapOvr>
+</p:sld>
+</file>
+
+<file path=ppt/slides/slide6.xml><?xml version="1.0" encoding="utf-8"?>
+<p:sld xmlns:a="http://schemas.openxmlformats.org/drawingml/2006/main" xmlns:r="http://schemas.openxmlformats.org/officeDocument/2006/relationships" xmlns:p="http://schemas.openxmlformats.org/presentationml/2006/main">
+  <p:cSld>
+    <p:spTree>
+      <p:nvGrpSpPr>
+        <p:cNvPr id="1" name=""/>
+        <p:cNvGrpSpPr/>
+        <p:nvPr/>
+      </p:nvGrpSpPr>
+      <p:grpSpPr>
+        <a:xfrm>
+          <a:off x="0" y="0"/>
+          <a:ext cx="0" cy="0"/>
+          <a:chOff x="0" y="0"/>
+          <a:chExt cx="0" cy="0"/>
+        </a:xfrm>
+      </p:grpSpPr>
+      <p:sp>
+        <p:nvSpPr>
+          <p:cNvPr id="2" name="Title 1">
+            <a:extLst>
+              <a:ext uri="{FF2B5EF4-FFF2-40B4-BE49-F238E27FC236}">
+                <a16:creationId xmlns:a16="http://schemas.microsoft.com/office/drawing/2014/main" id="{B8DCEF56-AC3E-477F-8BF0-5BE3AFC2269F}"/>
+              </a:ext>
+            </a:extLst>
+          </p:cNvPr>
+          <p:cNvSpPr>
+            <a:spLocks noGrp="1"/>
+          </p:cNvSpPr>
+          <p:nvPr>
+            <p:ph type="title"/>
+          </p:nvPr>
+        </p:nvSpPr>
+        <p:spPr/>
+        <p:txBody>
+          <a:bodyPr/>
+          <a:lstStyle/>
+          <a:p>
+            <a:r>
+              <a:rPr lang="en-US" dirty="0"/>
+              <a:t>Why use HTMap?</a:t>
+            </a:r>
+          </a:p>
+        </p:txBody>
+      </p:sp>
+      <p:sp>
+        <p:nvSpPr>
+          <p:cNvPr id="3" name="Footer Placeholder 2">
+            <a:extLst>
+              <a:ext uri="{FF2B5EF4-FFF2-40B4-BE49-F238E27FC236}">
+                <a16:creationId xmlns:a16="http://schemas.microsoft.com/office/drawing/2014/main" id="{F5C6BACE-1F1D-4609-81F1-76BD7CE9C92C}"/>
+              </a:ext>
+            </a:extLst>
+          </p:cNvPr>
+          <p:cNvSpPr>
+            <a:spLocks noGrp="1"/>
+          </p:cNvSpPr>
+          <p:nvPr>
+            <p:ph type="ftr" sz="quarter" idx="10"/>
+          </p:nvPr>
+        </p:nvSpPr>
+        <p:spPr/>
+        <p:txBody>
+          <a:bodyPr/>
+          <a:lstStyle/>
+          <a:p>
+            <a:r>
+              <a:rPr lang="en-US"/>
+              <a:t>HTMap Workshop 2019-9-16</a:t>
+            </a:r>
+            <a:endParaRPr lang="en-US" dirty="0"/>
+          </a:p>
+        </p:txBody>
+      </p:sp>
+      <p:sp>
+        <p:nvSpPr>
+          <p:cNvPr id="4" name="Slide Number Placeholder 3">
+            <a:extLst>
+              <a:ext uri="{FF2B5EF4-FFF2-40B4-BE49-F238E27FC236}">
+                <a16:creationId xmlns:a16="http://schemas.microsoft.com/office/drawing/2014/main" id="{9F0E4118-7A52-4EE2-9C7B-3A570D484D18}"/>
+              </a:ext>
+            </a:extLst>
+          </p:cNvPr>
+          <p:cNvSpPr>
+            <a:spLocks noGrp="1"/>
+          </p:cNvSpPr>
+          <p:nvPr>
+            <p:ph type="sldNum" sz="quarter" idx="11"/>
+          </p:nvPr>
+        </p:nvSpPr>
+        <p:spPr/>
+        <p:txBody>
+          <a:bodyPr/>
+          <a:lstStyle/>
+          <a:p>
+            <a:fld id="{65011DE2-3A5B-41D4-A661-103799ABD939}" type="slidenum">
+              <a:rPr lang="en-US" smtClean="0"/>
+              <a:t>6</a:t>
+            </a:fld>
+            <a:endParaRPr lang="en-US"/>
+          </a:p>
+        </p:txBody>
+      </p:sp>
+      <p:sp>
+        <p:nvSpPr>
+          <p:cNvPr id="5" name="TextBox 4">
+            <a:extLst>
+              <a:ext uri="{FF2B5EF4-FFF2-40B4-BE49-F238E27FC236}">
+                <a16:creationId xmlns:a16="http://schemas.microsoft.com/office/drawing/2014/main" id="{3610684D-AEFD-47DF-B21F-27E8B2515A1E}"/>
+              </a:ext>
+            </a:extLst>
+          </p:cNvPr>
+          <p:cNvSpPr txBox="1"/>
+          <p:nvPr/>
+        </p:nvSpPr>
+        <p:spPr>
+          <a:xfrm>
+            <a:off x="1211274" y="1668763"/>
+            <a:ext cx="9769452" cy="1872179"/>
+          </a:xfrm>
+          <a:prstGeom prst="rect">
+            <a:avLst/>
+          </a:prstGeom>
+          <a:noFill/>
+        </p:spPr>
+        <p:txBody>
+          <a:bodyPr wrap="square" rtlCol="0">
+            <a:spAutoFit/>
+          </a:bodyPr>
+          <a:lstStyle/>
+          <a:p>
+            <a:pPr algn="ctr"/>
+            <a:r>
+              <a:rPr lang="en-US" sz="3600" b="1" dirty="0"/>
+              <a:t>You Want to Wrap and Manage Jobs using Python</a:t>
+            </a:r>
+            <a:endParaRPr lang="en-US" sz="2800" b="1" dirty="0"/>
+          </a:p>
+          <a:p>
+            <a:pPr marL="342900" indent="-342900" algn="ctr">
+              <a:lnSpc>
+                <a:spcPct val="150000"/>
+              </a:lnSpc>
+              <a:buFont typeface="Arial" panose="020B0604020202020204" pitchFamily="34" charset="0"/>
+              <a:buChar char="•"/>
+            </a:pPr>
+            <a:r>
+              <a:rPr lang="en-US" sz="2800" dirty="0"/>
+              <a:t>Friendlier interface than raw HTCondor</a:t>
+            </a:r>
+          </a:p>
+          <a:p>
+            <a:pPr marL="342900" indent="-342900" algn="ctr">
+              <a:lnSpc>
+                <a:spcPct val="150000"/>
+              </a:lnSpc>
+              <a:buFont typeface="Arial" panose="020B0604020202020204" pitchFamily="34" charset="0"/>
+              <a:buChar char="•"/>
+            </a:pPr>
+            <a:r>
+              <a:rPr lang="en-US" sz="2800" dirty="0"/>
+              <a:t>Programmatic control in Python instead of Bash</a:t>
+            </a:r>
+          </a:p>
+        </p:txBody>
+      </p:sp>
+    </p:spTree>
+    <p:extLst>
+      <p:ext uri="{BB962C8B-B14F-4D97-AF65-F5344CB8AC3E}">
+        <p14:creationId xmlns:p14="http://schemas.microsoft.com/office/powerpoint/2010/main" val="868836676"/>
+      </p:ext>
+    </p:extLst>
+  </p:cSld>
+  <p:clrMapOvr>
+    <a:masterClrMapping/>
+  </p:clrMapOvr>
+</p:sld>
+</file>
+
+<file path=ppt/slides/slide7.xml><?xml version="1.0" encoding="utf-8"?>
+<p:sld xmlns:a="http://schemas.openxmlformats.org/drawingml/2006/main" xmlns:r="http://schemas.openxmlformats.org/officeDocument/2006/relationships" xmlns:p="http://schemas.openxmlformats.org/presentationml/2006/main">
+  <p:cSld>
+    <p:spTree>
+      <p:nvGrpSpPr>
+        <p:cNvPr id="1" name=""/>
+        <p:cNvGrpSpPr/>
+        <p:nvPr/>
+      </p:nvGrpSpPr>
+      <p:grpSpPr>
+        <a:xfrm>
+          <a:off x="0" y="0"/>
+          <a:ext cx="0" cy="0"/>
+          <a:chOff x="0" y="0"/>
+          <a:chExt cx="0" cy="0"/>
+        </a:xfrm>
+      </p:grpSpPr>
+      <p:sp>
+        <p:nvSpPr>
+          <p:cNvPr id="2" name="Title 1">
+            <a:extLst>
+              <a:ext uri="{FF2B5EF4-FFF2-40B4-BE49-F238E27FC236}">
+                <a16:creationId xmlns:a16="http://schemas.microsoft.com/office/drawing/2014/main" id="{AF87598A-1002-492C-9FC6-D037361BB257}"/>
+              </a:ext>
+            </a:extLst>
+          </p:cNvPr>
+          <p:cNvSpPr>
+            <a:spLocks noGrp="1"/>
+          </p:cNvSpPr>
+          <p:nvPr>
+            <p:ph type="title"/>
+          </p:nvPr>
+        </p:nvSpPr>
+        <p:spPr/>
+        <p:txBody>
+          <a:bodyPr/>
+          <a:lstStyle/>
+          <a:p>
+            <a:r>
+              <a:rPr lang="en-US" dirty="0"/>
+              <a:t>Further Resources</a:t>
+            </a:r>
+          </a:p>
+        </p:txBody>
+      </p:sp>
+      <p:sp>
+        <p:nvSpPr>
+          <p:cNvPr id="3" name="TextBox 2">
+            <a:extLst>
+              <a:ext uri="{FF2B5EF4-FFF2-40B4-BE49-F238E27FC236}">
+                <a16:creationId xmlns:a16="http://schemas.microsoft.com/office/drawing/2014/main" id="{A87FC421-6AAF-4B19-B37F-9F75B12543B0}"/>
+              </a:ext>
+            </a:extLst>
+          </p:cNvPr>
+          <p:cNvSpPr txBox="1"/>
+          <p:nvPr/>
+        </p:nvSpPr>
+        <p:spPr>
+          <a:xfrm>
+            <a:off x="771167" y="858981"/>
+            <a:ext cx="10243266" cy="5632311"/>
+          </a:xfrm>
+          <a:prstGeom prst="rect">
+            <a:avLst/>
+          </a:prstGeom>
+          <a:noFill/>
+        </p:spPr>
+        <p:txBody>
+          <a:bodyPr wrap="square" rtlCol="0">
+            <a:spAutoFit/>
+          </a:bodyPr>
+          <a:lstStyle/>
+          <a:p>
+            <a:pPr algn="ctr"/>
+            <a:r>
+              <a:rPr lang="en-US" sz="2400" b="1" dirty="0">
                 <a:latin typeface="Source Sans Pro" panose="020B0503030403020204" pitchFamily="34" charset="0"/>
                 <a:ea typeface="Source Sans Pro" panose="020B0503030403020204" pitchFamily="34" charset="0"/>
               </a:rPr>
@@ -5217,7 +7325,7 @@
           <a:p>
             <a:pPr algn="ctr"/>
             <a:r>
-              <a:rPr lang="en-US" sz="2800" i="1" dirty="0">
+              <a:rPr lang="en-US" sz="2400" i="1" dirty="0">
                 <a:latin typeface="Source Sans Pro" panose="020B0503030403020204" pitchFamily="34" charset="0"/>
                 <a:ea typeface="Source Sans Pro" panose="020B0503030403020204" pitchFamily="34" charset="0"/>
               </a:rPr>
@@ -5227,21 +7335,21 @@
           <a:p>
             <a:pPr algn="ctr"/>
             <a:r>
-              <a:rPr lang="en-US" sz="2800" dirty="0">
+              <a:rPr lang="en-US" sz="2400" dirty="0">
                 <a:latin typeface="Source Sans Pro" panose="020B0503030403020204" pitchFamily="34" charset="0"/>
                 <a:ea typeface="Source Sans Pro" panose="020B0503030403020204" pitchFamily="34" charset="0"/>
                 <a:hlinkClick r:id="rId2"/>
               </a:rPr>
               <a:t>https://htmap.readthedocs.io/</a:t>
             </a:r>
-            <a:endParaRPr lang="en-US" sz="2800" dirty="0">
+            <a:endParaRPr lang="en-US" sz="2400" dirty="0">
               <a:latin typeface="Source Sans Pro" panose="020B0503030403020204" pitchFamily="34" charset="0"/>
               <a:ea typeface="Source Sans Pro" panose="020B0503030403020204" pitchFamily="34" charset="0"/>
             </a:endParaRPr>
           </a:p>
           <a:p>
             <a:pPr algn="ctr"/>
-            <a:endParaRPr lang="en-US" sz="2800" dirty="0">
+            <a:endParaRPr lang="en-US" sz="2400" dirty="0">
               <a:latin typeface="Source Sans Pro" panose="020B0503030403020204" pitchFamily="34" charset="0"/>
               <a:ea typeface="Source Sans Pro" panose="020B0503030403020204" pitchFamily="34" charset="0"/>
             </a:endParaRPr>
@@ -5249,7 +7357,49 @@
           <a:p>
             <a:pPr algn="ctr"/>
             <a:r>
-              <a:rPr lang="en-US" sz="2800" b="1" dirty="0">
+              <a:rPr lang="en-US" sz="2400" b="1" dirty="0">
+                <a:latin typeface="Source Sans Pro" panose="020B0503030403020204" pitchFamily="34" charset="0"/>
+                <a:ea typeface="Source Sans Pro" panose="020B0503030403020204" pitchFamily="34" charset="0"/>
+              </a:rPr>
+              <a:t>Workshop Materials</a:t>
+            </a:r>
+          </a:p>
+          <a:p>
+            <a:pPr algn="ctr"/>
+            <a:r>
+              <a:rPr lang="en-US" sz="2400" i="1" dirty="0">
+                <a:latin typeface="Source Sans Pro" panose="020B0503030403020204" pitchFamily="34" charset="0"/>
+                <a:ea typeface="Source Sans Pro" panose="020B0503030403020204" pitchFamily="34" charset="0"/>
+              </a:rPr>
+              <a:t>(including canonical solutions to examples)</a:t>
+            </a:r>
+          </a:p>
+          <a:p>
+            <a:pPr algn="ctr"/>
+            <a:r>
+              <a:rPr lang="en-US" sz="2400" dirty="0">
+                <a:latin typeface="Source Sans Pro" panose="020B0503030403020204" pitchFamily="34" charset="0"/>
+                <a:ea typeface="Source Sans Pro" panose="020B0503030403020204" pitchFamily="34" charset="0"/>
+                <a:hlinkClick r:id="rId3"/>
+              </a:rPr>
+              <a:t>https://github.com/htcondor/htmap</a:t>
+            </a:r>
+            <a:endParaRPr lang="en-US" sz="2400" dirty="0">
+              <a:latin typeface="Source Sans Pro" panose="020B0503030403020204" pitchFamily="34" charset="0"/>
+              <a:ea typeface="Source Sans Pro" panose="020B0503030403020204" pitchFamily="34" charset="0"/>
+            </a:endParaRPr>
+          </a:p>
+          <a:p>
+            <a:pPr algn="ctr"/>
+            <a:endParaRPr lang="en-US" sz="2400" dirty="0">
+              <a:latin typeface="Source Sans Pro" panose="020B0503030403020204" pitchFamily="34" charset="0"/>
+              <a:ea typeface="Source Sans Pro" panose="020B0503030403020204" pitchFamily="34" charset="0"/>
+            </a:endParaRPr>
+          </a:p>
+          <a:p>
+            <a:pPr algn="ctr"/>
+            <a:r>
+              <a:rPr lang="en-US" sz="2400" b="1" dirty="0">
                 <a:latin typeface="Source Sans Pro" panose="020B0503030403020204" pitchFamily="34" charset="0"/>
                 <a:ea typeface="Source Sans Pro" panose="020B0503030403020204" pitchFamily="34" charset="0"/>
               </a:rPr>
@@ -5259,34 +7409,39 @@
           <a:p>
             <a:pPr algn="ctr"/>
             <a:r>
-              <a:rPr lang="en-US" sz="2800" i="1" dirty="0">
+              <a:rPr lang="en-US" sz="2400" i="1" dirty="0">
                 <a:latin typeface="Source Sans Pro" panose="020B0503030403020204" pitchFamily="34" charset="0"/>
                 <a:ea typeface="Source Sans Pro" panose="020B0503030403020204" pitchFamily="34" charset="0"/>
               </a:rPr>
-              <a:t>(including issue tracker)</a:t>
+              <a:t>(including issue tracker and source code)</a:t>
             </a:r>
           </a:p>
           <a:p>
             <a:pPr algn="ctr"/>
             <a:r>
-              <a:rPr lang="en-US" sz="2800" dirty="0">
-                <a:hlinkClick r:id="rId3"/>
+              <a:rPr lang="en-US" sz="2400" dirty="0">
+                <a:latin typeface="Source Sans Pro" panose="020B0503030403020204" pitchFamily="34" charset="0"/>
+                <a:ea typeface="Source Sans Pro" panose="020B0503030403020204" pitchFamily="34" charset="0"/>
+                <a:hlinkClick r:id="rId4"/>
               </a:rPr>
-              <a:t>https://github.com/htcondor/htmap</a:t>
-            </a:r>
-            <a:endParaRPr lang="en-US" sz="2800" dirty="0"/>
-          </a:p>
-          <a:p>
-            <a:pPr algn="ctr"/>
-            <a:endParaRPr lang="en-US" sz="2800" dirty="0">
+              <a:t>https://github.com/CHTC/htmap-workshop-materials</a:t>
+            </a:r>
+            <a:endParaRPr lang="en-US" sz="2400" dirty="0">
               <a:latin typeface="Source Sans Pro" panose="020B0503030403020204" pitchFamily="34" charset="0"/>
               <a:ea typeface="Source Sans Pro" panose="020B0503030403020204" pitchFamily="34" charset="0"/>
             </a:endParaRPr>
           </a:p>
           <a:p>
             <a:pPr algn="ctr"/>
-            <a:r>
-              <a:rPr lang="en-US" sz="2800" b="1" dirty="0">
+            <a:endParaRPr lang="en-US" sz="2400" dirty="0">
+              <a:latin typeface="Source Sans Pro" panose="020B0503030403020204" pitchFamily="34" charset="0"/>
+              <a:ea typeface="Source Sans Pro" panose="020B0503030403020204" pitchFamily="34" charset="0"/>
+            </a:endParaRPr>
+          </a:p>
+          <a:p>
+            <a:pPr algn="ctr"/>
+            <a:r>
+              <a:rPr lang="en-US" sz="2400" b="1" dirty="0">
                 <a:latin typeface="Source Sans Pro" panose="020B0503030403020204" pitchFamily="34" charset="0"/>
                 <a:ea typeface="Source Sans Pro" panose="020B0503030403020204" pitchFamily="34" charset="0"/>
               </a:rPr>
@@ -5296,7 +7451,7 @@
           <a:p>
             <a:pPr algn="ctr"/>
             <a:r>
-              <a:rPr lang="en-US" sz="2800" i="1" dirty="0">
+              <a:rPr lang="en-US" sz="2400" i="1" dirty="0">
                 <a:latin typeface="Source Sans Pro" panose="020B0503030403020204" pitchFamily="34" charset="0"/>
                 <a:ea typeface="Source Sans Pro" panose="020B0503030403020204" pitchFamily="34" charset="0"/>
               </a:rPr>
@@ -5306,7 +7461,7 @@
           <a:p>
             <a:pPr algn="ctr"/>
             <a:r>
-              <a:rPr lang="en-US" sz="2800" dirty="0">
+              <a:rPr lang="en-US" sz="2400" dirty="0">
                 <a:latin typeface="Source Sans Pro" panose="020B0503030403020204" pitchFamily="34" charset="0"/>
                 <a:ea typeface="Source Sans Pro" panose="020B0503030403020204" pitchFamily="34" charset="0"/>
               </a:rPr>
@@ -5366,7 +7521,7 @@
           <a:p>
             <a:fld id="{65011DE2-3A5B-41D4-A661-103799ABD939}" type="slidenum">
               <a:rPr lang="en-US" smtClean="0"/>
-              <a:t>3</a:t>
+              <a:t>7</a:t>
             </a:fld>
             <a:endParaRPr lang="en-US"/>
           </a:p>

</xml_diff>

<commit_message>
flesh out slides, fix some formatting
</commit_message>
<xml_diff>
--- a/slides/HTMapWorkshop.pptx
+++ b/slides/HTMapWorkshop.pptx
@@ -6,38 +6,35 @@
     <p:sldMasterId id="2147483663" r:id="rId2"/>
   </p:sldMasterIdLst>
   <p:notesMasterIdLst>
-    <p:notesMasterId r:id="rId17"/>
+    <p:notesMasterId r:id="rId14"/>
   </p:notesMasterIdLst>
   <p:sldIdLst>
     <p:sldId id="256" r:id="rId3"/>
-    <p:sldId id="258" r:id="rId4"/>
-    <p:sldId id="259" r:id="rId5"/>
-    <p:sldId id="261" r:id="rId6"/>
-    <p:sldId id="262" r:id="rId7"/>
-    <p:sldId id="264" r:id="rId8"/>
-    <p:sldId id="265" r:id="rId9"/>
-    <p:sldId id="266" r:id="rId10"/>
-    <p:sldId id="267" r:id="rId11"/>
-    <p:sldId id="268" r:id="rId12"/>
-    <p:sldId id="269" r:id="rId13"/>
-    <p:sldId id="271" r:id="rId14"/>
-    <p:sldId id="270" r:id="rId15"/>
-    <p:sldId id="257" r:id="rId16"/>
+    <p:sldId id="272" r:id="rId4"/>
+    <p:sldId id="258" r:id="rId5"/>
+    <p:sldId id="259" r:id="rId6"/>
+    <p:sldId id="261" r:id="rId7"/>
+    <p:sldId id="262" r:id="rId8"/>
+    <p:sldId id="264" r:id="rId9"/>
+    <p:sldId id="265" r:id="rId10"/>
+    <p:sldId id="271" r:id="rId11"/>
+    <p:sldId id="270" r:id="rId12"/>
+    <p:sldId id="257" r:id="rId13"/>
   </p:sldIdLst>
   <p:sldSz cx="12192000" cy="6858000"/>
   <p:notesSz cx="6858000" cy="9144000"/>
   <p:embeddedFontLst>
     <p:embeddedFont>
       <p:font typeface="Source Code Pro" panose="020B0509030403020204" pitchFamily="49" charset="0"/>
-      <p:regular r:id="rId18"/>
-      <p:bold r:id="rId19"/>
+      <p:regular r:id="rId15"/>
+      <p:bold r:id="rId16"/>
     </p:embeddedFont>
     <p:embeddedFont>
       <p:font typeface="Source Sans Pro" panose="020B0503030403020204" pitchFamily="34" charset="0"/>
-      <p:regular r:id="rId20"/>
-      <p:bold r:id="rId21"/>
-      <p:italic r:id="rId22"/>
-      <p:boldItalic r:id="rId23"/>
+      <p:regular r:id="rId17"/>
+      <p:bold r:id="rId18"/>
+      <p:italic r:id="rId19"/>
+      <p:boldItalic r:id="rId20"/>
     </p:embeddedFont>
   </p:embeddedFontLst>
   <p:defaultTextStyle>
@@ -145,6 +142,7 @@
         </p14:section>
         <p14:section name="Prep" id="{E1639E03-5980-4F5F-A7C0-D5F517DA8D99}">
           <p14:sldIdLst>
+            <p14:sldId id="272"/>
             <p14:sldId id="258"/>
           </p14:sldIdLst>
         </p14:section>
@@ -159,10 +157,6 @@
         <p14:section name="Tutorial" id="{5C12A74A-AE5E-4371-A436-F91DF2CE42C0}">
           <p14:sldIdLst>
             <p14:sldId id="265"/>
-            <p14:sldId id="266"/>
-            <p14:sldId id="267"/>
-            <p14:sldId id="268"/>
-            <p14:sldId id="269"/>
           </p14:sldIdLst>
         </p14:section>
         <p14:section name="Break" id="{BE78CA91-FBA4-4C5E-9337-0FC14AEEED27}">
@@ -276,7 +270,7 @@
             <a:fld id="{C2190C43-0954-4454-9B3A-7899E18A0806}" type="datetimeFigureOut">
               <a:rPr lang="en-US" smtClean="0"/>
               <a:pPr/>
-              <a:t>9/4/2019</a:t>
+              <a:t>9/6/2019</a:t>
             </a:fld>
             <a:endParaRPr lang="en-US" dirty="0"/>
           </a:p>
@@ -5001,7 +4995,7 @@
           <p:cNvPr id="2" name="Title 1">
             <a:extLst>
               <a:ext uri="{FF2B5EF4-FFF2-40B4-BE49-F238E27FC236}">
-                <a16:creationId xmlns:a16="http://schemas.microsoft.com/office/drawing/2014/main" id="{F09A4240-021F-4DE5-B2A0-051590DE7260}"/>
+                <a16:creationId xmlns:a16="http://schemas.microsoft.com/office/drawing/2014/main" id="{4289BA8B-0B39-4DB3-8945-30EA0162A6F2}"/>
               </a:ext>
             </a:extLst>
           </p:cNvPr>
@@ -5019,7 +5013,7 @@
           <a:p>
             <a:r>
               <a:rPr lang="en-US" dirty="0"/>
-              <a:t>Tutorial Topics</a:t>
+              <a:t>Example Project: Book Analysis</a:t>
             </a:r>
           </a:p>
         </p:txBody>
@@ -5029,7 +5023,7 @@
           <p:cNvPr id="3" name="Footer Placeholder 2">
             <a:extLst>
               <a:ext uri="{FF2B5EF4-FFF2-40B4-BE49-F238E27FC236}">
-                <a16:creationId xmlns:a16="http://schemas.microsoft.com/office/drawing/2014/main" id="{2EDE52F1-1C1C-4458-B3EE-01CDB1113FDD}"/>
+                <a16:creationId xmlns:a16="http://schemas.microsoft.com/office/drawing/2014/main" id="{879DFF3E-8371-4FDB-8CF6-6ED53BD101D6}"/>
               </a:ext>
             </a:extLst>
           </p:cNvPr>
@@ -5058,7 +5052,7 @@
           <p:cNvPr id="4" name="Slide Number Placeholder 3">
             <a:extLst>
               <a:ext uri="{FF2B5EF4-FFF2-40B4-BE49-F238E27FC236}">
-                <a16:creationId xmlns:a16="http://schemas.microsoft.com/office/drawing/2014/main" id="{1833090F-1C82-443D-A4D5-16490A581F1D}"/>
+                <a16:creationId xmlns:a16="http://schemas.microsoft.com/office/drawing/2014/main" id="{7D14373A-351E-45D3-9446-83A532CB3C35}"/>
               </a:ext>
             </a:extLst>
           </p:cNvPr>
@@ -5087,7 +5081,7 @@
           <p:cNvPr id="5" name="TextBox 4">
             <a:extLst>
               <a:ext uri="{FF2B5EF4-FFF2-40B4-BE49-F238E27FC236}">
-                <a16:creationId xmlns:a16="http://schemas.microsoft.com/office/drawing/2014/main" id="{C74DFAE3-68E0-432E-85CD-38A0F42DE08A}"/>
+                <a16:creationId xmlns:a16="http://schemas.microsoft.com/office/drawing/2014/main" id="{011506DA-A5D3-4E82-8895-2B77C8AC5C46}"/>
               </a:ext>
             </a:extLst>
           </p:cNvPr>
@@ -5096,8 +5090,8 @@
         </p:nvSpPr>
         <p:spPr>
           <a:xfrm>
-            <a:off x="2641218" y="1100031"/>
-            <a:ext cx="8668466" cy="3709349"/>
+            <a:off x="2057400" y="1148158"/>
+            <a:ext cx="8312102" cy="4200381"/>
           </a:xfrm>
           <a:prstGeom prst="rect">
             <a:avLst/>
@@ -5110,78 +5104,96 @@
           </a:bodyPr>
           <a:lstStyle/>
           <a:p>
-            <a:pPr marL="342900" indent="-342900">
+            <a:r>
+              <a:rPr lang="en-US" sz="3200" b="1" u="sng" dirty="0">
+                <a:latin typeface="Source Sans Pro" panose="020B0503030403020204" pitchFamily="34" charset="0"/>
+                <a:ea typeface="Source Sans Pro" panose="020B0503030403020204" pitchFamily="34" charset="0"/>
+              </a:rPr>
+              <a:t>Goals</a:t>
+            </a:r>
+            <a:endParaRPr lang="en-US" sz="3200" u="sng" dirty="0">
+              <a:latin typeface="Source Sans Pro" panose="020B0503030403020204" pitchFamily="34" charset="0"/>
+              <a:ea typeface="Source Sans Pro" panose="020B0503030403020204" pitchFamily="34" charset="0"/>
+            </a:endParaRPr>
+          </a:p>
+          <a:p>
+            <a:pPr marL="285750" indent="-285750">
               <a:lnSpc>
                 <a:spcPct val="150000"/>
               </a:lnSpc>
-              <a:buFont typeface="+mj-lt"/>
-              <a:buAutoNum type="arabicPeriod"/>
+              <a:buFont typeface="Arial" panose="020B0604020202020204" pitchFamily="34" charset="0"/>
+              <a:buChar char="•"/>
             </a:pPr>
             <a:r>
               <a:rPr lang="en-US" sz="3200" dirty="0">
                 <a:latin typeface="Source Sans Pro" panose="020B0503030403020204" pitchFamily="34" charset="0"/>
+                <a:ea typeface="Source Sans Pro" panose="020B0503030403020204" pitchFamily="34" charset="0"/>
               </a:rPr>
-              <a:t>Basic Map Creation and Management</a:t>
-            </a:r>
-          </a:p>
-          <a:p>
-            <a:pPr marL="342900" indent="-342900">
+              <a:t>Work on a more concrete problem</a:t>
+            </a:r>
+          </a:p>
+          <a:p>
+            <a:pPr marL="285750" indent="-285750">
               <a:lnSpc>
                 <a:spcPct val="150000"/>
               </a:lnSpc>
-              <a:buFont typeface="+mj-lt"/>
-              <a:buAutoNum type="arabicPeriod"/>
+              <a:buFont typeface="Arial" panose="020B0604020202020204" pitchFamily="34" charset="0"/>
+              <a:buChar char="•"/>
             </a:pPr>
             <a:r>
               <a:rPr lang="en-US" sz="3200" dirty="0">
                 <a:latin typeface="Source Sans Pro" panose="020B0503030403020204" pitchFamily="34" charset="0"/>
+                <a:ea typeface="Source Sans Pro" panose="020B0503030403020204" pitchFamily="34" charset="0"/>
               </a:rPr>
-              <a:t>Working with Input Files</a:t>
-            </a:r>
-          </a:p>
-          <a:p>
-            <a:pPr marL="342900" indent="-342900">
+              <a:t>Write reusable scripts</a:t>
+            </a:r>
+          </a:p>
+          <a:p>
+            <a:pPr marL="285750" indent="-285750">
               <a:lnSpc>
                 <a:spcPct val="150000"/>
               </a:lnSpc>
-              <a:buFont typeface="+mj-lt"/>
-              <a:buAutoNum type="arabicPeriod"/>
+              <a:buFont typeface="Arial" panose="020B0604020202020204" pitchFamily="34" charset="0"/>
+              <a:buChar char="•"/>
             </a:pPr>
             <a:r>
               <a:rPr lang="en-US" sz="3200" dirty="0">
                 <a:latin typeface="Source Sans Pro" panose="020B0503030403020204" pitchFamily="34" charset="0"/>
+                <a:ea typeface="Source Sans Pro" panose="020B0503030403020204" pitchFamily="34" charset="0"/>
               </a:rPr>
-              <a:t>Talking to HTCondor</a:t>
-            </a:r>
-          </a:p>
-          <a:p>
-            <a:pPr marL="342900" indent="-342900">
+              <a:t>Use some advanced features of HTMap</a:t>
+            </a:r>
+          </a:p>
+          <a:p>
+            <a:pPr marL="1200150" lvl="2" indent="-285750">
               <a:lnSpc>
                 <a:spcPct val="150000"/>
               </a:lnSpc>
-              <a:buFont typeface="+mj-lt"/>
-              <a:buAutoNum type="arabicPeriod"/>
+              <a:buFont typeface="Arial" panose="020B0604020202020204" pitchFamily="34" charset="0"/>
+              <a:buChar char="•"/>
             </a:pPr>
             <a:r>
-              <a:rPr lang="en-US" sz="3200" b="1" dirty="0">
-                <a:latin typeface="Source Sans Pro" panose="020B0503030403020204" pitchFamily="34" charset="0"/>
+              <a:rPr lang="en-US" sz="3200" dirty="0">
+                <a:latin typeface="Source Sans Pro" panose="020B0503030403020204" pitchFamily="34" charset="0"/>
+                <a:ea typeface="Source Sans Pro" panose="020B0503030403020204" pitchFamily="34" charset="0"/>
               </a:rPr>
-              <a:t>Advanced Map Creation</a:t>
-            </a:r>
-          </a:p>
-          <a:p>
-            <a:pPr marL="342900" indent="-342900">
+              <a:t>CLI for map management</a:t>
+            </a:r>
+          </a:p>
+          <a:p>
+            <a:pPr marL="1200150" lvl="2" indent="-285750">
               <a:lnSpc>
                 <a:spcPct val="150000"/>
               </a:lnSpc>
-              <a:buFont typeface="+mj-lt"/>
-              <a:buAutoNum type="arabicPeriod"/>
+              <a:buFont typeface="Arial" panose="020B0604020202020204" pitchFamily="34" charset="0"/>
+              <a:buChar char="•"/>
             </a:pPr>
             <a:r>
               <a:rPr lang="en-US" sz="3200" dirty="0">
                 <a:latin typeface="Source Sans Pro" panose="020B0503030403020204" pitchFamily="34" charset="0"/>
+                <a:ea typeface="Source Sans Pro" panose="020B0503030403020204" pitchFamily="34" charset="0"/>
               </a:rPr>
-              <a:t>Dealing with Errors</a:t>
+              <a:t>Transferring output files</a:t>
             </a:r>
           </a:p>
         </p:txBody>
@@ -5189,7 +5201,7 @@
     </p:spTree>
     <p:extLst>
       <p:ext uri="{BB962C8B-B14F-4D97-AF65-F5344CB8AC3E}">
-        <p14:creationId xmlns:p14="http://schemas.microsoft.com/office/powerpoint/2010/main" val="241390253"/>
+        <p14:creationId xmlns:p14="http://schemas.microsoft.com/office/powerpoint/2010/main" val="1085955525"/>
       </p:ext>
     </p:extLst>
   </p:cSld>
@@ -5221,643 +5233,6 @@
           <p:cNvPr id="2" name="Title 1">
             <a:extLst>
               <a:ext uri="{FF2B5EF4-FFF2-40B4-BE49-F238E27FC236}">
-                <a16:creationId xmlns:a16="http://schemas.microsoft.com/office/drawing/2014/main" id="{F09A4240-021F-4DE5-B2A0-051590DE7260}"/>
-              </a:ext>
-            </a:extLst>
-          </p:cNvPr>
-          <p:cNvSpPr>
-            <a:spLocks noGrp="1"/>
-          </p:cNvSpPr>
-          <p:nvPr>
-            <p:ph type="title"/>
-          </p:nvPr>
-        </p:nvSpPr>
-        <p:spPr/>
-        <p:txBody>
-          <a:bodyPr/>
-          <a:lstStyle/>
-          <a:p>
-            <a:r>
-              <a:rPr lang="en-US" dirty="0"/>
-              <a:t>Tutorial Topics</a:t>
-            </a:r>
-          </a:p>
-        </p:txBody>
-      </p:sp>
-      <p:sp>
-        <p:nvSpPr>
-          <p:cNvPr id="3" name="Footer Placeholder 2">
-            <a:extLst>
-              <a:ext uri="{FF2B5EF4-FFF2-40B4-BE49-F238E27FC236}">
-                <a16:creationId xmlns:a16="http://schemas.microsoft.com/office/drawing/2014/main" id="{2EDE52F1-1C1C-4458-B3EE-01CDB1113FDD}"/>
-              </a:ext>
-            </a:extLst>
-          </p:cNvPr>
-          <p:cNvSpPr>
-            <a:spLocks noGrp="1"/>
-          </p:cNvSpPr>
-          <p:nvPr>
-            <p:ph type="ftr" sz="quarter" idx="10"/>
-          </p:nvPr>
-        </p:nvSpPr>
-        <p:spPr/>
-        <p:txBody>
-          <a:bodyPr/>
-          <a:lstStyle/>
-          <a:p>
-            <a:r>
-              <a:rPr lang="en-US"/>
-              <a:t>HTMap Workshop 2019-9-16</a:t>
-            </a:r>
-            <a:endParaRPr lang="en-US" dirty="0"/>
-          </a:p>
-        </p:txBody>
-      </p:sp>
-      <p:sp>
-        <p:nvSpPr>
-          <p:cNvPr id="4" name="Slide Number Placeholder 3">
-            <a:extLst>
-              <a:ext uri="{FF2B5EF4-FFF2-40B4-BE49-F238E27FC236}">
-                <a16:creationId xmlns:a16="http://schemas.microsoft.com/office/drawing/2014/main" id="{1833090F-1C82-443D-A4D5-16490A581F1D}"/>
-              </a:ext>
-            </a:extLst>
-          </p:cNvPr>
-          <p:cNvSpPr>
-            <a:spLocks noGrp="1"/>
-          </p:cNvSpPr>
-          <p:nvPr>
-            <p:ph type="sldNum" sz="quarter" idx="11"/>
-          </p:nvPr>
-        </p:nvSpPr>
-        <p:spPr/>
-        <p:txBody>
-          <a:bodyPr/>
-          <a:lstStyle/>
-          <a:p>
-            <a:fld id="{65011DE2-3A5B-41D4-A661-103799ABD939}" type="slidenum">
-              <a:rPr lang="en-US" smtClean="0"/>
-              <a:t>11</a:t>
-            </a:fld>
-            <a:endParaRPr lang="en-US"/>
-          </a:p>
-        </p:txBody>
-      </p:sp>
-      <p:sp>
-        <p:nvSpPr>
-          <p:cNvPr id="5" name="TextBox 4">
-            <a:extLst>
-              <a:ext uri="{FF2B5EF4-FFF2-40B4-BE49-F238E27FC236}">
-                <a16:creationId xmlns:a16="http://schemas.microsoft.com/office/drawing/2014/main" id="{C74DFAE3-68E0-432E-85CD-38A0F42DE08A}"/>
-              </a:ext>
-            </a:extLst>
-          </p:cNvPr>
-          <p:cNvSpPr txBox="1"/>
-          <p:nvPr/>
-        </p:nvSpPr>
-        <p:spPr>
-          <a:xfrm>
-            <a:off x="2641218" y="1100031"/>
-            <a:ext cx="8668466" cy="3709349"/>
-          </a:xfrm>
-          <a:prstGeom prst="rect">
-            <a:avLst/>
-          </a:prstGeom>
-          <a:noFill/>
-        </p:spPr>
-        <p:txBody>
-          <a:bodyPr wrap="square" rtlCol="0">
-            <a:spAutoFit/>
-          </a:bodyPr>
-          <a:lstStyle/>
-          <a:p>
-            <a:pPr marL="342900" indent="-342900">
-              <a:lnSpc>
-                <a:spcPct val="150000"/>
-              </a:lnSpc>
-              <a:buFont typeface="+mj-lt"/>
-              <a:buAutoNum type="arabicPeriod"/>
-            </a:pPr>
-            <a:r>
-              <a:rPr lang="en-US" sz="3200" dirty="0">
-                <a:latin typeface="Source Sans Pro" panose="020B0503030403020204" pitchFamily="34" charset="0"/>
-              </a:rPr>
-              <a:t>Basic Map Creation and Management</a:t>
-            </a:r>
-          </a:p>
-          <a:p>
-            <a:pPr marL="342900" indent="-342900">
-              <a:lnSpc>
-                <a:spcPct val="150000"/>
-              </a:lnSpc>
-              <a:buFont typeface="+mj-lt"/>
-              <a:buAutoNum type="arabicPeriod"/>
-            </a:pPr>
-            <a:r>
-              <a:rPr lang="en-US" sz="3200" dirty="0">
-                <a:latin typeface="Source Sans Pro" panose="020B0503030403020204" pitchFamily="34" charset="0"/>
-              </a:rPr>
-              <a:t>Working with Input Files</a:t>
-            </a:r>
-          </a:p>
-          <a:p>
-            <a:pPr marL="342900" indent="-342900">
-              <a:lnSpc>
-                <a:spcPct val="150000"/>
-              </a:lnSpc>
-              <a:buFont typeface="+mj-lt"/>
-              <a:buAutoNum type="arabicPeriod"/>
-            </a:pPr>
-            <a:r>
-              <a:rPr lang="en-US" sz="3200" dirty="0">
-                <a:latin typeface="Source Sans Pro" panose="020B0503030403020204" pitchFamily="34" charset="0"/>
-              </a:rPr>
-              <a:t>Talking to HTCondor</a:t>
-            </a:r>
-          </a:p>
-          <a:p>
-            <a:pPr marL="342900" indent="-342900">
-              <a:lnSpc>
-                <a:spcPct val="150000"/>
-              </a:lnSpc>
-              <a:buFont typeface="+mj-lt"/>
-              <a:buAutoNum type="arabicPeriod"/>
-            </a:pPr>
-            <a:r>
-              <a:rPr lang="en-US" sz="3200" dirty="0">
-                <a:latin typeface="Source Sans Pro" panose="020B0503030403020204" pitchFamily="34" charset="0"/>
-              </a:rPr>
-              <a:t>Advanced Map Creation</a:t>
-            </a:r>
-          </a:p>
-          <a:p>
-            <a:pPr marL="342900" indent="-342900">
-              <a:lnSpc>
-                <a:spcPct val="150000"/>
-              </a:lnSpc>
-              <a:buFont typeface="+mj-lt"/>
-              <a:buAutoNum type="arabicPeriod"/>
-            </a:pPr>
-            <a:r>
-              <a:rPr lang="en-US" sz="3200" b="1" dirty="0">
-                <a:latin typeface="Source Sans Pro" panose="020B0503030403020204" pitchFamily="34" charset="0"/>
-              </a:rPr>
-              <a:t>Dealing with Errors</a:t>
-            </a:r>
-          </a:p>
-        </p:txBody>
-      </p:sp>
-    </p:spTree>
-    <p:extLst>
-      <p:ext uri="{BB962C8B-B14F-4D97-AF65-F5344CB8AC3E}">
-        <p14:creationId xmlns:p14="http://schemas.microsoft.com/office/powerpoint/2010/main" val="2133373854"/>
-      </p:ext>
-    </p:extLst>
-  </p:cSld>
-  <p:clrMapOvr>
-    <a:masterClrMapping/>
-  </p:clrMapOvr>
-</p:sld>
-</file>
-
-<file path=ppt/slides/slide12.xml><?xml version="1.0" encoding="utf-8"?>
-<p:sld xmlns:a="http://schemas.openxmlformats.org/drawingml/2006/main" xmlns:r="http://schemas.openxmlformats.org/officeDocument/2006/relationships" xmlns:p="http://schemas.openxmlformats.org/presentationml/2006/main">
-  <p:cSld>
-    <p:spTree>
-      <p:nvGrpSpPr>
-        <p:cNvPr id="1" name=""/>
-        <p:cNvGrpSpPr/>
-        <p:nvPr/>
-      </p:nvGrpSpPr>
-      <p:grpSpPr>
-        <a:xfrm>
-          <a:off x="0" y="0"/>
-          <a:ext cx="0" cy="0"/>
-          <a:chOff x="0" y="0"/>
-          <a:chExt cx="0" cy="0"/>
-        </a:xfrm>
-      </p:grpSpPr>
-      <p:sp>
-        <p:nvSpPr>
-          <p:cNvPr id="3" name="Footer Placeholder 2">
-            <a:extLst>
-              <a:ext uri="{FF2B5EF4-FFF2-40B4-BE49-F238E27FC236}">
-                <a16:creationId xmlns:a16="http://schemas.microsoft.com/office/drawing/2014/main" id="{68CD3B55-49E1-4F61-B15F-C9FF4087EFE1}"/>
-              </a:ext>
-            </a:extLst>
-          </p:cNvPr>
-          <p:cNvSpPr>
-            <a:spLocks noGrp="1"/>
-          </p:cNvSpPr>
-          <p:nvPr>
-            <p:ph type="ftr" sz="quarter" idx="10"/>
-          </p:nvPr>
-        </p:nvSpPr>
-        <p:spPr/>
-        <p:txBody>
-          <a:bodyPr/>
-          <a:lstStyle/>
-          <a:p>
-            <a:r>
-              <a:rPr lang="en-US"/>
-              <a:t>HTMap Workshop 2019-9-16</a:t>
-            </a:r>
-            <a:endParaRPr lang="en-US" dirty="0"/>
-          </a:p>
-        </p:txBody>
-      </p:sp>
-      <p:sp>
-        <p:nvSpPr>
-          <p:cNvPr id="4" name="Slide Number Placeholder 3">
-            <a:extLst>
-              <a:ext uri="{FF2B5EF4-FFF2-40B4-BE49-F238E27FC236}">
-                <a16:creationId xmlns:a16="http://schemas.microsoft.com/office/drawing/2014/main" id="{4908D343-780E-4F9E-BBF7-C030BA74D5FE}"/>
-              </a:ext>
-            </a:extLst>
-          </p:cNvPr>
-          <p:cNvSpPr>
-            <a:spLocks noGrp="1"/>
-          </p:cNvSpPr>
-          <p:nvPr>
-            <p:ph type="sldNum" sz="quarter" idx="11"/>
-          </p:nvPr>
-        </p:nvSpPr>
-        <p:spPr/>
-        <p:txBody>
-          <a:bodyPr/>
-          <a:lstStyle/>
-          <a:p>
-            <a:fld id="{65011DE2-3A5B-41D4-A661-103799ABD939}" type="slidenum">
-              <a:rPr lang="en-US" smtClean="0"/>
-              <a:t>12</a:t>
-            </a:fld>
-            <a:endParaRPr lang="en-US"/>
-          </a:p>
-        </p:txBody>
-      </p:sp>
-      <p:sp>
-        <p:nvSpPr>
-          <p:cNvPr id="5" name="TextBox 4">
-            <a:extLst>
-              <a:ext uri="{FF2B5EF4-FFF2-40B4-BE49-F238E27FC236}">
-                <a16:creationId xmlns:a16="http://schemas.microsoft.com/office/drawing/2014/main" id="{AEF883F7-46DC-48B6-8653-57AA27EBFADD}"/>
-              </a:ext>
-            </a:extLst>
-          </p:cNvPr>
-          <p:cNvSpPr txBox="1"/>
-          <p:nvPr/>
-        </p:nvSpPr>
-        <p:spPr>
-          <a:xfrm>
-            <a:off x="1713067" y="839820"/>
-            <a:ext cx="8765866" cy="3840795"/>
-          </a:xfrm>
-          <a:prstGeom prst="rect">
-            <a:avLst/>
-          </a:prstGeom>
-          <a:noFill/>
-        </p:spPr>
-        <p:txBody>
-          <a:bodyPr wrap="square" rtlCol="0">
-            <a:spAutoFit/>
-          </a:bodyPr>
-          <a:lstStyle/>
-          <a:p>
-            <a:pPr algn="ctr"/>
-            <a:r>
-              <a:rPr lang="en-US" sz="8000" b="1" dirty="0">
-                <a:latin typeface="Source Sans Pro" panose="020B0503030403020204" pitchFamily="34" charset="0"/>
-                <a:ea typeface="Source Sans Pro" panose="020B0503030403020204" pitchFamily="34" charset="0"/>
-              </a:rPr>
-              <a:t>Break!</a:t>
-            </a:r>
-          </a:p>
-          <a:p>
-            <a:pPr algn="ctr"/>
-            <a:endParaRPr lang="en-US" sz="2800" dirty="0">
-              <a:latin typeface="Source Sans Pro" panose="020B0503030403020204" pitchFamily="34" charset="0"/>
-              <a:ea typeface="Source Sans Pro" panose="020B0503030403020204" pitchFamily="34" charset="0"/>
-            </a:endParaRPr>
-          </a:p>
-          <a:p>
-            <a:pPr marL="285750" indent="-285750">
-              <a:lnSpc>
-                <a:spcPct val="150000"/>
-              </a:lnSpc>
-              <a:buFont typeface="Arial" panose="020B0604020202020204" pitchFamily="34" charset="0"/>
-              <a:buChar char="•"/>
-            </a:pPr>
-            <a:r>
-              <a:rPr lang="en-US" sz="2800" dirty="0">
-                <a:latin typeface="Source Sans Pro" panose="020B0503030403020204" pitchFamily="34" charset="0"/>
-                <a:ea typeface="Source Sans Pro" panose="020B0503030403020204" pitchFamily="34" charset="0"/>
-              </a:rPr>
-              <a:t>Get up and stretch your legs</a:t>
-            </a:r>
-          </a:p>
-          <a:p>
-            <a:pPr marL="285750" indent="-285750">
-              <a:buFont typeface="Arial" panose="020B0604020202020204" pitchFamily="34" charset="0"/>
-              <a:buChar char="•"/>
-            </a:pPr>
-            <a:r>
-              <a:rPr lang="en-US" sz="2800" dirty="0">
-                <a:latin typeface="Source Sans Pro" panose="020B0503030403020204" pitchFamily="34" charset="0"/>
-                <a:ea typeface="Source Sans Pro" panose="020B0503030403020204" pitchFamily="34" charset="0"/>
-              </a:rPr>
-              <a:t>Discuss your current workflows with your table-mates; think about how HTMap might be useful in them</a:t>
-            </a:r>
-          </a:p>
-          <a:p>
-            <a:pPr marL="285750" indent="-285750">
-              <a:lnSpc>
-                <a:spcPct val="150000"/>
-              </a:lnSpc>
-              <a:buFont typeface="Arial" panose="020B0604020202020204" pitchFamily="34" charset="0"/>
-              <a:buChar char="•"/>
-            </a:pPr>
-            <a:r>
-              <a:rPr lang="en-US" sz="2800" dirty="0">
-                <a:latin typeface="Source Sans Pro" panose="020B0503030403020204" pitchFamily="34" charset="0"/>
-                <a:ea typeface="Source Sans Pro" panose="020B0503030403020204" pitchFamily="34" charset="0"/>
-              </a:rPr>
-              <a:t>Ask me or helpers questions</a:t>
-            </a:r>
-          </a:p>
-        </p:txBody>
-      </p:sp>
-    </p:spTree>
-    <p:extLst>
-      <p:ext uri="{BB962C8B-B14F-4D97-AF65-F5344CB8AC3E}">
-        <p14:creationId xmlns:p14="http://schemas.microsoft.com/office/powerpoint/2010/main" val="1912212947"/>
-      </p:ext>
-    </p:extLst>
-  </p:cSld>
-  <p:clrMapOvr>
-    <a:masterClrMapping/>
-  </p:clrMapOvr>
-</p:sld>
-</file>
-
-<file path=ppt/slides/slide13.xml><?xml version="1.0" encoding="utf-8"?>
-<p:sld xmlns:a="http://schemas.openxmlformats.org/drawingml/2006/main" xmlns:r="http://schemas.openxmlformats.org/officeDocument/2006/relationships" xmlns:p="http://schemas.openxmlformats.org/presentationml/2006/main">
-  <p:cSld>
-    <p:spTree>
-      <p:nvGrpSpPr>
-        <p:cNvPr id="1" name=""/>
-        <p:cNvGrpSpPr/>
-        <p:nvPr/>
-      </p:nvGrpSpPr>
-      <p:grpSpPr>
-        <a:xfrm>
-          <a:off x="0" y="0"/>
-          <a:ext cx="0" cy="0"/>
-          <a:chOff x="0" y="0"/>
-          <a:chExt cx="0" cy="0"/>
-        </a:xfrm>
-      </p:grpSpPr>
-      <p:sp>
-        <p:nvSpPr>
-          <p:cNvPr id="2" name="Title 1">
-            <a:extLst>
-              <a:ext uri="{FF2B5EF4-FFF2-40B4-BE49-F238E27FC236}">
-                <a16:creationId xmlns:a16="http://schemas.microsoft.com/office/drawing/2014/main" id="{4289BA8B-0B39-4DB3-8945-30EA0162A6F2}"/>
-              </a:ext>
-            </a:extLst>
-          </p:cNvPr>
-          <p:cNvSpPr>
-            <a:spLocks noGrp="1"/>
-          </p:cNvSpPr>
-          <p:nvPr>
-            <p:ph type="title"/>
-          </p:nvPr>
-        </p:nvSpPr>
-        <p:spPr/>
-        <p:txBody>
-          <a:bodyPr/>
-          <a:lstStyle/>
-          <a:p>
-            <a:r>
-              <a:rPr lang="en-US" dirty="0"/>
-              <a:t>Example Project: Book Analysis</a:t>
-            </a:r>
-          </a:p>
-        </p:txBody>
-      </p:sp>
-      <p:sp>
-        <p:nvSpPr>
-          <p:cNvPr id="3" name="Footer Placeholder 2">
-            <a:extLst>
-              <a:ext uri="{FF2B5EF4-FFF2-40B4-BE49-F238E27FC236}">
-                <a16:creationId xmlns:a16="http://schemas.microsoft.com/office/drawing/2014/main" id="{879DFF3E-8371-4FDB-8CF6-6ED53BD101D6}"/>
-              </a:ext>
-            </a:extLst>
-          </p:cNvPr>
-          <p:cNvSpPr>
-            <a:spLocks noGrp="1"/>
-          </p:cNvSpPr>
-          <p:nvPr>
-            <p:ph type="ftr" sz="quarter" idx="10"/>
-          </p:nvPr>
-        </p:nvSpPr>
-        <p:spPr/>
-        <p:txBody>
-          <a:bodyPr/>
-          <a:lstStyle/>
-          <a:p>
-            <a:r>
-              <a:rPr lang="en-US"/>
-              <a:t>HTMap Workshop 2019-9-16</a:t>
-            </a:r>
-            <a:endParaRPr lang="en-US" dirty="0"/>
-          </a:p>
-        </p:txBody>
-      </p:sp>
-      <p:sp>
-        <p:nvSpPr>
-          <p:cNvPr id="4" name="Slide Number Placeholder 3">
-            <a:extLst>
-              <a:ext uri="{FF2B5EF4-FFF2-40B4-BE49-F238E27FC236}">
-                <a16:creationId xmlns:a16="http://schemas.microsoft.com/office/drawing/2014/main" id="{7D14373A-351E-45D3-9446-83A532CB3C35}"/>
-              </a:ext>
-            </a:extLst>
-          </p:cNvPr>
-          <p:cNvSpPr>
-            <a:spLocks noGrp="1"/>
-          </p:cNvSpPr>
-          <p:nvPr>
-            <p:ph type="sldNum" sz="quarter" idx="11"/>
-          </p:nvPr>
-        </p:nvSpPr>
-        <p:spPr/>
-        <p:txBody>
-          <a:bodyPr/>
-          <a:lstStyle/>
-          <a:p>
-            <a:fld id="{65011DE2-3A5B-41D4-A661-103799ABD939}" type="slidenum">
-              <a:rPr lang="en-US" smtClean="0"/>
-              <a:t>13</a:t>
-            </a:fld>
-            <a:endParaRPr lang="en-US"/>
-          </a:p>
-        </p:txBody>
-      </p:sp>
-      <p:sp>
-        <p:nvSpPr>
-          <p:cNvPr id="5" name="TextBox 4">
-            <a:extLst>
-              <a:ext uri="{FF2B5EF4-FFF2-40B4-BE49-F238E27FC236}">
-                <a16:creationId xmlns:a16="http://schemas.microsoft.com/office/drawing/2014/main" id="{011506DA-A5D3-4E82-8895-2B77C8AC5C46}"/>
-              </a:ext>
-            </a:extLst>
-          </p:cNvPr>
-          <p:cNvSpPr txBox="1"/>
-          <p:nvPr/>
-        </p:nvSpPr>
-        <p:spPr>
-          <a:xfrm>
-            <a:off x="2057400" y="1148158"/>
-            <a:ext cx="8312102" cy="4200381"/>
-          </a:xfrm>
-          <a:prstGeom prst="rect">
-            <a:avLst/>
-          </a:prstGeom>
-          <a:noFill/>
-        </p:spPr>
-        <p:txBody>
-          <a:bodyPr wrap="square" rtlCol="0">
-            <a:spAutoFit/>
-          </a:bodyPr>
-          <a:lstStyle/>
-          <a:p>
-            <a:r>
-              <a:rPr lang="en-US" sz="3200" b="1" u="sng" dirty="0">
-                <a:latin typeface="Source Sans Pro" panose="020B0503030403020204" pitchFamily="34" charset="0"/>
-                <a:ea typeface="Source Sans Pro" panose="020B0503030403020204" pitchFamily="34" charset="0"/>
-              </a:rPr>
-              <a:t>Goals</a:t>
-            </a:r>
-            <a:endParaRPr lang="en-US" sz="3200" u="sng" dirty="0">
-              <a:latin typeface="Source Sans Pro" panose="020B0503030403020204" pitchFamily="34" charset="0"/>
-              <a:ea typeface="Source Sans Pro" panose="020B0503030403020204" pitchFamily="34" charset="0"/>
-            </a:endParaRPr>
-          </a:p>
-          <a:p>
-            <a:pPr marL="285750" indent="-285750">
-              <a:lnSpc>
-                <a:spcPct val="150000"/>
-              </a:lnSpc>
-              <a:buFont typeface="Arial" panose="020B0604020202020204" pitchFamily="34" charset="0"/>
-              <a:buChar char="•"/>
-            </a:pPr>
-            <a:r>
-              <a:rPr lang="en-US" sz="3200" dirty="0">
-                <a:latin typeface="Source Sans Pro" panose="020B0503030403020204" pitchFamily="34" charset="0"/>
-                <a:ea typeface="Source Sans Pro" panose="020B0503030403020204" pitchFamily="34" charset="0"/>
-              </a:rPr>
-              <a:t>Work on a more concrete problem</a:t>
-            </a:r>
-          </a:p>
-          <a:p>
-            <a:pPr marL="285750" indent="-285750">
-              <a:lnSpc>
-                <a:spcPct val="150000"/>
-              </a:lnSpc>
-              <a:buFont typeface="Arial" panose="020B0604020202020204" pitchFamily="34" charset="0"/>
-              <a:buChar char="•"/>
-            </a:pPr>
-            <a:r>
-              <a:rPr lang="en-US" sz="3200" dirty="0">
-                <a:latin typeface="Source Sans Pro" panose="020B0503030403020204" pitchFamily="34" charset="0"/>
-                <a:ea typeface="Source Sans Pro" panose="020B0503030403020204" pitchFamily="34" charset="0"/>
-              </a:rPr>
-              <a:t>Write reusable scripts</a:t>
-            </a:r>
-          </a:p>
-          <a:p>
-            <a:pPr marL="285750" indent="-285750">
-              <a:lnSpc>
-                <a:spcPct val="150000"/>
-              </a:lnSpc>
-              <a:buFont typeface="Arial" panose="020B0604020202020204" pitchFamily="34" charset="0"/>
-              <a:buChar char="•"/>
-            </a:pPr>
-            <a:r>
-              <a:rPr lang="en-US" sz="3200" dirty="0">
-                <a:latin typeface="Source Sans Pro" panose="020B0503030403020204" pitchFamily="34" charset="0"/>
-                <a:ea typeface="Source Sans Pro" panose="020B0503030403020204" pitchFamily="34" charset="0"/>
-              </a:rPr>
-              <a:t>Use some advanced features of HTMap</a:t>
-            </a:r>
-          </a:p>
-          <a:p>
-            <a:pPr marL="1200150" lvl="2" indent="-285750">
-              <a:lnSpc>
-                <a:spcPct val="150000"/>
-              </a:lnSpc>
-              <a:buFont typeface="Arial" panose="020B0604020202020204" pitchFamily="34" charset="0"/>
-              <a:buChar char="•"/>
-            </a:pPr>
-            <a:r>
-              <a:rPr lang="en-US" sz="3200" dirty="0">
-                <a:latin typeface="Source Sans Pro" panose="020B0503030403020204" pitchFamily="34" charset="0"/>
-                <a:ea typeface="Source Sans Pro" panose="020B0503030403020204" pitchFamily="34" charset="0"/>
-              </a:rPr>
-              <a:t>CLI for map management</a:t>
-            </a:r>
-          </a:p>
-          <a:p>
-            <a:pPr marL="1200150" lvl="2" indent="-285750">
-              <a:lnSpc>
-                <a:spcPct val="150000"/>
-              </a:lnSpc>
-              <a:buFont typeface="Arial" panose="020B0604020202020204" pitchFamily="34" charset="0"/>
-              <a:buChar char="•"/>
-            </a:pPr>
-            <a:r>
-              <a:rPr lang="en-US" sz="3200" dirty="0">
-                <a:latin typeface="Source Sans Pro" panose="020B0503030403020204" pitchFamily="34" charset="0"/>
-                <a:ea typeface="Source Sans Pro" panose="020B0503030403020204" pitchFamily="34" charset="0"/>
-              </a:rPr>
-              <a:t>Transferring output files</a:t>
-            </a:r>
-          </a:p>
-        </p:txBody>
-      </p:sp>
-    </p:spTree>
-    <p:extLst>
-      <p:ext uri="{BB962C8B-B14F-4D97-AF65-F5344CB8AC3E}">
-        <p14:creationId xmlns:p14="http://schemas.microsoft.com/office/powerpoint/2010/main" val="1085955525"/>
-      </p:ext>
-    </p:extLst>
-  </p:cSld>
-  <p:clrMapOvr>
-    <a:masterClrMapping/>
-  </p:clrMapOvr>
-</p:sld>
-</file>
-
-<file path=ppt/slides/slide14.xml><?xml version="1.0" encoding="utf-8"?>
-<p:sld xmlns:a="http://schemas.openxmlformats.org/drawingml/2006/main" xmlns:r="http://schemas.openxmlformats.org/officeDocument/2006/relationships" xmlns:p="http://schemas.openxmlformats.org/presentationml/2006/main">
-  <p:cSld>
-    <p:spTree>
-      <p:nvGrpSpPr>
-        <p:cNvPr id="1" name=""/>
-        <p:cNvGrpSpPr/>
-        <p:nvPr/>
-      </p:nvGrpSpPr>
-      <p:grpSpPr>
-        <a:xfrm>
-          <a:off x="0" y="0"/>
-          <a:ext cx="0" cy="0"/>
-          <a:chOff x="0" y="0"/>
-          <a:chExt cx="0" cy="0"/>
-        </a:xfrm>
-      </p:grpSpPr>
-      <p:sp>
-        <p:nvSpPr>
-          <p:cNvPr id="2" name="Title 1">
-            <a:extLst>
-              <a:ext uri="{FF2B5EF4-FFF2-40B4-BE49-F238E27FC236}">
                 <a16:creationId xmlns:a16="http://schemas.microsoft.com/office/drawing/2014/main" id="{AF87598A-1002-492C-9FC6-D037361BB257}"/>
               </a:ext>
             </a:extLst>
@@ -6117,7 +5492,7 @@
           <a:p>
             <a:fld id="{65011DE2-3A5B-41D4-A661-103799ABD939}" type="slidenum">
               <a:rPr lang="en-US" smtClean="0"/>
-              <a:t>14</a:t>
+              <a:t>11</a:t>
             </a:fld>
             <a:endParaRPr lang="en-US"/>
           </a:p>
@@ -6158,7 +5533,7 @@
           <p:cNvPr id="2" name="Title 1">
             <a:extLst>
               <a:ext uri="{FF2B5EF4-FFF2-40B4-BE49-F238E27FC236}">
-                <a16:creationId xmlns:a16="http://schemas.microsoft.com/office/drawing/2014/main" id="{AFC0F17D-5A9C-4025-B7C7-7C2123CC7668}"/>
+                <a16:creationId xmlns:a16="http://schemas.microsoft.com/office/drawing/2014/main" id="{F09A4240-021F-4DE5-B2A0-051590DE7260}"/>
               </a:ext>
             </a:extLst>
           </p:cNvPr>
@@ -6176,7 +5551,7 @@
           <a:p>
             <a:r>
               <a:rPr lang="en-US" dirty="0"/>
-              <a:t>Get the Materials</a:t>
+              <a:t>Workshop Agenda</a:t>
             </a:r>
           </a:p>
         </p:txBody>
@@ -6186,7 +5561,7 @@
           <p:cNvPr id="3" name="Footer Placeholder 2">
             <a:extLst>
               <a:ext uri="{FF2B5EF4-FFF2-40B4-BE49-F238E27FC236}">
-                <a16:creationId xmlns:a16="http://schemas.microsoft.com/office/drawing/2014/main" id="{5EC7C944-4A4B-4A28-BE64-4831B0A55C50}"/>
+                <a16:creationId xmlns:a16="http://schemas.microsoft.com/office/drawing/2014/main" id="{2EDE52F1-1C1C-4458-B3EE-01CDB1113FDD}"/>
               </a:ext>
             </a:extLst>
           </p:cNvPr>
@@ -6203,9 +5578,10 @@
           <a:lstStyle/>
           <a:p>
             <a:r>
-              <a:rPr lang="en-US" dirty="0"/>
+              <a:rPr lang="en-US"/>
               <a:t>HTMap Workshop 2019-9-16</a:t>
             </a:r>
+            <a:endParaRPr lang="en-US" dirty="0"/>
           </a:p>
         </p:txBody>
       </p:sp>
@@ -6214,7 +5590,7 @@
           <p:cNvPr id="4" name="Slide Number Placeholder 3">
             <a:extLst>
               <a:ext uri="{FF2B5EF4-FFF2-40B4-BE49-F238E27FC236}">
-                <a16:creationId xmlns:a16="http://schemas.microsoft.com/office/drawing/2014/main" id="{CAAE6460-1F8B-432E-AF13-61D89BB787A0}"/>
+                <a16:creationId xmlns:a16="http://schemas.microsoft.com/office/drawing/2014/main" id="{1833090F-1C82-443D-A4D5-16490A581F1D}"/>
               </a:ext>
             </a:extLst>
           </p:cNvPr>
@@ -6243,7 +5619,7 @@
           <p:cNvPr id="5" name="TextBox 4">
             <a:extLst>
               <a:ext uri="{FF2B5EF4-FFF2-40B4-BE49-F238E27FC236}">
-                <a16:creationId xmlns:a16="http://schemas.microsoft.com/office/drawing/2014/main" id="{49AE492F-A92F-429D-A5A4-5B5E056BA605}"/>
+                <a16:creationId xmlns:a16="http://schemas.microsoft.com/office/drawing/2014/main" id="{C74DFAE3-68E0-432E-85CD-38A0F42DE08A}"/>
               </a:ext>
             </a:extLst>
           </p:cNvPr>
@@ -6252,8 +5628,8 @@
         </p:nvSpPr>
         <p:spPr>
           <a:xfrm>
-            <a:off x="296779" y="1537183"/>
-            <a:ext cx="11598442" cy="1769715"/>
+            <a:off x="2057400" y="1223785"/>
+            <a:ext cx="8668466" cy="2969274"/>
           </a:xfrm>
           <a:prstGeom prst="rect">
             <a:avLst/>
@@ -6266,47 +5642,63 @@
           </a:bodyPr>
           <a:lstStyle/>
           <a:p>
-            <a:pPr algn="ctr"/>
-            <a:r>
-              <a:rPr lang="en-US" sz="3600" dirty="0">
-                <a:latin typeface="Source Sans Pro" panose="020B0503030403020204" pitchFamily="34" charset="0"/>
-                <a:ea typeface="Source Sans Pro" panose="020B0503030403020204" pitchFamily="34" charset="0"/>
+            <a:pPr marL="342900" indent="-342900">
+              <a:lnSpc>
+                <a:spcPct val="150000"/>
+              </a:lnSpc>
+              <a:buFont typeface="+mj-lt"/>
+              <a:buAutoNum type="arabicPeriod"/>
+            </a:pPr>
+            <a:r>
+              <a:rPr lang="en-US" sz="3200" dirty="0">
+                <a:latin typeface="Source Sans Pro" panose="020B0503030403020204" pitchFamily="34" charset="0"/>
               </a:rPr>
-              <a:t>Run:</a:t>
-            </a:r>
-          </a:p>
-          <a:p>
-            <a:pPr algn="ctr"/>
-            <a:endParaRPr lang="en-US" sz="2500" dirty="0">
-              <a:latin typeface="Source Code Pro" panose="020B0509030403020204" pitchFamily="49" charset="0"/>
-            </a:endParaRPr>
-          </a:p>
-          <a:p>
-            <a:r>
-              <a:rPr lang="en-US" sz="2400" dirty="0">
-                <a:latin typeface="Source Code Pro" panose="020B0509030403020204" pitchFamily="49" charset="0"/>
+              <a:t>HTMap Tutorial</a:t>
+            </a:r>
+          </a:p>
+          <a:p>
+            <a:pPr marL="342900" indent="-342900">
+              <a:lnSpc>
+                <a:spcPct val="150000"/>
+              </a:lnSpc>
+              <a:buFont typeface="+mj-lt"/>
+              <a:buAutoNum type="arabicPeriod"/>
+            </a:pPr>
+            <a:r>
+              <a:rPr lang="en-US" sz="3200" dirty="0">
+                <a:latin typeface="Source Sans Pro" panose="020B0503030403020204" pitchFamily="34" charset="0"/>
               </a:rPr>
-              <a:t>$ git clone https://github.com/CHTC/htmap-workshop-materials</a:t>
-            </a:r>
-          </a:p>
-          <a:p>
-            <a:r>
-              <a:rPr lang="en-US" sz="2400" dirty="0">
-                <a:latin typeface="Source Code Pro" panose="020B0509030403020204" pitchFamily="49" charset="0"/>
+              <a:t>Discussion Break</a:t>
+            </a:r>
+          </a:p>
+          <a:p>
+            <a:pPr marL="342900" indent="-342900">
+              <a:lnSpc>
+                <a:spcPct val="150000"/>
+              </a:lnSpc>
+              <a:buFont typeface="+mj-lt"/>
+              <a:buAutoNum type="arabicPeriod"/>
+            </a:pPr>
+            <a:r>
+              <a:rPr lang="en-US" sz="3200" dirty="0">
+                <a:latin typeface="Source Sans Pro" panose="020B0503030403020204" pitchFamily="34" charset="0"/>
               </a:rPr>
-              <a:t>$ cd </a:t>
-            </a:r>
-            <a:r>
-              <a:rPr lang="en-US" sz="2400" dirty="0" err="1">
-                <a:latin typeface="Source Code Pro" panose="020B0509030403020204" pitchFamily="49" charset="0"/>
+              <a:t>Extended Example</a:t>
+            </a:r>
+          </a:p>
+          <a:p>
+            <a:pPr marL="342900" indent="-342900">
+              <a:lnSpc>
+                <a:spcPct val="150000"/>
+              </a:lnSpc>
+              <a:buFont typeface="+mj-lt"/>
+              <a:buAutoNum type="arabicPeriod"/>
+            </a:pPr>
+            <a:r>
+              <a:rPr lang="en-US" sz="3200" dirty="0">
+                <a:latin typeface="Source Sans Pro" panose="020B0503030403020204" pitchFamily="34" charset="0"/>
               </a:rPr>
-              <a:t>htmap</a:t>
-            </a:r>
-            <a:r>
-              <a:rPr lang="en-US" sz="2400" dirty="0">
-                <a:latin typeface="Source Code Pro" panose="020B0509030403020204" pitchFamily="49" charset="0"/>
-              </a:rPr>
-              <a:t>-workshop-materials</a:t>
+              <a:t>Work Session (optional)</a:t>
             </a:r>
           </a:p>
         </p:txBody>
@@ -6314,7 +5706,7 @@
     </p:spTree>
     <p:extLst>
       <p:ext uri="{BB962C8B-B14F-4D97-AF65-F5344CB8AC3E}">
-        <p14:creationId xmlns:p14="http://schemas.microsoft.com/office/powerpoint/2010/main" val="156693662"/>
+        <p14:creationId xmlns:p14="http://schemas.microsoft.com/office/powerpoint/2010/main" val="2442382071"/>
       </p:ext>
     </p:extLst>
   </p:cSld>
@@ -6346,7 +5738,7 @@
           <p:cNvPr id="2" name="Title 1">
             <a:extLst>
               <a:ext uri="{FF2B5EF4-FFF2-40B4-BE49-F238E27FC236}">
-                <a16:creationId xmlns:a16="http://schemas.microsoft.com/office/drawing/2014/main" id="{D23803D1-28BF-48B0-A3D2-40049EE4728A}"/>
+                <a16:creationId xmlns:a16="http://schemas.microsoft.com/office/drawing/2014/main" id="{AFC0F17D-5A9C-4025-B7C7-7C2123CC7668}"/>
               </a:ext>
             </a:extLst>
           </p:cNvPr>
@@ -6364,7 +5756,7 @@
           <a:p>
             <a:r>
               <a:rPr lang="en-US" dirty="0"/>
-              <a:t>What Just Happened?</a:t>
+              <a:t>Get the Materials</a:t>
             </a:r>
           </a:p>
         </p:txBody>
@@ -6374,7 +5766,7 @@
           <p:cNvPr id="3" name="Footer Placeholder 2">
             <a:extLst>
               <a:ext uri="{FF2B5EF4-FFF2-40B4-BE49-F238E27FC236}">
-                <a16:creationId xmlns:a16="http://schemas.microsoft.com/office/drawing/2014/main" id="{FCF3F4C5-3CD6-418F-8421-3A141D6DCE7F}"/>
+                <a16:creationId xmlns:a16="http://schemas.microsoft.com/office/drawing/2014/main" id="{5EC7C944-4A4B-4A28-BE64-4831B0A55C50}"/>
               </a:ext>
             </a:extLst>
           </p:cNvPr>
@@ -6391,10 +5783,9 @@
           <a:lstStyle/>
           <a:p>
             <a:r>
-              <a:rPr lang="en-US"/>
+              <a:rPr lang="en-US" dirty="0"/>
               <a:t>HTMap Workshop 2019-9-16</a:t>
             </a:r>
-            <a:endParaRPr lang="en-US" dirty="0"/>
           </a:p>
         </p:txBody>
       </p:sp>
@@ -6403,7 +5794,7 @@
           <p:cNvPr id="4" name="Slide Number Placeholder 3">
             <a:extLst>
               <a:ext uri="{FF2B5EF4-FFF2-40B4-BE49-F238E27FC236}">
-                <a16:creationId xmlns:a16="http://schemas.microsoft.com/office/drawing/2014/main" id="{22D5E63F-4EBF-4719-8A3E-1D599CD42D5C}"/>
+                <a16:creationId xmlns:a16="http://schemas.microsoft.com/office/drawing/2014/main" id="{CAAE6460-1F8B-432E-AF13-61D89BB787A0}"/>
               </a:ext>
             </a:extLst>
           </p:cNvPr>
@@ -6422,6 +5813,195 @@
             <a:fld id="{65011DE2-3A5B-41D4-A661-103799ABD939}" type="slidenum">
               <a:rPr lang="en-US" smtClean="0"/>
               <a:t>3</a:t>
+            </a:fld>
+            <a:endParaRPr lang="en-US"/>
+          </a:p>
+        </p:txBody>
+      </p:sp>
+      <p:sp>
+        <p:nvSpPr>
+          <p:cNvPr id="5" name="TextBox 4">
+            <a:extLst>
+              <a:ext uri="{FF2B5EF4-FFF2-40B4-BE49-F238E27FC236}">
+                <a16:creationId xmlns:a16="http://schemas.microsoft.com/office/drawing/2014/main" id="{49AE492F-A92F-429D-A5A4-5B5E056BA605}"/>
+              </a:ext>
+            </a:extLst>
+          </p:cNvPr>
+          <p:cNvSpPr txBox="1"/>
+          <p:nvPr/>
+        </p:nvSpPr>
+        <p:spPr>
+          <a:xfrm>
+            <a:off x="296779" y="1537183"/>
+            <a:ext cx="11598442" cy="1769715"/>
+          </a:xfrm>
+          <a:prstGeom prst="rect">
+            <a:avLst/>
+          </a:prstGeom>
+          <a:noFill/>
+        </p:spPr>
+        <p:txBody>
+          <a:bodyPr wrap="square" rtlCol="0">
+            <a:spAutoFit/>
+          </a:bodyPr>
+          <a:lstStyle/>
+          <a:p>
+            <a:pPr algn="ctr"/>
+            <a:r>
+              <a:rPr lang="en-US" sz="3600" dirty="0">
+                <a:latin typeface="Source Sans Pro" panose="020B0503030403020204" pitchFamily="34" charset="0"/>
+                <a:ea typeface="Source Sans Pro" panose="020B0503030403020204" pitchFamily="34" charset="0"/>
+              </a:rPr>
+              <a:t>Run:</a:t>
+            </a:r>
+          </a:p>
+          <a:p>
+            <a:pPr algn="ctr"/>
+            <a:endParaRPr lang="en-US" sz="2500" dirty="0">
+              <a:latin typeface="Source Code Pro" panose="020B0509030403020204" pitchFamily="49" charset="0"/>
+            </a:endParaRPr>
+          </a:p>
+          <a:p>
+            <a:r>
+              <a:rPr lang="en-US" sz="2400" dirty="0">
+                <a:latin typeface="Source Code Pro" panose="020B0509030403020204" pitchFamily="49" charset="0"/>
+              </a:rPr>
+              <a:t>$ git clone https://github.com/CHTC/htmap-workshop-materials</a:t>
+            </a:r>
+          </a:p>
+          <a:p>
+            <a:r>
+              <a:rPr lang="en-US" sz="2400" dirty="0">
+                <a:latin typeface="Source Code Pro" panose="020B0509030403020204" pitchFamily="49" charset="0"/>
+              </a:rPr>
+              <a:t>$ cd </a:t>
+            </a:r>
+            <a:r>
+              <a:rPr lang="en-US" sz="2400" dirty="0" err="1">
+                <a:latin typeface="Source Code Pro" panose="020B0509030403020204" pitchFamily="49" charset="0"/>
+              </a:rPr>
+              <a:t>htmap</a:t>
+            </a:r>
+            <a:r>
+              <a:rPr lang="en-US" sz="2400" dirty="0">
+                <a:latin typeface="Source Code Pro" panose="020B0509030403020204" pitchFamily="49" charset="0"/>
+              </a:rPr>
+              <a:t>-workshop-materials</a:t>
+            </a:r>
+          </a:p>
+        </p:txBody>
+      </p:sp>
+    </p:spTree>
+    <p:extLst>
+      <p:ext uri="{BB962C8B-B14F-4D97-AF65-F5344CB8AC3E}">
+        <p14:creationId xmlns:p14="http://schemas.microsoft.com/office/powerpoint/2010/main" val="156693662"/>
+      </p:ext>
+    </p:extLst>
+  </p:cSld>
+  <p:clrMapOvr>
+    <a:masterClrMapping/>
+  </p:clrMapOvr>
+</p:sld>
+</file>
+
+<file path=ppt/slides/slide4.xml><?xml version="1.0" encoding="utf-8"?>
+<p:sld xmlns:a="http://schemas.openxmlformats.org/drawingml/2006/main" xmlns:r="http://schemas.openxmlformats.org/officeDocument/2006/relationships" xmlns:p="http://schemas.openxmlformats.org/presentationml/2006/main">
+  <p:cSld>
+    <p:spTree>
+      <p:nvGrpSpPr>
+        <p:cNvPr id="1" name=""/>
+        <p:cNvGrpSpPr/>
+        <p:nvPr/>
+      </p:nvGrpSpPr>
+      <p:grpSpPr>
+        <a:xfrm>
+          <a:off x="0" y="0"/>
+          <a:ext cx="0" cy="0"/>
+          <a:chOff x="0" y="0"/>
+          <a:chExt cx="0" cy="0"/>
+        </a:xfrm>
+      </p:grpSpPr>
+      <p:sp>
+        <p:nvSpPr>
+          <p:cNvPr id="2" name="Title 1">
+            <a:extLst>
+              <a:ext uri="{FF2B5EF4-FFF2-40B4-BE49-F238E27FC236}">
+                <a16:creationId xmlns:a16="http://schemas.microsoft.com/office/drawing/2014/main" id="{D23803D1-28BF-48B0-A3D2-40049EE4728A}"/>
+              </a:ext>
+            </a:extLst>
+          </p:cNvPr>
+          <p:cNvSpPr>
+            <a:spLocks noGrp="1"/>
+          </p:cNvSpPr>
+          <p:nvPr>
+            <p:ph type="title"/>
+          </p:nvPr>
+        </p:nvSpPr>
+        <p:spPr/>
+        <p:txBody>
+          <a:bodyPr/>
+          <a:lstStyle/>
+          <a:p>
+            <a:r>
+              <a:rPr lang="en-US" dirty="0"/>
+              <a:t>What Just Happened?</a:t>
+            </a:r>
+          </a:p>
+        </p:txBody>
+      </p:sp>
+      <p:sp>
+        <p:nvSpPr>
+          <p:cNvPr id="3" name="Footer Placeholder 2">
+            <a:extLst>
+              <a:ext uri="{FF2B5EF4-FFF2-40B4-BE49-F238E27FC236}">
+                <a16:creationId xmlns:a16="http://schemas.microsoft.com/office/drawing/2014/main" id="{FCF3F4C5-3CD6-418F-8421-3A141D6DCE7F}"/>
+              </a:ext>
+            </a:extLst>
+          </p:cNvPr>
+          <p:cNvSpPr>
+            <a:spLocks noGrp="1"/>
+          </p:cNvSpPr>
+          <p:nvPr>
+            <p:ph type="ftr" sz="quarter" idx="10"/>
+          </p:nvPr>
+        </p:nvSpPr>
+        <p:spPr/>
+        <p:txBody>
+          <a:bodyPr/>
+          <a:lstStyle/>
+          <a:p>
+            <a:r>
+              <a:rPr lang="en-US"/>
+              <a:t>HTMap Workshop 2019-9-16</a:t>
+            </a:r>
+            <a:endParaRPr lang="en-US" dirty="0"/>
+          </a:p>
+        </p:txBody>
+      </p:sp>
+      <p:sp>
+        <p:nvSpPr>
+          <p:cNvPr id="4" name="Slide Number Placeholder 3">
+            <a:extLst>
+              <a:ext uri="{FF2B5EF4-FFF2-40B4-BE49-F238E27FC236}">
+                <a16:creationId xmlns:a16="http://schemas.microsoft.com/office/drawing/2014/main" id="{22D5E63F-4EBF-4719-8A3E-1D599CD42D5C}"/>
+              </a:ext>
+            </a:extLst>
+          </p:cNvPr>
+          <p:cNvSpPr>
+            <a:spLocks noGrp="1"/>
+          </p:cNvSpPr>
+          <p:nvPr>
+            <p:ph type="sldNum" sz="quarter" idx="11"/>
+          </p:nvPr>
+        </p:nvSpPr>
+        <p:spPr/>
+        <p:txBody>
+          <a:bodyPr/>
+          <a:lstStyle/>
+          <a:p>
+            <a:fld id="{65011DE2-3A5B-41D4-A661-103799ABD939}" type="slidenum">
+              <a:rPr lang="en-US" smtClean="0"/>
+              <a:t>4</a:t>
             </a:fld>
             <a:endParaRPr lang="en-US"/>
           </a:p>
@@ -6560,8 +6140,8 @@
         </p:nvSpPr>
         <p:spPr>
           <a:xfrm>
-            <a:off x="8587560" y="867559"/>
-            <a:ext cx="2907468" cy="1270000"/>
+            <a:off x="8401480" y="867559"/>
+            <a:ext cx="3093548" cy="1270000"/>
           </a:xfrm>
           <a:prstGeom prst="flowChartDecision">
             <a:avLst/>
@@ -6612,7 +6192,7 @@
         <p:spPr>
           <a:xfrm>
             <a:off x="762000" y="1934723"/>
-            <a:ext cx="1643361" cy="982134"/>
+            <a:ext cx="1810211" cy="982134"/>
           </a:xfrm>
           <a:prstGeom prst="flowChartManualOperation">
             <a:avLst/>
@@ -6666,8 +6246,8 @@
         </p:nvCxnSpPr>
         <p:spPr>
           <a:xfrm flipV="1">
-            <a:off x="2241025" y="1967859"/>
-            <a:ext cx="2949869" cy="457931"/>
+            <a:off x="2391190" y="1967859"/>
+            <a:ext cx="2799704" cy="457931"/>
           </a:xfrm>
           <a:prstGeom prst="curvedConnector3">
             <a:avLst>
@@ -6712,7 +6292,7 @@
         <p:spPr>
           <a:xfrm flipV="1">
             <a:off x="7001105" y="1502559"/>
-            <a:ext cx="1586455" cy="465300"/>
+            <a:ext cx="1400375" cy="465300"/>
           </a:xfrm>
           <a:prstGeom prst="curvedConnector3">
             <a:avLst>
@@ -6751,7 +6331,7 @@
 </p:sld>
 </file>
 
-<file path=ppt/slides/slide4.xml><?xml version="1.0" encoding="utf-8"?>
+<file path=ppt/slides/slide5.xml><?xml version="1.0" encoding="utf-8"?>
 <p:sld xmlns:a="http://schemas.openxmlformats.org/drawingml/2006/main" xmlns:r="http://schemas.openxmlformats.org/officeDocument/2006/relationships" xmlns:p="http://schemas.openxmlformats.org/presentationml/2006/main">
   <p:cSld>
     <p:spTree>
@@ -6848,7 +6428,7 @@
           <a:p>
             <a:fld id="{65011DE2-3A5B-41D4-A661-103799ABD939}" type="slidenum">
               <a:rPr lang="en-US" smtClean="0"/>
-              <a:t>4</a:t>
+              <a:t>5</a:t>
             </a:fld>
             <a:endParaRPr lang="en-US"/>
           </a:p>
@@ -6987,8 +6567,8 @@
         </p:nvSpPr>
         <p:spPr>
           <a:xfrm>
-            <a:off x="8646351" y="895260"/>
-            <a:ext cx="2907468" cy="1270000"/>
+            <a:off x="8559609" y="895260"/>
+            <a:ext cx="2994210" cy="1270000"/>
           </a:xfrm>
           <a:prstGeom prst="flowChartDecision">
             <a:avLst/>
@@ -7039,7 +6619,7 @@
         <p:spPr>
           <a:xfrm>
             <a:off x="762000" y="1934723"/>
-            <a:ext cx="1643361" cy="982134"/>
+            <a:ext cx="1800054" cy="982134"/>
           </a:xfrm>
           <a:prstGeom prst="flowChartManualOperation">
             <a:avLst/>
@@ -7092,8 +6672,8 @@
         </p:nvCxnSpPr>
         <p:spPr>
           <a:xfrm>
-            <a:off x="2241025" y="2425790"/>
-            <a:ext cx="941613" cy="402077"/>
+            <a:off x="2382049" y="2425790"/>
+            <a:ext cx="800589" cy="402077"/>
           </a:xfrm>
           <a:prstGeom prst="curvedConnector3">
             <a:avLst>
@@ -7137,8 +6717,8 @@
         </p:nvCxnSpPr>
         <p:spPr>
           <a:xfrm rot="5400000" flipH="1" flipV="1">
-            <a:off x="7991518" y="1726427"/>
-            <a:ext cx="850999" cy="458667"/>
+            <a:off x="7948147" y="1769798"/>
+            <a:ext cx="850999" cy="371925"/>
           </a:xfrm>
           <a:prstGeom prst="curvedConnector2">
             <a:avLst/>
@@ -7546,7 +7126,7 @@
         <p:spPr>
           <a:xfrm flipV="1">
             <a:off x="6942724" y="1530260"/>
-            <a:ext cx="1703627" cy="613736"/>
+            <a:ext cx="1616885" cy="613736"/>
           </a:xfrm>
           <a:prstGeom prst="curvedConnector3">
             <a:avLst>
@@ -8094,208 +7674,6 @@
 </p:sld>
 </file>
 
-<file path=ppt/slides/slide5.xml><?xml version="1.0" encoding="utf-8"?>
-<p:sld xmlns:a="http://schemas.openxmlformats.org/drawingml/2006/main" xmlns:r="http://schemas.openxmlformats.org/officeDocument/2006/relationships" xmlns:p="http://schemas.openxmlformats.org/presentationml/2006/main">
-  <p:cSld>
-    <p:spTree>
-      <p:nvGrpSpPr>
-        <p:cNvPr id="1" name=""/>
-        <p:cNvGrpSpPr/>
-        <p:nvPr/>
-      </p:nvGrpSpPr>
-      <p:grpSpPr>
-        <a:xfrm>
-          <a:off x="0" y="0"/>
-          <a:ext cx="0" cy="0"/>
-          <a:chOff x="0" y="0"/>
-          <a:chExt cx="0" cy="0"/>
-        </a:xfrm>
-      </p:grpSpPr>
-      <p:sp>
-        <p:nvSpPr>
-          <p:cNvPr id="2" name="Title 1">
-            <a:extLst>
-              <a:ext uri="{FF2B5EF4-FFF2-40B4-BE49-F238E27FC236}">
-                <a16:creationId xmlns:a16="http://schemas.microsoft.com/office/drawing/2014/main" id="{B8DCEF56-AC3E-477F-8BF0-5BE3AFC2269F}"/>
-              </a:ext>
-            </a:extLst>
-          </p:cNvPr>
-          <p:cNvSpPr>
-            <a:spLocks noGrp="1"/>
-          </p:cNvSpPr>
-          <p:nvPr>
-            <p:ph type="title"/>
-          </p:nvPr>
-        </p:nvSpPr>
-        <p:spPr/>
-        <p:txBody>
-          <a:bodyPr/>
-          <a:lstStyle/>
-          <a:p>
-            <a:r>
-              <a:rPr lang="en-US" dirty="0"/>
-              <a:t>Why use HTMap?</a:t>
-            </a:r>
-          </a:p>
-        </p:txBody>
-      </p:sp>
-      <p:sp>
-        <p:nvSpPr>
-          <p:cNvPr id="3" name="Footer Placeholder 2">
-            <a:extLst>
-              <a:ext uri="{FF2B5EF4-FFF2-40B4-BE49-F238E27FC236}">
-                <a16:creationId xmlns:a16="http://schemas.microsoft.com/office/drawing/2014/main" id="{F5C6BACE-1F1D-4609-81F1-76BD7CE9C92C}"/>
-              </a:ext>
-            </a:extLst>
-          </p:cNvPr>
-          <p:cNvSpPr>
-            <a:spLocks noGrp="1"/>
-          </p:cNvSpPr>
-          <p:nvPr>
-            <p:ph type="ftr" sz="quarter" idx="10"/>
-          </p:nvPr>
-        </p:nvSpPr>
-        <p:spPr/>
-        <p:txBody>
-          <a:bodyPr/>
-          <a:lstStyle/>
-          <a:p>
-            <a:r>
-              <a:rPr lang="en-US"/>
-              <a:t>HTMap Workshop 2019-9-16</a:t>
-            </a:r>
-            <a:endParaRPr lang="en-US" dirty="0"/>
-          </a:p>
-        </p:txBody>
-      </p:sp>
-      <p:sp>
-        <p:nvSpPr>
-          <p:cNvPr id="4" name="Slide Number Placeholder 3">
-            <a:extLst>
-              <a:ext uri="{FF2B5EF4-FFF2-40B4-BE49-F238E27FC236}">
-                <a16:creationId xmlns:a16="http://schemas.microsoft.com/office/drawing/2014/main" id="{9F0E4118-7A52-4EE2-9C7B-3A570D484D18}"/>
-              </a:ext>
-            </a:extLst>
-          </p:cNvPr>
-          <p:cNvSpPr>
-            <a:spLocks noGrp="1"/>
-          </p:cNvSpPr>
-          <p:nvPr>
-            <p:ph type="sldNum" sz="quarter" idx="11"/>
-          </p:nvPr>
-        </p:nvSpPr>
-        <p:spPr/>
-        <p:txBody>
-          <a:bodyPr/>
-          <a:lstStyle/>
-          <a:p>
-            <a:fld id="{65011DE2-3A5B-41D4-A661-103799ABD939}" type="slidenum">
-              <a:rPr lang="en-US" smtClean="0"/>
-              <a:t>5</a:t>
-            </a:fld>
-            <a:endParaRPr lang="en-US"/>
-          </a:p>
-        </p:txBody>
-      </p:sp>
-      <p:sp>
-        <p:nvSpPr>
-          <p:cNvPr id="5" name="TextBox 4">
-            <a:extLst>
-              <a:ext uri="{FF2B5EF4-FFF2-40B4-BE49-F238E27FC236}">
-                <a16:creationId xmlns:a16="http://schemas.microsoft.com/office/drawing/2014/main" id="{3610684D-AEFD-47DF-B21F-27E8B2515A1E}"/>
-              </a:ext>
-            </a:extLst>
-          </p:cNvPr>
-          <p:cNvSpPr txBox="1"/>
-          <p:nvPr/>
-        </p:nvSpPr>
-        <p:spPr>
-          <a:xfrm>
-            <a:off x="1211274" y="1668763"/>
-            <a:ext cx="9769452" cy="2518510"/>
-          </a:xfrm>
-          <a:prstGeom prst="rect">
-            <a:avLst/>
-          </a:prstGeom>
-          <a:noFill/>
-        </p:spPr>
-        <p:txBody>
-          <a:bodyPr wrap="square" rtlCol="0">
-            <a:spAutoFit/>
-          </a:bodyPr>
-          <a:lstStyle/>
-          <a:p>
-            <a:pPr algn="ctr"/>
-            <a:r>
-              <a:rPr lang="en-US" sz="3600" b="1" dirty="0">
-                <a:latin typeface="Source Sans Pro" panose="020B0503030403020204" pitchFamily="34" charset="0"/>
-              </a:rPr>
-              <a:t>Your Work is Already Python-Based</a:t>
-            </a:r>
-            <a:endParaRPr lang="en-US" sz="2800" b="1" dirty="0">
-              <a:latin typeface="Source Sans Pro" panose="020B0503030403020204" pitchFamily="34" charset="0"/>
-            </a:endParaRPr>
-          </a:p>
-          <a:p>
-            <a:pPr marL="342900" indent="-342900" algn="ctr">
-              <a:lnSpc>
-                <a:spcPct val="150000"/>
-              </a:lnSpc>
-              <a:buFont typeface="Arial" panose="020B0604020202020204" pitchFamily="34" charset="0"/>
-              <a:buChar char="•"/>
-            </a:pPr>
-            <a:r>
-              <a:rPr lang="en-US" sz="2800" dirty="0">
-                <a:latin typeface="Source Sans Pro" panose="020B0503030403020204" pitchFamily="34" charset="0"/>
-              </a:rPr>
-              <a:t>Run any Python function in the pool with minimal setup</a:t>
-            </a:r>
-          </a:p>
-          <a:p>
-            <a:pPr marL="342900" indent="-342900" algn="ctr">
-              <a:lnSpc>
-                <a:spcPct val="150000"/>
-              </a:lnSpc>
-              <a:buFont typeface="Arial" panose="020B0604020202020204" pitchFamily="34" charset="0"/>
-              <a:buChar char="•"/>
-            </a:pPr>
-            <a:r>
-              <a:rPr lang="en-US" sz="2800" dirty="0">
-                <a:latin typeface="Source Sans Pro" panose="020B0503030403020204" pitchFamily="34" charset="0"/>
-              </a:rPr>
-              <a:t>Use Python to seamlessly set up, execute, and process work</a:t>
-            </a:r>
-          </a:p>
-          <a:p>
-            <a:pPr marL="342900" indent="-342900" algn="ctr">
-              <a:lnSpc>
-                <a:spcPct val="150000"/>
-              </a:lnSpc>
-              <a:buFont typeface="Arial" panose="020B0604020202020204" pitchFamily="34" charset="0"/>
-              <a:buChar char="•"/>
-            </a:pPr>
-            <a:r>
-              <a:rPr lang="en-US" sz="2800" dirty="0">
-                <a:latin typeface="Source Sans Pro" panose="020B0503030403020204" pitchFamily="34" charset="0"/>
-              </a:rPr>
-              <a:t>Hide details of HTCondor where not necessary</a:t>
-            </a:r>
-          </a:p>
-        </p:txBody>
-      </p:sp>
-    </p:spTree>
-    <p:extLst>
-      <p:ext uri="{BB962C8B-B14F-4D97-AF65-F5344CB8AC3E}">
-        <p14:creationId xmlns:p14="http://schemas.microsoft.com/office/powerpoint/2010/main" val="2827798998"/>
-      </p:ext>
-    </p:extLst>
-  </p:cSld>
-  <p:clrMapOvr>
-    <a:masterClrMapping/>
-  </p:clrMapOvr>
-</p:sld>
-</file>
-
 <file path=ppt/slides/slide6.xml><?xml version="1.0" encoding="utf-8"?>
 <p:sld xmlns:a="http://schemas.openxmlformats.org/drawingml/2006/main" xmlns:r="http://schemas.openxmlformats.org/officeDocument/2006/relationships" xmlns:p="http://schemas.openxmlformats.org/presentationml/2006/main">
   <p:cSld>
@@ -8414,7 +7792,7 @@
         <p:spPr>
           <a:xfrm>
             <a:off x="1211274" y="1668763"/>
-            <a:ext cx="9769452" cy="3072508"/>
+            <a:ext cx="9769452" cy="2518510"/>
           </a:xfrm>
           <a:prstGeom prst="rect">
             <a:avLst/>
@@ -8432,7 +7810,7 @@
               <a:rPr lang="en-US" sz="3600" b="1" dirty="0">
                 <a:latin typeface="Source Sans Pro" panose="020B0503030403020204" pitchFamily="34" charset="0"/>
               </a:rPr>
-              <a:t>You Want to Wrap and Manage Jobs using Python</a:t>
+              <a:t>Your Work is Already Python-Based</a:t>
             </a:r>
             <a:endParaRPr lang="en-US" sz="2800" b="1" dirty="0">
               <a:latin typeface="Source Sans Pro" panose="020B0503030403020204" pitchFamily="34" charset="0"/>
@@ -8450,7 +7828,7 @@
               <a:rPr lang="en-US" sz="2800" dirty="0">
                 <a:latin typeface="Source Sans Pro" panose="020B0503030403020204" pitchFamily="34" charset="0"/>
               </a:rPr>
-              <a:t>Friendlier wrapper scripts than Bash</a:t>
+              <a:t>Run any Python function in the pool with minimal setup</a:t>
             </a:r>
           </a:p>
           <a:p>
@@ -8465,7 +7843,7 @@
               <a:rPr lang="en-US" sz="2800" dirty="0">
                 <a:latin typeface="Source Sans Pro" panose="020B0503030403020204" pitchFamily="34" charset="0"/>
               </a:rPr>
-              <a:t>Friendlier interface than raw HTCondor</a:t>
+              <a:t>Use Python to seamlessly set up, execute, and process work</a:t>
             </a:r>
           </a:p>
           <a:p>
@@ -8480,7 +7858,7 @@
               <a:rPr lang="en-US" sz="2800" dirty="0">
                 <a:latin typeface="Source Sans Pro" panose="020B0503030403020204" pitchFamily="34" charset="0"/>
               </a:rPr>
-              <a:t>Job Management in Python instead of Bash</a:t>
+              <a:t>Hide details of HTCondor where not necessary</a:t>
             </a:r>
           </a:p>
         </p:txBody>
@@ -8488,7 +7866,7 @@
     </p:spTree>
     <p:extLst>
       <p:ext uri="{BB962C8B-B14F-4D97-AF65-F5344CB8AC3E}">
-        <p14:creationId xmlns:p14="http://schemas.microsoft.com/office/powerpoint/2010/main" val="868836676"/>
+        <p14:creationId xmlns:p14="http://schemas.microsoft.com/office/powerpoint/2010/main" val="2827798998"/>
       </p:ext>
     </p:extLst>
   </p:cSld>
@@ -8520,7 +7898,7 @@
           <p:cNvPr id="2" name="Title 1">
             <a:extLst>
               <a:ext uri="{FF2B5EF4-FFF2-40B4-BE49-F238E27FC236}">
-                <a16:creationId xmlns:a16="http://schemas.microsoft.com/office/drawing/2014/main" id="{F09A4240-021F-4DE5-B2A0-051590DE7260}"/>
+                <a16:creationId xmlns:a16="http://schemas.microsoft.com/office/drawing/2014/main" id="{B8DCEF56-AC3E-477F-8BF0-5BE3AFC2269F}"/>
               </a:ext>
             </a:extLst>
           </p:cNvPr>
@@ -8538,7 +7916,7 @@
           <a:p>
             <a:r>
               <a:rPr lang="en-US" dirty="0"/>
-              <a:t>Tutorial Topics</a:t>
+              <a:t>Why use HTMap?</a:t>
             </a:r>
           </a:p>
         </p:txBody>
@@ -8548,7 +7926,7 @@
           <p:cNvPr id="3" name="Footer Placeholder 2">
             <a:extLst>
               <a:ext uri="{FF2B5EF4-FFF2-40B4-BE49-F238E27FC236}">
-                <a16:creationId xmlns:a16="http://schemas.microsoft.com/office/drawing/2014/main" id="{2EDE52F1-1C1C-4458-B3EE-01CDB1113FDD}"/>
+                <a16:creationId xmlns:a16="http://schemas.microsoft.com/office/drawing/2014/main" id="{F5C6BACE-1F1D-4609-81F1-76BD7CE9C92C}"/>
               </a:ext>
             </a:extLst>
           </p:cNvPr>
@@ -8577,7 +7955,7 @@
           <p:cNvPr id="4" name="Slide Number Placeholder 3">
             <a:extLst>
               <a:ext uri="{FF2B5EF4-FFF2-40B4-BE49-F238E27FC236}">
-                <a16:creationId xmlns:a16="http://schemas.microsoft.com/office/drawing/2014/main" id="{1833090F-1C82-443D-A4D5-16490A581F1D}"/>
+                <a16:creationId xmlns:a16="http://schemas.microsoft.com/office/drawing/2014/main" id="{9F0E4118-7A52-4EE2-9C7B-3A570D484D18}"/>
               </a:ext>
             </a:extLst>
           </p:cNvPr>
@@ -8606,7 +7984,7 @@
           <p:cNvPr id="5" name="TextBox 4">
             <a:extLst>
               <a:ext uri="{FF2B5EF4-FFF2-40B4-BE49-F238E27FC236}">
-                <a16:creationId xmlns:a16="http://schemas.microsoft.com/office/drawing/2014/main" id="{C74DFAE3-68E0-432E-85CD-38A0F42DE08A}"/>
+                <a16:creationId xmlns:a16="http://schemas.microsoft.com/office/drawing/2014/main" id="{3610684D-AEFD-47DF-B21F-27E8B2515A1E}"/>
               </a:ext>
             </a:extLst>
           </p:cNvPr>
@@ -8615,8 +7993,8 @@
         </p:nvSpPr>
         <p:spPr>
           <a:xfrm>
-            <a:off x="2641218" y="1100031"/>
-            <a:ext cx="8668466" cy="3709349"/>
+            <a:off x="981480" y="1675638"/>
+            <a:ext cx="10229039" cy="2517356"/>
           </a:xfrm>
           <a:prstGeom prst="rect">
             <a:avLst/>
@@ -8629,78 +8007,60 @@
           </a:bodyPr>
           <a:lstStyle/>
           <a:p>
-            <a:pPr marL="342900" indent="-342900">
+            <a:pPr algn="ctr"/>
+            <a:r>
+              <a:rPr lang="en-US" sz="3600" b="1" dirty="0">
+                <a:latin typeface="Source Sans Pro" panose="020B0503030403020204" pitchFamily="34" charset="0"/>
+              </a:rPr>
+              <a:t>You Want to Wrap and Manage Jobs using Python</a:t>
+            </a:r>
+            <a:endParaRPr lang="en-US" sz="2800" b="1" dirty="0">
+              <a:latin typeface="Source Sans Pro" panose="020B0503030403020204" pitchFamily="34" charset="0"/>
+            </a:endParaRPr>
+          </a:p>
+          <a:p>
+            <a:pPr marL="342900" indent="-342900" algn="ctr">
               <a:lnSpc>
                 <a:spcPct val="150000"/>
               </a:lnSpc>
-              <a:buFont typeface="+mj-lt"/>
-              <a:buAutoNum type="arabicPeriod"/>
+              <a:buFont typeface="Arial" panose="020B0604020202020204" pitchFamily="34" charset="0"/>
+              <a:buChar char="•"/>
             </a:pPr>
             <a:r>
-              <a:rPr lang="en-US" sz="3200" b="1" dirty="0">
+              <a:rPr lang="en-US" sz="2800" dirty="0">
                 <a:latin typeface="Source Sans Pro" panose="020B0503030403020204" pitchFamily="34" charset="0"/>
               </a:rPr>
-              <a:t>Basic Map Creation and Management</a:t>
-            </a:r>
-          </a:p>
-          <a:p>
-            <a:pPr marL="342900" indent="-342900">
+              <a:t>Friendlier wrapper scripts than Bash</a:t>
+            </a:r>
+          </a:p>
+          <a:p>
+            <a:pPr marL="342900" indent="-342900" algn="ctr">
               <a:lnSpc>
                 <a:spcPct val="150000"/>
               </a:lnSpc>
-              <a:buFont typeface="+mj-lt"/>
-              <a:buAutoNum type="arabicPeriod"/>
+              <a:buFont typeface="Arial" panose="020B0604020202020204" pitchFamily="34" charset="0"/>
+              <a:buChar char="•"/>
             </a:pPr>
             <a:r>
-              <a:rPr lang="en-US" sz="3200" dirty="0">
+              <a:rPr lang="en-US" sz="2800" dirty="0">
                 <a:latin typeface="Source Sans Pro" panose="020B0503030403020204" pitchFamily="34" charset="0"/>
               </a:rPr>
-              <a:t>Working with Input Files</a:t>
-            </a:r>
-          </a:p>
-          <a:p>
-            <a:pPr marL="342900" indent="-342900">
+              <a:t>Friendlier interface than raw HTCondor</a:t>
+            </a:r>
+          </a:p>
+          <a:p>
+            <a:pPr marL="342900" indent="-342900" algn="ctr">
               <a:lnSpc>
                 <a:spcPct val="150000"/>
               </a:lnSpc>
-              <a:buFont typeface="+mj-lt"/>
-              <a:buAutoNum type="arabicPeriod"/>
+              <a:buFont typeface="Arial" panose="020B0604020202020204" pitchFamily="34" charset="0"/>
+              <a:buChar char="•"/>
             </a:pPr>
             <a:r>
-              <a:rPr lang="en-US" sz="3200" dirty="0">
+              <a:rPr lang="en-US" sz="2800" dirty="0">
                 <a:latin typeface="Source Sans Pro" panose="020B0503030403020204" pitchFamily="34" charset="0"/>
               </a:rPr>
-              <a:t>Talking to HTCondor</a:t>
-            </a:r>
-          </a:p>
-          <a:p>
-            <a:pPr marL="342900" indent="-342900">
-              <a:lnSpc>
-                <a:spcPct val="150000"/>
-              </a:lnSpc>
-              <a:buFont typeface="+mj-lt"/>
-              <a:buAutoNum type="arabicPeriod"/>
-            </a:pPr>
-            <a:r>
-              <a:rPr lang="en-US" sz="3200" dirty="0">
-                <a:latin typeface="Source Sans Pro" panose="020B0503030403020204" pitchFamily="34" charset="0"/>
-              </a:rPr>
-              <a:t>Advanced Map Creation</a:t>
-            </a:r>
-          </a:p>
-          <a:p>
-            <a:pPr marL="342900" indent="-342900">
-              <a:lnSpc>
-                <a:spcPct val="150000"/>
-              </a:lnSpc>
-              <a:buFont typeface="+mj-lt"/>
-              <a:buAutoNum type="arabicPeriod"/>
-            </a:pPr>
-            <a:r>
-              <a:rPr lang="en-US" sz="3200" dirty="0">
-                <a:latin typeface="Source Sans Pro" panose="020B0503030403020204" pitchFamily="34" charset="0"/>
-              </a:rPr>
-              <a:t>Dealing with Errors</a:t>
+              <a:t>Job Management in Python instead of Bash</a:t>
             </a:r>
           </a:p>
         </p:txBody>
@@ -8708,7 +8068,7 @@
     </p:spTree>
     <p:extLst>
       <p:ext uri="{BB962C8B-B14F-4D97-AF65-F5344CB8AC3E}">
-        <p14:creationId xmlns:p14="http://schemas.microsoft.com/office/powerpoint/2010/main" val="1233298242"/>
+        <p14:creationId xmlns:p14="http://schemas.microsoft.com/office/powerpoint/2010/main" val="868836676"/>
       </p:ext>
     </p:extLst>
   </p:cSld>
@@ -8835,7 +8195,7 @@
         </p:nvSpPr>
         <p:spPr>
           <a:xfrm>
-            <a:off x="2641218" y="1100031"/>
+            <a:off x="2057400" y="1223785"/>
             <a:ext cx="8668466" cy="3709349"/>
           </a:xfrm>
           <a:prstGeom prst="rect">
@@ -8872,10 +8232,22 @@
               <a:buAutoNum type="arabicPeriod"/>
             </a:pPr>
             <a:r>
-              <a:rPr lang="en-US" sz="3200" b="1" dirty="0">
+              <a:rPr lang="en-US" sz="3200" dirty="0">
                 <a:latin typeface="Source Sans Pro" panose="020B0503030403020204" pitchFamily="34" charset="0"/>
               </a:rPr>
-              <a:t>Working with Input Files</a:t>
+              <a:t>Working with </a:t>
+            </a:r>
+            <a:r>
+              <a:rPr lang="en-US" sz="3200" dirty="0" err="1">
+                <a:latin typeface="Source Sans Pro" panose="020B0503030403020204" pitchFamily="34" charset="0"/>
+              </a:rPr>
+              <a:t>Input/Output</a:t>
+            </a:r>
+            <a:r>
+              <a:rPr lang="en-US" sz="3200" dirty="0">
+                <a:latin typeface="Source Sans Pro" panose="020B0503030403020204" pitchFamily="34" charset="0"/>
+              </a:rPr>
+              <a:t> Files</a:t>
             </a:r>
           </a:p>
           <a:p>
@@ -8890,7 +8262,7 @@
               <a:rPr lang="en-US" sz="3200" dirty="0">
                 <a:latin typeface="Source Sans Pro" panose="020B0503030403020204" pitchFamily="34" charset="0"/>
               </a:rPr>
-              <a:t>Talking to HTCondor</a:t>
+              <a:t>Map Options</a:t>
             </a:r>
           </a:p>
           <a:p>
@@ -8928,7 +8300,7 @@
     </p:spTree>
     <p:extLst>
       <p:ext uri="{BB962C8B-B14F-4D97-AF65-F5344CB8AC3E}">
-        <p14:creationId xmlns:p14="http://schemas.microsoft.com/office/powerpoint/2010/main" val="4237008838"/>
+        <p14:creationId xmlns:p14="http://schemas.microsoft.com/office/powerpoint/2010/main" val="1233298242"/>
       </p:ext>
     </p:extLst>
   </p:cSld>
@@ -8957,18 +8329,18 @@
       </p:grpSpPr>
       <p:sp>
         <p:nvSpPr>
-          <p:cNvPr id="2" name="Title 1">
-            <a:extLst>
-              <a:ext uri="{FF2B5EF4-FFF2-40B4-BE49-F238E27FC236}">
-                <a16:creationId xmlns:a16="http://schemas.microsoft.com/office/drawing/2014/main" id="{F09A4240-021F-4DE5-B2A0-051590DE7260}"/>
-              </a:ext>
-            </a:extLst>
-          </p:cNvPr>
-          <p:cNvSpPr>
-            <a:spLocks noGrp="1"/>
-          </p:cNvSpPr>
-          <p:nvPr>
-            <p:ph type="title"/>
+          <p:cNvPr id="3" name="Footer Placeholder 2">
+            <a:extLst>
+              <a:ext uri="{FF2B5EF4-FFF2-40B4-BE49-F238E27FC236}">
+                <a16:creationId xmlns:a16="http://schemas.microsoft.com/office/drawing/2014/main" id="{68CD3B55-49E1-4F61-B15F-C9FF4087EFE1}"/>
+              </a:ext>
+            </a:extLst>
+          </p:cNvPr>
+          <p:cNvSpPr>
+            <a:spLocks noGrp="1"/>
+          </p:cNvSpPr>
+          <p:nvPr>
+            <p:ph type="ftr" sz="quarter" idx="10"/>
           </p:nvPr>
         </p:nvSpPr>
         <p:spPr/>
@@ -8977,34 +8349,6 @@
           <a:lstStyle/>
           <a:p>
             <a:r>
-              <a:rPr lang="en-US" dirty="0"/>
-              <a:t>Tutorial Topics</a:t>
-            </a:r>
-          </a:p>
-        </p:txBody>
-      </p:sp>
-      <p:sp>
-        <p:nvSpPr>
-          <p:cNvPr id="3" name="Footer Placeholder 2">
-            <a:extLst>
-              <a:ext uri="{FF2B5EF4-FFF2-40B4-BE49-F238E27FC236}">
-                <a16:creationId xmlns:a16="http://schemas.microsoft.com/office/drawing/2014/main" id="{2EDE52F1-1C1C-4458-B3EE-01CDB1113FDD}"/>
-              </a:ext>
-            </a:extLst>
-          </p:cNvPr>
-          <p:cNvSpPr>
-            <a:spLocks noGrp="1"/>
-          </p:cNvSpPr>
-          <p:nvPr>
-            <p:ph type="ftr" sz="quarter" idx="10"/>
-          </p:nvPr>
-        </p:nvSpPr>
-        <p:spPr/>
-        <p:txBody>
-          <a:bodyPr/>
-          <a:lstStyle/>
-          <a:p>
-            <a:r>
               <a:rPr lang="en-US"/>
               <a:t>HTMap Workshop 2019-9-16</a:t>
             </a:r>
@@ -9017,7 +8361,7 @@
           <p:cNvPr id="4" name="Slide Number Placeholder 3">
             <a:extLst>
               <a:ext uri="{FF2B5EF4-FFF2-40B4-BE49-F238E27FC236}">
-                <a16:creationId xmlns:a16="http://schemas.microsoft.com/office/drawing/2014/main" id="{1833090F-1C82-443D-A4D5-16490A581F1D}"/>
+                <a16:creationId xmlns:a16="http://schemas.microsoft.com/office/drawing/2014/main" id="{4908D343-780E-4F9E-BBF7-C030BA74D5FE}"/>
               </a:ext>
             </a:extLst>
           </p:cNvPr>
@@ -9046,7 +8390,7 @@
           <p:cNvPr id="5" name="TextBox 4">
             <a:extLst>
               <a:ext uri="{FF2B5EF4-FFF2-40B4-BE49-F238E27FC236}">
-                <a16:creationId xmlns:a16="http://schemas.microsoft.com/office/drawing/2014/main" id="{C74DFAE3-68E0-432E-85CD-38A0F42DE08A}"/>
+                <a16:creationId xmlns:a16="http://schemas.microsoft.com/office/drawing/2014/main" id="{AEF883F7-46DC-48B6-8653-57AA27EBFADD}"/>
               </a:ext>
             </a:extLst>
           </p:cNvPr>
@@ -9055,8 +8399,8 @@
         </p:nvSpPr>
         <p:spPr>
           <a:xfrm>
-            <a:off x="2641218" y="1100031"/>
-            <a:ext cx="8668466" cy="3709349"/>
+            <a:off x="1713067" y="839820"/>
+            <a:ext cx="8765866" cy="3840795"/>
           </a:xfrm>
           <a:prstGeom prst="rect">
             <a:avLst/>
@@ -9069,78 +8413,65 @@
           </a:bodyPr>
           <a:lstStyle/>
           <a:p>
-            <a:pPr marL="342900" indent="-342900">
+            <a:pPr algn="ctr"/>
+            <a:r>
+              <a:rPr lang="en-US" sz="8000" b="1" dirty="0">
+                <a:latin typeface="Source Sans Pro" panose="020B0503030403020204" pitchFamily="34" charset="0"/>
+                <a:ea typeface="Source Sans Pro" panose="020B0503030403020204" pitchFamily="34" charset="0"/>
+              </a:rPr>
+              <a:t>Break!</a:t>
+            </a:r>
+          </a:p>
+          <a:p>
+            <a:pPr algn="ctr"/>
+            <a:endParaRPr lang="en-US" sz="2800" dirty="0">
+              <a:latin typeface="Source Sans Pro" panose="020B0503030403020204" pitchFamily="34" charset="0"/>
+              <a:ea typeface="Source Sans Pro" panose="020B0503030403020204" pitchFamily="34" charset="0"/>
+            </a:endParaRPr>
+          </a:p>
+          <a:p>
+            <a:pPr marL="285750" indent="-285750">
               <a:lnSpc>
                 <a:spcPct val="150000"/>
               </a:lnSpc>
-              <a:buFont typeface="+mj-lt"/>
-              <a:buAutoNum type="arabicPeriod"/>
+              <a:buFont typeface="Arial" panose="020B0604020202020204" pitchFamily="34" charset="0"/>
+              <a:buChar char="•"/>
             </a:pPr>
             <a:r>
-              <a:rPr lang="en-US" sz="3200" dirty="0">
-                <a:latin typeface="Source Sans Pro" panose="020B0503030403020204" pitchFamily="34" charset="0"/>
+              <a:rPr lang="en-US" sz="2800" dirty="0">
+                <a:latin typeface="Source Sans Pro" panose="020B0503030403020204" pitchFamily="34" charset="0"/>
+                <a:ea typeface="Source Sans Pro" panose="020B0503030403020204" pitchFamily="34" charset="0"/>
               </a:rPr>
-              <a:t>Basic Map Creation and Management</a:t>
-            </a:r>
-          </a:p>
-          <a:p>
-            <a:pPr marL="342900" indent="-342900">
+              <a:t>Get up and stretch your legs</a:t>
+            </a:r>
+          </a:p>
+          <a:p>
+            <a:pPr marL="285750" indent="-285750">
+              <a:buFont typeface="Arial" panose="020B0604020202020204" pitchFamily="34" charset="0"/>
+              <a:buChar char="•"/>
+            </a:pPr>
+            <a:r>
+              <a:rPr lang="en-US" sz="2800" dirty="0">
+                <a:latin typeface="Source Sans Pro" panose="020B0503030403020204" pitchFamily="34" charset="0"/>
+                <a:ea typeface="Source Sans Pro" panose="020B0503030403020204" pitchFamily="34" charset="0"/>
+              </a:rPr>
+              <a:t>Discuss your current workflows with your table-mates; think about how HTMap might be useful in them</a:t>
+            </a:r>
+          </a:p>
+          <a:p>
+            <a:pPr marL="285750" indent="-285750">
               <a:lnSpc>
                 <a:spcPct val="150000"/>
               </a:lnSpc>
-              <a:buFont typeface="+mj-lt"/>
-              <a:buAutoNum type="arabicPeriod"/>
+              <a:buFont typeface="Arial" panose="020B0604020202020204" pitchFamily="34" charset="0"/>
+              <a:buChar char="•"/>
             </a:pPr>
             <a:r>
-              <a:rPr lang="en-US" sz="3200" dirty="0">
-                <a:latin typeface="Source Sans Pro" panose="020B0503030403020204" pitchFamily="34" charset="0"/>
+              <a:rPr lang="en-US" sz="2800" dirty="0">
+                <a:latin typeface="Source Sans Pro" panose="020B0503030403020204" pitchFamily="34" charset="0"/>
+                <a:ea typeface="Source Sans Pro" panose="020B0503030403020204" pitchFamily="34" charset="0"/>
               </a:rPr>
-              <a:t>Working with Input Files</a:t>
-            </a:r>
-          </a:p>
-          <a:p>
-            <a:pPr marL="342900" indent="-342900">
-              <a:lnSpc>
-                <a:spcPct val="150000"/>
-              </a:lnSpc>
-              <a:buFont typeface="+mj-lt"/>
-              <a:buAutoNum type="arabicPeriod"/>
-            </a:pPr>
-            <a:r>
-              <a:rPr lang="en-US" sz="3200" b="1" dirty="0">
-                <a:latin typeface="Source Sans Pro" panose="020B0503030403020204" pitchFamily="34" charset="0"/>
-              </a:rPr>
-              <a:t>Talking to HTCondor</a:t>
-            </a:r>
-          </a:p>
-          <a:p>
-            <a:pPr marL="342900" indent="-342900">
-              <a:lnSpc>
-                <a:spcPct val="150000"/>
-              </a:lnSpc>
-              <a:buFont typeface="+mj-lt"/>
-              <a:buAutoNum type="arabicPeriod"/>
-            </a:pPr>
-            <a:r>
-              <a:rPr lang="en-US" sz="3200" dirty="0">
-                <a:latin typeface="Source Sans Pro" panose="020B0503030403020204" pitchFamily="34" charset="0"/>
-              </a:rPr>
-              <a:t>Advanced Map Creation</a:t>
-            </a:r>
-          </a:p>
-          <a:p>
-            <a:pPr marL="342900" indent="-342900">
-              <a:lnSpc>
-                <a:spcPct val="150000"/>
-              </a:lnSpc>
-              <a:buFont typeface="+mj-lt"/>
-              <a:buAutoNum type="arabicPeriod"/>
-            </a:pPr>
-            <a:r>
-              <a:rPr lang="en-US" sz="3200" dirty="0">
-                <a:latin typeface="Source Sans Pro" panose="020B0503030403020204" pitchFamily="34" charset="0"/>
-              </a:rPr>
-              <a:t>Dealing with Errors</a:t>
+              <a:t>Ask me or helpers questions</a:t>
             </a:r>
           </a:p>
         </p:txBody>
@@ -9148,7 +8479,7 @@
     </p:spTree>
     <p:extLst>
       <p:ext uri="{BB962C8B-B14F-4D97-AF65-F5344CB8AC3E}">
-        <p14:creationId xmlns:p14="http://schemas.microsoft.com/office/powerpoint/2010/main" val="1416513808"/>
+        <p14:creationId xmlns:p14="http://schemas.microsoft.com/office/powerpoint/2010/main" val="1912212947"/>
       </p:ext>
     </p:extLst>
   </p:cSld>

</xml_diff>

<commit_message>
tweak example goals slides
</commit_message>
<xml_diff>
--- a/slides/HTMapWorkshop.pptx
+++ b/slides/HTMapWorkshop.pptx
@@ -5091,7 +5091,7 @@
         <p:spPr>
           <a:xfrm>
             <a:off x="2057400" y="1148158"/>
-            <a:ext cx="8312102" cy="2723053"/>
+            <a:ext cx="8312102" cy="3461717"/>
           </a:xfrm>
           <a:prstGeom prst="rect">
             <a:avLst/>
@@ -5145,7 +5145,23 @@
                 <a:latin typeface="Source Sans Pro" panose="020B0503030403020204" pitchFamily="34" charset="0"/>
                 <a:ea typeface="Source Sans Pro" panose="020B0503030403020204" pitchFamily="34" charset="0"/>
               </a:rPr>
-              <a:t>Write reusable scripts</a:t>
+              <a:t>Write scripts that create maps</a:t>
+            </a:r>
+          </a:p>
+          <a:p>
+            <a:pPr marL="285750" indent="-285750">
+              <a:lnSpc>
+                <a:spcPct val="150000"/>
+              </a:lnSpc>
+              <a:buFont typeface="Arial" panose="020B0604020202020204" pitchFamily="34" charset="0"/>
+              <a:buChar char="•"/>
+            </a:pPr>
+            <a:r>
+              <a:rPr lang="en-US" sz="3200" dirty="0">
+                <a:latin typeface="Source Sans Pro" panose="020B0503030403020204" pitchFamily="34" charset="0"/>
+                <a:ea typeface="Source Sans Pro" panose="020B0503030403020204" pitchFamily="34" charset="0"/>
+              </a:rPr>
+              <a:t>Use Python to generate inputs</a:t>
             </a:r>
           </a:p>
           <a:p>

</xml_diff>

<commit_message>
reorg, add new slide on built-in map, add text file for transfer tutorial
</commit_message>
<xml_diff>
--- a/slides/HTMapWorkshop.pptx
+++ b/slides/HTMapWorkshop.pptx
@@ -6,35 +6,36 @@
     <p:sldMasterId id="2147483663" r:id="rId2"/>
   </p:sldMasterIdLst>
   <p:notesMasterIdLst>
-    <p:notesMasterId r:id="rId14"/>
+    <p:notesMasterId r:id="rId15"/>
   </p:notesMasterIdLst>
   <p:sldIdLst>
     <p:sldId id="256" r:id="rId3"/>
     <p:sldId id="272" r:id="rId4"/>
     <p:sldId id="258" r:id="rId5"/>
     <p:sldId id="259" r:id="rId6"/>
-    <p:sldId id="261" r:id="rId7"/>
-    <p:sldId id="262" r:id="rId8"/>
-    <p:sldId id="264" r:id="rId9"/>
-    <p:sldId id="265" r:id="rId10"/>
-    <p:sldId id="271" r:id="rId11"/>
-    <p:sldId id="270" r:id="rId12"/>
-    <p:sldId id="257" r:id="rId13"/>
+    <p:sldId id="276" r:id="rId7"/>
+    <p:sldId id="275" r:id="rId8"/>
+    <p:sldId id="262" r:id="rId9"/>
+    <p:sldId id="264" r:id="rId10"/>
+    <p:sldId id="265" r:id="rId11"/>
+    <p:sldId id="271" r:id="rId12"/>
+    <p:sldId id="270" r:id="rId13"/>
+    <p:sldId id="257" r:id="rId14"/>
   </p:sldIdLst>
   <p:sldSz cx="12192000" cy="6858000"/>
   <p:notesSz cx="6858000" cy="9144000"/>
   <p:embeddedFontLst>
     <p:embeddedFont>
       <p:font typeface="Source Code Pro" panose="020B0509030403020204" pitchFamily="49" charset="0"/>
-      <p:regular r:id="rId15"/>
-      <p:bold r:id="rId16"/>
+      <p:regular r:id="rId16"/>
+      <p:bold r:id="rId17"/>
     </p:embeddedFont>
     <p:embeddedFont>
       <p:font typeface="Source Sans Pro" panose="020B0503030403020204" pitchFamily="34" charset="0"/>
-      <p:regular r:id="rId17"/>
-      <p:bold r:id="rId18"/>
-      <p:italic r:id="rId19"/>
-      <p:boldItalic r:id="rId20"/>
+      <p:regular r:id="rId18"/>
+      <p:bold r:id="rId19"/>
+      <p:italic r:id="rId20"/>
+      <p:boldItalic r:id="rId21"/>
     </p:embeddedFont>
   </p:embeddedFontLst>
   <p:defaultTextStyle>
@@ -149,7 +150,8 @@
         <p14:section name="Theory" id="{E79B42F7-5339-4580-87FE-57CB50C29E9D}">
           <p14:sldIdLst>
             <p14:sldId id="259"/>
-            <p14:sldId id="261"/>
+            <p14:sldId id="276"/>
+            <p14:sldId id="275"/>
             <p14:sldId id="262"/>
             <p14:sldId id="264"/>
           </p14:sldIdLst>
@@ -270,7 +272,7 @@
             <a:fld id="{C2190C43-0954-4454-9B3A-7899E18A0806}" type="datetimeFigureOut">
               <a:rPr lang="en-US" smtClean="0"/>
               <a:pPr/>
-              <a:t>9/10/2019</a:t>
+              <a:t>9/13/2019</a:t>
             </a:fld>
             <a:endParaRPr lang="en-US" dirty="0"/>
           </a:p>
@@ -4992,18 +4994,18 @@
       </p:grpSpPr>
       <p:sp>
         <p:nvSpPr>
-          <p:cNvPr id="2" name="Title 1">
-            <a:extLst>
-              <a:ext uri="{FF2B5EF4-FFF2-40B4-BE49-F238E27FC236}">
-                <a16:creationId xmlns:a16="http://schemas.microsoft.com/office/drawing/2014/main" id="{4289BA8B-0B39-4DB3-8945-30EA0162A6F2}"/>
-              </a:ext>
-            </a:extLst>
-          </p:cNvPr>
-          <p:cNvSpPr>
-            <a:spLocks noGrp="1"/>
-          </p:cNvSpPr>
-          <p:nvPr>
-            <p:ph type="title"/>
+          <p:cNvPr id="3" name="Footer Placeholder 2">
+            <a:extLst>
+              <a:ext uri="{FF2B5EF4-FFF2-40B4-BE49-F238E27FC236}">
+                <a16:creationId xmlns:a16="http://schemas.microsoft.com/office/drawing/2014/main" id="{68CD3B55-49E1-4F61-B15F-C9FF4087EFE1}"/>
+              </a:ext>
+            </a:extLst>
+          </p:cNvPr>
+          <p:cNvSpPr>
+            <a:spLocks noGrp="1"/>
+          </p:cNvSpPr>
+          <p:nvPr>
+            <p:ph type="ftr" sz="quarter" idx="10"/>
           </p:nvPr>
         </p:nvSpPr>
         <p:spPr/>
@@ -5012,34 +5014,6 @@
           <a:lstStyle/>
           <a:p>
             <a:r>
-              <a:rPr lang="en-US" dirty="0"/>
-              <a:t>Example Project: Book Analysis</a:t>
-            </a:r>
-          </a:p>
-        </p:txBody>
-      </p:sp>
-      <p:sp>
-        <p:nvSpPr>
-          <p:cNvPr id="3" name="Footer Placeholder 2">
-            <a:extLst>
-              <a:ext uri="{FF2B5EF4-FFF2-40B4-BE49-F238E27FC236}">
-                <a16:creationId xmlns:a16="http://schemas.microsoft.com/office/drawing/2014/main" id="{879DFF3E-8371-4FDB-8CF6-6ED53BD101D6}"/>
-              </a:ext>
-            </a:extLst>
-          </p:cNvPr>
-          <p:cNvSpPr>
-            <a:spLocks noGrp="1"/>
-          </p:cNvSpPr>
-          <p:nvPr>
-            <p:ph type="ftr" sz="quarter" idx="10"/>
-          </p:nvPr>
-        </p:nvSpPr>
-        <p:spPr/>
-        <p:txBody>
-          <a:bodyPr/>
-          <a:lstStyle/>
-          <a:p>
-            <a:r>
               <a:rPr lang="en-US"/>
               <a:t>HTMap Workshop 2019-9-16</a:t>
             </a:r>
@@ -5052,7 +5026,7 @@
           <p:cNvPr id="4" name="Slide Number Placeholder 3">
             <a:extLst>
               <a:ext uri="{FF2B5EF4-FFF2-40B4-BE49-F238E27FC236}">
-                <a16:creationId xmlns:a16="http://schemas.microsoft.com/office/drawing/2014/main" id="{7D14373A-351E-45D3-9446-83A532CB3C35}"/>
+                <a16:creationId xmlns:a16="http://schemas.microsoft.com/office/drawing/2014/main" id="{4908D343-780E-4F9E-BBF7-C030BA74D5FE}"/>
               </a:ext>
             </a:extLst>
           </p:cNvPr>
@@ -5081,7 +5055,7 @@
           <p:cNvPr id="5" name="TextBox 4">
             <a:extLst>
               <a:ext uri="{FF2B5EF4-FFF2-40B4-BE49-F238E27FC236}">
-                <a16:creationId xmlns:a16="http://schemas.microsoft.com/office/drawing/2014/main" id="{011506DA-A5D3-4E82-8895-2B77C8AC5C46}"/>
+                <a16:creationId xmlns:a16="http://schemas.microsoft.com/office/drawing/2014/main" id="{AEF883F7-46DC-48B6-8653-57AA27EBFADD}"/>
               </a:ext>
             </a:extLst>
           </p:cNvPr>
@@ -5090,8 +5064,8 @@
         </p:nvSpPr>
         <p:spPr>
           <a:xfrm>
-            <a:off x="2057400" y="1148158"/>
-            <a:ext cx="8312102" cy="3461717"/>
+            <a:off x="1146437" y="812319"/>
+            <a:ext cx="9899125" cy="4271682"/>
           </a:xfrm>
           <a:prstGeom prst="rect">
             <a:avLst/>
@@ -5104,14 +5078,18 @@
           </a:bodyPr>
           <a:lstStyle/>
           <a:p>
-            <a:r>
-              <a:rPr lang="en-US" sz="3200" b="1" u="sng" dirty="0">
+            <a:pPr algn="ctr"/>
+            <a:r>
+              <a:rPr lang="en-US" sz="8000" b="1" dirty="0">
                 <a:latin typeface="Source Sans Pro" panose="020B0503030403020204" pitchFamily="34" charset="0"/>
                 <a:ea typeface="Source Sans Pro" panose="020B0503030403020204" pitchFamily="34" charset="0"/>
               </a:rPr>
-              <a:t>Goals</a:t>
-            </a:r>
-            <a:endParaRPr lang="en-US" sz="3200" u="sng" dirty="0">
+              <a:t>Break!</a:t>
+            </a:r>
+          </a:p>
+          <a:p>
+            <a:pPr algn="ctr"/>
+            <a:endParaRPr lang="en-US" sz="2800" dirty="0">
               <a:latin typeface="Source Sans Pro" panose="020B0503030403020204" pitchFamily="34" charset="0"/>
               <a:ea typeface="Source Sans Pro" panose="020B0503030403020204" pitchFamily="34" charset="0"/>
             </a:endParaRPr>
@@ -5125,11 +5103,11 @@
               <a:buChar char="•"/>
             </a:pPr>
             <a:r>
-              <a:rPr lang="en-US" sz="3200" dirty="0">
+              <a:rPr lang="en-US" sz="2800" dirty="0">
                 <a:latin typeface="Source Sans Pro" panose="020B0503030403020204" pitchFamily="34" charset="0"/>
                 <a:ea typeface="Source Sans Pro" panose="020B0503030403020204" pitchFamily="34" charset="0"/>
               </a:rPr>
-              <a:t>Work on a more concrete problem</a:t>
+              <a:t>Get up and stretch your legs</a:t>
             </a:r>
           </a:p>
           <a:p>
@@ -5141,11 +5119,11 @@
               <a:buChar char="•"/>
             </a:pPr>
             <a:r>
-              <a:rPr lang="en-US" sz="3200" dirty="0">
+              <a:rPr lang="en-US" sz="2800" dirty="0">
                 <a:latin typeface="Source Sans Pro" panose="020B0503030403020204" pitchFamily="34" charset="0"/>
                 <a:ea typeface="Source Sans Pro" panose="020B0503030403020204" pitchFamily="34" charset="0"/>
               </a:rPr>
-              <a:t>Write scripts that create maps</a:t>
+              <a:t>Discuss your current workflows with your table-mates</a:t>
             </a:r>
           </a:p>
           <a:p>
@@ -5157,11 +5135,11 @@
               <a:buChar char="•"/>
             </a:pPr>
             <a:r>
-              <a:rPr lang="en-US" sz="3200" dirty="0">
+              <a:rPr lang="en-US" sz="2800" dirty="0">
                 <a:latin typeface="Source Sans Pro" panose="020B0503030403020204" pitchFamily="34" charset="0"/>
                 <a:ea typeface="Source Sans Pro" panose="020B0503030403020204" pitchFamily="34" charset="0"/>
               </a:rPr>
-              <a:t>Use Python to generate inputs</a:t>
+              <a:t>Discuss how HTMap might be useful in current/future work</a:t>
             </a:r>
           </a:p>
           <a:p>
@@ -5173,11 +5151,11 @@
               <a:buChar char="•"/>
             </a:pPr>
             <a:r>
-              <a:rPr lang="en-US" sz="3200" dirty="0">
+              <a:rPr lang="en-US" sz="2800" dirty="0">
                 <a:latin typeface="Source Sans Pro" panose="020B0503030403020204" pitchFamily="34" charset="0"/>
                 <a:ea typeface="Source Sans Pro" panose="020B0503030403020204" pitchFamily="34" charset="0"/>
               </a:rPr>
-              <a:t>Use CLI for quick map management</a:t>
+              <a:t>Ask me or helpers questions</a:t>
             </a:r>
           </a:p>
         </p:txBody>
@@ -5185,7 +5163,7 @@
     </p:spTree>
     <p:extLst>
       <p:ext uri="{BB962C8B-B14F-4D97-AF65-F5344CB8AC3E}">
-        <p14:creationId xmlns:p14="http://schemas.microsoft.com/office/powerpoint/2010/main" val="1085955525"/>
+        <p14:creationId xmlns:p14="http://schemas.microsoft.com/office/powerpoint/2010/main" val="1912212947"/>
       </p:ext>
     </p:extLst>
   </p:cSld>
@@ -5217,6 +5195,228 @@
           <p:cNvPr id="2" name="Title 1">
             <a:extLst>
               <a:ext uri="{FF2B5EF4-FFF2-40B4-BE49-F238E27FC236}">
+                <a16:creationId xmlns:a16="http://schemas.microsoft.com/office/drawing/2014/main" id="{4289BA8B-0B39-4DB3-8945-30EA0162A6F2}"/>
+              </a:ext>
+            </a:extLst>
+          </p:cNvPr>
+          <p:cNvSpPr>
+            <a:spLocks noGrp="1"/>
+          </p:cNvSpPr>
+          <p:nvPr>
+            <p:ph type="title"/>
+          </p:nvPr>
+        </p:nvSpPr>
+        <p:spPr/>
+        <p:txBody>
+          <a:bodyPr/>
+          <a:lstStyle/>
+          <a:p>
+            <a:r>
+              <a:rPr lang="en-US" dirty="0"/>
+              <a:t>Example Project: Book Analysis</a:t>
+            </a:r>
+          </a:p>
+        </p:txBody>
+      </p:sp>
+      <p:sp>
+        <p:nvSpPr>
+          <p:cNvPr id="3" name="Footer Placeholder 2">
+            <a:extLst>
+              <a:ext uri="{FF2B5EF4-FFF2-40B4-BE49-F238E27FC236}">
+                <a16:creationId xmlns:a16="http://schemas.microsoft.com/office/drawing/2014/main" id="{879DFF3E-8371-4FDB-8CF6-6ED53BD101D6}"/>
+              </a:ext>
+            </a:extLst>
+          </p:cNvPr>
+          <p:cNvSpPr>
+            <a:spLocks noGrp="1"/>
+          </p:cNvSpPr>
+          <p:nvPr>
+            <p:ph type="ftr" sz="quarter" idx="10"/>
+          </p:nvPr>
+        </p:nvSpPr>
+        <p:spPr/>
+        <p:txBody>
+          <a:bodyPr/>
+          <a:lstStyle/>
+          <a:p>
+            <a:r>
+              <a:rPr lang="en-US"/>
+              <a:t>HTMap Workshop 2019-9-16</a:t>
+            </a:r>
+            <a:endParaRPr lang="en-US" dirty="0"/>
+          </a:p>
+        </p:txBody>
+      </p:sp>
+      <p:sp>
+        <p:nvSpPr>
+          <p:cNvPr id="4" name="Slide Number Placeholder 3">
+            <a:extLst>
+              <a:ext uri="{FF2B5EF4-FFF2-40B4-BE49-F238E27FC236}">
+                <a16:creationId xmlns:a16="http://schemas.microsoft.com/office/drawing/2014/main" id="{7D14373A-351E-45D3-9446-83A532CB3C35}"/>
+              </a:ext>
+            </a:extLst>
+          </p:cNvPr>
+          <p:cNvSpPr>
+            <a:spLocks noGrp="1"/>
+          </p:cNvSpPr>
+          <p:nvPr>
+            <p:ph type="sldNum" sz="quarter" idx="11"/>
+          </p:nvPr>
+        </p:nvSpPr>
+        <p:spPr/>
+        <p:txBody>
+          <a:bodyPr/>
+          <a:lstStyle/>
+          <a:p>
+            <a:fld id="{65011DE2-3A5B-41D4-A661-103799ABD939}" type="slidenum">
+              <a:rPr lang="en-US" smtClean="0"/>
+              <a:t>11</a:t>
+            </a:fld>
+            <a:endParaRPr lang="en-US"/>
+          </a:p>
+        </p:txBody>
+      </p:sp>
+      <p:sp>
+        <p:nvSpPr>
+          <p:cNvPr id="5" name="TextBox 4">
+            <a:extLst>
+              <a:ext uri="{FF2B5EF4-FFF2-40B4-BE49-F238E27FC236}">
+                <a16:creationId xmlns:a16="http://schemas.microsoft.com/office/drawing/2014/main" id="{011506DA-A5D3-4E82-8895-2B77C8AC5C46}"/>
+              </a:ext>
+            </a:extLst>
+          </p:cNvPr>
+          <p:cNvSpPr txBox="1"/>
+          <p:nvPr/>
+        </p:nvSpPr>
+        <p:spPr>
+          <a:xfrm>
+            <a:off x="2057400" y="1148158"/>
+            <a:ext cx="8312102" cy="3461717"/>
+          </a:xfrm>
+          <a:prstGeom prst="rect">
+            <a:avLst/>
+          </a:prstGeom>
+          <a:noFill/>
+        </p:spPr>
+        <p:txBody>
+          <a:bodyPr wrap="square" rtlCol="0">
+            <a:spAutoFit/>
+          </a:bodyPr>
+          <a:lstStyle/>
+          <a:p>
+            <a:r>
+              <a:rPr lang="en-US" sz="3200" b="1" u="sng" dirty="0">
+                <a:latin typeface="Source Sans Pro" panose="020B0503030403020204" pitchFamily="34" charset="0"/>
+                <a:ea typeface="Source Sans Pro" panose="020B0503030403020204" pitchFamily="34" charset="0"/>
+              </a:rPr>
+              <a:t>Goals</a:t>
+            </a:r>
+            <a:endParaRPr lang="en-US" sz="3200" u="sng" dirty="0">
+              <a:latin typeface="Source Sans Pro" panose="020B0503030403020204" pitchFamily="34" charset="0"/>
+              <a:ea typeface="Source Sans Pro" panose="020B0503030403020204" pitchFamily="34" charset="0"/>
+            </a:endParaRPr>
+          </a:p>
+          <a:p>
+            <a:pPr marL="285750" indent="-285750">
+              <a:lnSpc>
+                <a:spcPct val="150000"/>
+              </a:lnSpc>
+              <a:buFont typeface="Arial" panose="020B0604020202020204" pitchFamily="34" charset="0"/>
+              <a:buChar char="•"/>
+            </a:pPr>
+            <a:r>
+              <a:rPr lang="en-US" sz="3200" dirty="0">
+                <a:latin typeface="Source Sans Pro" panose="020B0503030403020204" pitchFamily="34" charset="0"/>
+                <a:ea typeface="Source Sans Pro" panose="020B0503030403020204" pitchFamily="34" charset="0"/>
+              </a:rPr>
+              <a:t>Work on a more concrete problem</a:t>
+            </a:r>
+          </a:p>
+          <a:p>
+            <a:pPr marL="285750" indent="-285750">
+              <a:lnSpc>
+                <a:spcPct val="150000"/>
+              </a:lnSpc>
+              <a:buFont typeface="Arial" panose="020B0604020202020204" pitchFamily="34" charset="0"/>
+              <a:buChar char="•"/>
+            </a:pPr>
+            <a:r>
+              <a:rPr lang="en-US" sz="3200" dirty="0">
+                <a:latin typeface="Source Sans Pro" panose="020B0503030403020204" pitchFamily="34" charset="0"/>
+                <a:ea typeface="Source Sans Pro" panose="020B0503030403020204" pitchFamily="34" charset="0"/>
+              </a:rPr>
+              <a:t>Write scripts that create maps</a:t>
+            </a:r>
+          </a:p>
+          <a:p>
+            <a:pPr marL="285750" indent="-285750">
+              <a:lnSpc>
+                <a:spcPct val="150000"/>
+              </a:lnSpc>
+              <a:buFont typeface="Arial" panose="020B0604020202020204" pitchFamily="34" charset="0"/>
+              <a:buChar char="•"/>
+            </a:pPr>
+            <a:r>
+              <a:rPr lang="en-US" sz="3200" dirty="0">
+                <a:latin typeface="Source Sans Pro" panose="020B0503030403020204" pitchFamily="34" charset="0"/>
+                <a:ea typeface="Source Sans Pro" panose="020B0503030403020204" pitchFamily="34" charset="0"/>
+              </a:rPr>
+              <a:t>Use Python to find input files</a:t>
+            </a:r>
+          </a:p>
+          <a:p>
+            <a:pPr marL="285750" indent="-285750">
+              <a:lnSpc>
+                <a:spcPct val="150000"/>
+              </a:lnSpc>
+              <a:buFont typeface="Arial" panose="020B0604020202020204" pitchFamily="34" charset="0"/>
+              <a:buChar char="•"/>
+            </a:pPr>
+            <a:r>
+              <a:rPr lang="en-US" sz="3200" dirty="0">
+                <a:latin typeface="Source Sans Pro" panose="020B0503030403020204" pitchFamily="34" charset="0"/>
+                <a:ea typeface="Source Sans Pro" panose="020B0503030403020204" pitchFamily="34" charset="0"/>
+              </a:rPr>
+              <a:t>Use CLI for quick map management</a:t>
+            </a:r>
+          </a:p>
+        </p:txBody>
+      </p:sp>
+    </p:spTree>
+    <p:extLst>
+      <p:ext uri="{BB962C8B-B14F-4D97-AF65-F5344CB8AC3E}">
+        <p14:creationId xmlns:p14="http://schemas.microsoft.com/office/powerpoint/2010/main" val="1085955525"/>
+      </p:ext>
+    </p:extLst>
+  </p:cSld>
+  <p:clrMapOvr>
+    <a:masterClrMapping/>
+  </p:clrMapOvr>
+</p:sld>
+</file>
+
+<file path=ppt/slides/slide12.xml><?xml version="1.0" encoding="utf-8"?>
+<p:sld xmlns:a="http://schemas.openxmlformats.org/drawingml/2006/main" xmlns:r="http://schemas.openxmlformats.org/officeDocument/2006/relationships" xmlns:p="http://schemas.openxmlformats.org/presentationml/2006/main">
+  <p:cSld>
+    <p:spTree>
+      <p:nvGrpSpPr>
+        <p:cNvPr id="1" name=""/>
+        <p:cNvGrpSpPr/>
+        <p:nvPr/>
+      </p:nvGrpSpPr>
+      <p:grpSpPr>
+        <a:xfrm>
+          <a:off x="0" y="0"/>
+          <a:ext cx="0" cy="0"/>
+          <a:chOff x="0" y="0"/>
+          <a:chExt cx="0" cy="0"/>
+        </a:xfrm>
+      </p:grpSpPr>
+      <p:sp>
+        <p:nvSpPr>
+          <p:cNvPr id="2" name="Title 1">
+            <a:extLst>
+              <a:ext uri="{FF2B5EF4-FFF2-40B4-BE49-F238E27FC236}">
                 <a16:creationId xmlns:a16="http://schemas.microsoft.com/office/drawing/2014/main" id="{AF87598A-1002-492C-9FC6-D037361BB257}"/>
               </a:ext>
             </a:extLst>
@@ -5284,7 +5484,7 @@
                 <a:latin typeface="Source Sans Pro" panose="020B0503030403020204" pitchFamily="34" charset="0"/>
                 <a:ea typeface="Source Sans Pro" panose="020B0503030403020204" pitchFamily="34" charset="0"/>
               </a:rPr>
-              <a:t>(including tutorials, API documentation, FAQ, and advanced recipes)</a:t>
+              <a:t>(including more tutorials, API documentation, FAQ, and advanced recipes)</a:t>
             </a:r>
           </a:p>
           <a:p>
@@ -5326,7 +5526,7 @@
                 <a:latin typeface="Source Sans Pro" panose="020B0503030403020204" pitchFamily="34" charset="0"/>
                 <a:ea typeface="Source Sans Pro" panose="020B0503030403020204" pitchFamily="34" charset="0"/>
               </a:rPr>
-              <a:t>(including these slides and canonical solutions to examples)</a:t>
+              <a:t>(including these slides and canonical solutions to the examples)</a:t>
             </a:r>
           </a:p>
           <a:p>
@@ -5337,7 +5537,7 @@
                 <a:ea typeface="Source Sans Pro" panose="020B0503030403020204" pitchFamily="34" charset="0"/>
                 <a:hlinkClick r:id="rId3"/>
               </a:rPr>
-              <a:t>https://github.com/htcondor/htmap</a:t>
+              <a:t>https://github.com/CHTC/htmap-workshop-materials</a:t>
             </a:r>
             <a:endParaRPr lang="en-US" sz="2400" dirty="0">
               <a:latin typeface="Source Sans Pro" panose="020B0503030403020204" pitchFamily="34" charset="0"/>
@@ -5379,7 +5579,7 @@
                 <a:ea typeface="Source Sans Pro" panose="020B0503030403020204" pitchFamily="34" charset="0"/>
                 <a:hlinkClick r:id="rId4"/>
               </a:rPr>
-              <a:t>https://github.com/CHTC/htmap-workshop-materials</a:t>
+              <a:t>https://github.com/htcondor/htmap</a:t>
             </a:r>
             <a:endParaRPr lang="en-US" sz="2400" dirty="0">
               <a:latin typeface="Source Sans Pro" panose="020B0503030403020204" pitchFamily="34" charset="0"/>
@@ -5476,7 +5676,7 @@
           <a:p>
             <a:fld id="{65011DE2-3A5B-41D4-A661-103799ABD939}" type="slidenum">
               <a:rPr lang="en-US" smtClean="0"/>
-              <a:t>11</a:t>
+              <a:t>12</a:t>
             </a:fld>
             <a:endParaRPr lang="en-US"/>
           </a:p>
@@ -6006,7 +6206,7 @@
         <p:spPr>
           <a:xfrm>
             <a:off x="609600" y="809644"/>
-            <a:ext cx="10972800" cy="2267093"/>
+            <a:ext cx="10972800" cy="5405526"/>
           </a:xfrm>
           <a:prstGeom prst="rect">
             <a:avLst/>
@@ -6067,7 +6267,7 @@
         </p:nvSpPr>
         <p:spPr>
           <a:xfrm>
-            <a:off x="5190894" y="1538368"/>
+            <a:off x="4581740" y="2879006"/>
             <a:ext cx="1810211" cy="858981"/>
           </a:xfrm>
           <a:prstGeom prst="snip2DiagRect">
@@ -6124,7 +6324,7 @@
         </p:nvSpPr>
         <p:spPr>
           <a:xfrm>
-            <a:off x="8401480" y="867559"/>
+            <a:off x="8401480" y="2673497"/>
             <a:ext cx="3093548" cy="1270000"/>
           </a:xfrm>
           <a:prstGeom prst="flowChartDecision">
@@ -6153,7 +6353,7 @@
           <a:p>
             <a:pPr algn="ctr"/>
             <a:r>
-              <a:rPr lang="en-US" sz="2800" b="1" dirty="0">
+              <a:rPr lang="en-US" sz="2400" b="1" dirty="0">
                 <a:latin typeface="Source Sans Pro" panose="020B0503030403020204" pitchFamily="34" charset="0"/>
               </a:rPr>
               <a:t>Outputs</a:t>
@@ -6175,7 +6375,7 @@
         </p:nvSpPr>
         <p:spPr>
           <a:xfrm>
-            <a:off x="762000" y="1934723"/>
+            <a:off x="762000" y="2817430"/>
             <a:ext cx="1810211" cy="982134"/>
           </a:xfrm>
           <a:prstGeom prst="flowChartManualOperation">
@@ -6229,9 +6429,9 @@
           <p:nvPr/>
         </p:nvCxnSpPr>
         <p:spPr>
-          <a:xfrm flipV="1">
-            <a:off x="2391190" y="1967859"/>
-            <a:ext cx="2799704" cy="457931"/>
+          <a:xfrm>
+            <a:off x="2391190" y="3308497"/>
+            <a:ext cx="2190550" cy="12700"/>
           </a:xfrm>
           <a:prstGeom prst="curvedConnector3">
             <a:avLst>
@@ -6274,9 +6474,9 @@
           <p:nvPr/>
         </p:nvCxnSpPr>
         <p:spPr>
-          <a:xfrm flipV="1">
-            <a:off x="7001105" y="1502559"/>
-            <a:ext cx="1400375" cy="465300"/>
+          <a:xfrm>
+            <a:off x="6391951" y="3308497"/>
+            <a:ext cx="2009529" cy="12700"/>
           </a:xfrm>
           <a:prstGeom prst="curvedConnector3">
             <a:avLst>
@@ -6433,6 +6633,812 @@
         <p:spPr>
           <a:xfrm>
             <a:off x="609600" y="809644"/>
+            <a:ext cx="10972800" cy="5405526"/>
+          </a:xfrm>
+          <a:prstGeom prst="rect">
+            <a:avLst/>
+          </a:prstGeom>
+          <a:solidFill>
+            <a:srgbClr val="1B9E77">
+              <a:alpha val="90000"/>
+            </a:srgbClr>
+          </a:solidFill>
+          <a:ln>
+            <a:noFill/>
+          </a:ln>
+        </p:spPr>
+        <p:style>
+          <a:lnRef idx="2">
+            <a:schemeClr val="accent1">
+              <a:shade val="50000"/>
+            </a:schemeClr>
+          </a:lnRef>
+          <a:fillRef idx="1">
+            <a:schemeClr val="accent1"/>
+          </a:fillRef>
+          <a:effectRef idx="0">
+            <a:schemeClr val="accent1"/>
+          </a:effectRef>
+          <a:fontRef idx="minor">
+            <a:schemeClr val="lt1"/>
+          </a:fontRef>
+        </p:style>
+        <p:txBody>
+          <a:bodyPr rtlCol="0" anchor="t"/>
+          <a:lstStyle/>
+          <a:p>
+            <a:pPr algn="ctr"/>
+            <a:r>
+              <a:rPr lang="en-US" sz="3600" b="1" dirty="0">
+                <a:solidFill>
+                  <a:schemeClr val="bg1"/>
+                </a:solidFill>
+                <a:latin typeface="Source Sans Pro" panose="020B0503030403020204" pitchFamily="34" charset="0"/>
+              </a:rPr>
+              <a:t>Python</a:t>
+            </a:r>
+          </a:p>
+        </p:txBody>
+      </p:sp>
+      <p:sp>
+        <p:nvSpPr>
+          <p:cNvPr id="13" name="Rectangle: Diagonal Corners Snipped 12">
+            <a:extLst>
+              <a:ext uri="{FF2B5EF4-FFF2-40B4-BE49-F238E27FC236}">
+                <a16:creationId xmlns:a16="http://schemas.microsoft.com/office/drawing/2014/main" id="{9C2CD00A-7E63-42FA-B1A7-6733F170EDD2}"/>
+              </a:ext>
+            </a:extLst>
+          </p:cNvPr>
+          <p:cNvSpPr/>
+          <p:nvPr/>
+        </p:nvSpPr>
+        <p:spPr>
+          <a:xfrm>
+            <a:off x="3131075" y="1668625"/>
+            <a:ext cx="1810211" cy="858981"/>
+          </a:xfrm>
+          <a:prstGeom prst="snip2DiagRect">
+            <a:avLst>
+              <a:gd name="adj1" fmla="val 0"/>
+              <a:gd name="adj2" fmla="val 40323"/>
+            </a:avLst>
+          </a:prstGeom>
+        </p:spPr>
+        <p:style>
+          <a:lnRef idx="2">
+            <a:schemeClr val="accent1">
+              <a:shade val="50000"/>
+            </a:schemeClr>
+          </a:lnRef>
+          <a:fillRef idx="1">
+            <a:schemeClr val="accent1"/>
+          </a:fillRef>
+          <a:effectRef idx="0">
+            <a:schemeClr val="accent1"/>
+          </a:effectRef>
+          <a:fontRef idx="minor">
+            <a:schemeClr val="lt1"/>
+          </a:fontRef>
+        </p:style>
+        <p:txBody>
+          <a:bodyPr rtlCol="0" anchor="ctr"/>
+          <a:lstStyle/>
+          <a:p>
+            <a:pPr algn="ctr"/>
+            <a:r>
+              <a:rPr lang="en-US" sz="2400" b="1" dirty="0">
+                <a:latin typeface="Source Sans Pro" panose="020B0503030403020204" pitchFamily="34" charset="0"/>
+              </a:rPr>
+              <a:t>Function</a:t>
+            </a:r>
+            <a:endParaRPr lang="en-US" b="1" dirty="0">
+              <a:latin typeface="Source Sans Pro" panose="020B0503030403020204" pitchFamily="34" charset="0"/>
+            </a:endParaRPr>
+          </a:p>
+        </p:txBody>
+      </p:sp>
+      <p:sp>
+        <p:nvSpPr>
+          <p:cNvPr id="16" name="Flowchart: Decision 15">
+            <a:extLst>
+              <a:ext uri="{FF2B5EF4-FFF2-40B4-BE49-F238E27FC236}">
+                <a16:creationId xmlns:a16="http://schemas.microsoft.com/office/drawing/2014/main" id="{1F99FB29-0796-4F0E-AED8-F4DB677BF363}"/>
+              </a:ext>
+            </a:extLst>
+          </p:cNvPr>
+          <p:cNvSpPr/>
+          <p:nvPr/>
+        </p:nvSpPr>
+        <p:spPr>
+          <a:xfrm>
+            <a:off x="8401480" y="2673497"/>
+            <a:ext cx="3093548" cy="1270000"/>
+          </a:xfrm>
+          <a:prstGeom prst="flowChartDecision">
+            <a:avLst/>
+          </a:prstGeom>
+        </p:spPr>
+        <p:style>
+          <a:lnRef idx="2">
+            <a:schemeClr val="accent1">
+              <a:shade val="50000"/>
+            </a:schemeClr>
+          </a:lnRef>
+          <a:fillRef idx="1">
+            <a:schemeClr val="accent1"/>
+          </a:fillRef>
+          <a:effectRef idx="0">
+            <a:schemeClr val="accent1"/>
+          </a:effectRef>
+          <a:fontRef idx="minor">
+            <a:schemeClr val="lt1"/>
+          </a:fontRef>
+        </p:style>
+        <p:txBody>
+          <a:bodyPr rtlCol="0" anchor="ctr"/>
+          <a:lstStyle/>
+          <a:p>
+            <a:pPr algn="ctr"/>
+            <a:r>
+              <a:rPr lang="en-US" sz="2400" b="1" dirty="0">
+                <a:latin typeface="Source Sans Pro" panose="020B0503030403020204" pitchFamily="34" charset="0"/>
+              </a:rPr>
+              <a:t>Outputs</a:t>
+            </a:r>
+          </a:p>
+        </p:txBody>
+      </p:sp>
+      <p:sp>
+        <p:nvSpPr>
+          <p:cNvPr id="18" name="Flowchart: Manual Operation 17">
+            <a:extLst>
+              <a:ext uri="{FF2B5EF4-FFF2-40B4-BE49-F238E27FC236}">
+                <a16:creationId xmlns:a16="http://schemas.microsoft.com/office/drawing/2014/main" id="{DCA26AFB-D063-4DE9-AEE9-3E7279AB8FF1}"/>
+              </a:ext>
+            </a:extLst>
+          </p:cNvPr>
+          <p:cNvSpPr/>
+          <p:nvPr/>
+        </p:nvSpPr>
+        <p:spPr>
+          <a:xfrm>
+            <a:off x="762000" y="2817430"/>
+            <a:ext cx="1810211" cy="982134"/>
+          </a:xfrm>
+          <a:prstGeom prst="flowChartManualOperation">
+            <a:avLst/>
+          </a:prstGeom>
+        </p:spPr>
+        <p:style>
+          <a:lnRef idx="2">
+            <a:schemeClr val="accent1">
+              <a:shade val="50000"/>
+            </a:schemeClr>
+          </a:lnRef>
+          <a:fillRef idx="1">
+            <a:schemeClr val="accent1"/>
+          </a:fillRef>
+          <a:effectRef idx="0">
+            <a:schemeClr val="accent1"/>
+          </a:effectRef>
+          <a:fontRef idx="minor">
+            <a:schemeClr val="lt1"/>
+          </a:fontRef>
+        </p:style>
+        <p:txBody>
+          <a:bodyPr rtlCol="0" anchor="ctr"/>
+          <a:lstStyle/>
+          <a:p>
+            <a:pPr algn="ctr"/>
+            <a:r>
+              <a:rPr lang="en-US" sz="2400" b="1" dirty="0">
+                <a:latin typeface="Source Sans Pro" panose="020B0503030403020204" pitchFamily="34" charset="0"/>
+              </a:rPr>
+              <a:t>Inputs</a:t>
+            </a:r>
+          </a:p>
+        </p:txBody>
+      </p:sp>
+      <p:cxnSp>
+        <p:nvCxnSpPr>
+          <p:cNvPr id="20" name="Connector: Curved 19">
+            <a:extLst>
+              <a:ext uri="{FF2B5EF4-FFF2-40B4-BE49-F238E27FC236}">
+                <a16:creationId xmlns:a16="http://schemas.microsoft.com/office/drawing/2014/main" id="{653B61F7-5048-47A5-BEF8-352C402994B2}"/>
+              </a:ext>
+            </a:extLst>
+          </p:cNvPr>
+          <p:cNvCxnSpPr>
+            <a:cxnSpLocks/>
+            <a:stCxn id="18" idx="3"/>
+            <a:endCxn id="14" idx="1"/>
+          </p:cNvCxnSpPr>
+          <p:nvPr/>
+        </p:nvCxnSpPr>
+        <p:spPr>
+          <a:xfrm>
+            <a:off x="2391190" y="3308497"/>
+            <a:ext cx="1151537" cy="602416"/>
+          </a:xfrm>
+          <a:prstGeom prst="curvedConnector3">
+            <a:avLst>
+              <a:gd name="adj1" fmla="val 50000"/>
+            </a:avLst>
+          </a:prstGeom>
+          <a:ln w="88900">
+            <a:tailEnd type="triangle"/>
+          </a:ln>
+        </p:spPr>
+        <p:style>
+          <a:lnRef idx="1">
+            <a:schemeClr val="accent1"/>
+          </a:lnRef>
+          <a:fillRef idx="0">
+            <a:schemeClr val="accent1"/>
+          </a:fillRef>
+          <a:effectRef idx="0">
+            <a:schemeClr val="accent1"/>
+          </a:effectRef>
+          <a:fontRef idx="minor">
+            <a:schemeClr val="tx1"/>
+          </a:fontRef>
+        </p:style>
+      </p:cxnSp>
+      <p:cxnSp>
+        <p:nvCxnSpPr>
+          <p:cNvPr id="22" name="Connector: Curved 21">
+            <a:extLst>
+              <a:ext uri="{FF2B5EF4-FFF2-40B4-BE49-F238E27FC236}">
+                <a16:creationId xmlns:a16="http://schemas.microsoft.com/office/drawing/2014/main" id="{9E98CD5D-F328-4C34-862A-C1E1ED535DFC}"/>
+              </a:ext>
+            </a:extLst>
+          </p:cNvPr>
+          <p:cNvCxnSpPr>
+            <a:cxnSpLocks/>
+            <a:stCxn id="17" idx="3"/>
+            <a:endCxn id="16" idx="1"/>
+          </p:cNvCxnSpPr>
+          <p:nvPr/>
+        </p:nvCxnSpPr>
+        <p:spPr>
+          <a:xfrm flipV="1">
+            <a:off x="7428833" y="3308497"/>
+            <a:ext cx="972647" cy="604958"/>
+          </a:xfrm>
+          <a:prstGeom prst="curvedConnector3">
+            <a:avLst>
+              <a:gd name="adj1" fmla="val 50000"/>
+            </a:avLst>
+          </a:prstGeom>
+          <a:ln w="88900">
+            <a:tailEnd type="triangle"/>
+          </a:ln>
+        </p:spPr>
+        <p:style>
+          <a:lnRef idx="1">
+            <a:schemeClr val="accent1"/>
+          </a:lnRef>
+          <a:fillRef idx="0">
+            <a:schemeClr val="accent1"/>
+          </a:fillRef>
+          <a:effectRef idx="0">
+            <a:schemeClr val="accent1"/>
+          </a:effectRef>
+          <a:fontRef idx="minor">
+            <a:schemeClr val="tx1"/>
+          </a:fontRef>
+        </p:style>
+      </p:cxnSp>
+      <p:sp>
+        <p:nvSpPr>
+          <p:cNvPr id="14" name="Rectangle: Rounded Corners 13">
+            <a:extLst>
+              <a:ext uri="{FF2B5EF4-FFF2-40B4-BE49-F238E27FC236}">
+                <a16:creationId xmlns:a16="http://schemas.microsoft.com/office/drawing/2014/main" id="{E86B52A9-7118-44F5-9F9E-A48997AC88AF}"/>
+              </a:ext>
+            </a:extLst>
+          </p:cNvPr>
+          <p:cNvSpPr/>
+          <p:nvPr/>
+        </p:nvSpPr>
+        <p:spPr>
+          <a:xfrm>
+            <a:off x="3542727" y="3275913"/>
+            <a:ext cx="1925627" cy="1270000"/>
+          </a:xfrm>
+          <a:prstGeom prst="roundRect">
+            <a:avLst/>
+          </a:prstGeom>
+        </p:spPr>
+        <p:style>
+          <a:lnRef idx="2">
+            <a:schemeClr val="accent1">
+              <a:shade val="50000"/>
+            </a:schemeClr>
+          </a:lnRef>
+          <a:fillRef idx="1">
+            <a:schemeClr val="accent1"/>
+          </a:fillRef>
+          <a:effectRef idx="0">
+            <a:schemeClr val="accent1"/>
+          </a:effectRef>
+          <a:fontRef idx="minor">
+            <a:schemeClr val="lt1"/>
+          </a:fontRef>
+        </p:style>
+        <p:txBody>
+          <a:bodyPr rtlCol="0" anchor="ctr"/>
+          <a:lstStyle/>
+          <a:p>
+            <a:pPr algn="ctr"/>
+            <a:r>
+              <a:rPr lang="en-US" sz="3200" b="1" dirty="0">
+                <a:latin typeface="Source Sans Pro" panose="020B0503030403020204" pitchFamily="34" charset="0"/>
+              </a:rPr>
+              <a:t>built-in</a:t>
+            </a:r>
+          </a:p>
+          <a:p>
+            <a:pPr algn="ctr"/>
+            <a:r>
+              <a:rPr lang="en-US" sz="3200" b="1" dirty="0">
+                <a:latin typeface="Source Sans Pro" panose="020B0503030403020204" pitchFamily="34" charset="0"/>
+              </a:rPr>
+              <a:t>map</a:t>
+            </a:r>
+            <a:endParaRPr lang="en-US" sz="3200" dirty="0">
+              <a:latin typeface="Source Sans Pro" panose="020B0503030403020204" pitchFamily="34" charset="0"/>
+            </a:endParaRPr>
+          </a:p>
+        </p:txBody>
+      </p:sp>
+      <p:sp>
+        <p:nvSpPr>
+          <p:cNvPr id="17" name="Flowchart: Punched Tape 16">
+            <a:extLst>
+              <a:ext uri="{FF2B5EF4-FFF2-40B4-BE49-F238E27FC236}">
+                <a16:creationId xmlns:a16="http://schemas.microsoft.com/office/drawing/2014/main" id="{F8F70C1E-104A-4FA9-9E9F-B0DF4F203B1C}"/>
+              </a:ext>
+            </a:extLst>
+          </p:cNvPr>
+          <p:cNvSpPr/>
+          <p:nvPr/>
+        </p:nvSpPr>
+        <p:spPr>
+          <a:xfrm>
+            <a:off x="5955631" y="3341955"/>
+            <a:ext cx="1473202" cy="1143000"/>
+          </a:xfrm>
+          <a:prstGeom prst="flowChartPunchedTape">
+            <a:avLst/>
+          </a:prstGeom>
+        </p:spPr>
+        <p:style>
+          <a:lnRef idx="2">
+            <a:schemeClr val="accent1">
+              <a:shade val="50000"/>
+            </a:schemeClr>
+          </a:lnRef>
+          <a:fillRef idx="1">
+            <a:schemeClr val="accent1"/>
+          </a:fillRef>
+          <a:effectRef idx="0">
+            <a:schemeClr val="accent1"/>
+          </a:effectRef>
+          <a:fontRef idx="minor">
+            <a:schemeClr val="lt1"/>
+          </a:fontRef>
+        </p:style>
+        <p:txBody>
+          <a:bodyPr rtlCol="0" anchor="ctr"/>
+          <a:lstStyle/>
+          <a:p>
+            <a:pPr algn="ctr"/>
+            <a:r>
+              <a:rPr lang="en-US" sz="2400" b="1" dirty="0">
+                <a:latin typeface="Source Sans Pro" panose="020B0503030403020204" pitchFamily="34" charset="0"/>
+              </a:rPr>
+              <a:t>Map</a:t>
+            </a:r>
+          </a:p>
+        </p:txBody>
+      </p:sp>
+      <p:cxnSp>
+        <p:nvCxnSpPr>
+          <p:cNvPr id="19" name="Connector: Curved 18">
+            <a:extLst>
+              <a:ext uri="{FF2B5EF4-FFF2-40B4-BE49-F238E27FC236}">
+                <a16:creationId xmlns:a16="http://schemas.microsoft.com/office/drawing/2014/main" id="{8CDBC71A-B1F5-40D3-8C76-8904125CE120}"/>
+              </a:ext>
+            </a:extLst>
+          </p:cNvPr>
+          <p:cNvCxnSpPr>
+            <a:cxnSpLocks/>
+            <a:stCxn id="13" idx="1"/>
+            <a:endCxn id="14" idx="0"/>
+          </p:cNvCxnSpPr>
+          <p:nvPr/>
+        </p:nvCxnSpPr>
+        <p:spPr>
+          <a:xfrm rot="16200000" flipH="1">
+            <a:off x="3896708" y="2667079"/>
+            <a:ext cx="748307" cy="469360"/>
+          </a:xfrm>
+          <a:prstGeom prst="curvedConnector3">
+            <a:avLst>
+              <a:gd name="adj1" fmla="val 50000"/>
+            </a:avLst>
+          </a:prstGeom>
+          <a:ln w="88900">
+            <a:tailEnd type="triangle"/>
+          </a:ln>
+        </p:spPr>
+        <p:style>
+          <a:lnRef idx="1">
+            <a:schemeClr val="accent1"/>
+          </a:lnRef>
+          <a:fillRef idx="0">
+            <a:schemeClr val="accent1"/>
+          </a:fillRef>
+          <a:effectRef idx="0">
+            <a:schemeClr val="accent1"/>
+          </a:effectRef>
+          <a:fontRef idx="minor">
+            <a:schemeClr val="tx1"/>
+          </a:fontRef>
+        </p:style>
+      </p:cxnSp>
+      <p:cxnSp>
+        <p:nvCxnSpPr>
+          <p:cNvPr id="21" name="Connector: Curved 20">
+            <a:extLst>
+              <a:ext uri="{FF2B5EF4-FFF2-40B4-BE49-F238E27FC236}">
+                <a16:creationId xmlns:a16="http://schemas.microsoft.com/office/drawing/2014/main" id="{4DC3DB99-FD84-465B-BF86-0FA0F2CA8B63}"/>
+              </a:ext>
+            </a:extLst>
+          </p:cNvPr>
+          <p:cNvCxnSpPr>
+            <a:cxnSpLocks/>
+            <a:stCxn id="14" idx="3"/>
+            <a:endCxn id="17" idx="1"/>
+          </p:cNvCxnSpPr>
+          <p:nvPr/>
+        </p:nvCxnSpPr>
+        <p:spPr>
+          <a:xfrm>
+            <a:off x="5468354" y="3910913"/>
+            <a:ext cx="487277" cy="2542"/>
+          </a:xfrm>
+          <a:prstGeom prst="curvedConnector3">
+            <a:avLst>
+              <a:gd name="adj1" fmla="val 50000"/>
+            </a:avLst>
+          </a:prstGeom>
+          <a:ln w="88900">
+            <a:tailEnd type="triangle"/>
+          </a:ln>
+        </p:spPr>
+        <p:style>
+          <a:lnRef idx="1">
+            <a:schemeClr val="accent1"/>
+          </a:lnRef>
+          <a:fillRef idx="0">
+            <a:schemeClr val="accent1"/>
+          </a:fillRef>
+          <a:effectRef idx="0">
+            <a:schemeClr val="accent1"/>
+          </a:effectRef>
+          <a:fontRef idx="minor">
+            <a:schemeClr val="tx1"/>
+          </a:fontRef>
+        </p:style>
+      </p:cxnSp>
+    </p:spTree>
+    <p:extLst>
+      <p:ext uri="{BB962C8B-B14F-4D97-AF65-F5344CB8AC3E}">
+        <p14:creationId xmlns:p14="http://schemas.microsoft.com/office/powerpoint/2010/main" val="435185354"/>
+      </p:ext>
+    </p:extLst>
+  </p:cSld>
+  <p:clrMapOvr>
+    <a:masterClrMapping/>
+  </p:clrMapOvr>
+  <p:timing>
+    <p:tnLst>
+      <p:par>
+        <p:cTn id="1" dur="indefinite" restart="never" nodeType="tmRoot">
+          <p:childTnLst>
+            <p:seq concurrent="1" nextAc="seek">
+              <p:cTn id="2" dur="indefinite" nodeType="mainSeq">
+                <p:childTnLst>
+                  <p:par>
+                    <p:cTn id="3" fill="hold">
+                      <p:stCondLst>
+                        <p:cond delay="indefinite"/>
+                      </p:stCondLst>
+                      <p:childTnLst>
+                        <p:par>
+                          <p:cTn id="4" fill="hold">
+                            <p:stCondLst>
+                              <p:cond delay="0"/>
+                            </p:stCondLst>
+                            <p:childTnLst>
+                              <p:par>
+                                <p:cTn id="5" presetID="10" presetClass="entr" presetSubtype="0" fill="hold" grpId="0" nodeType="clickEffect">
+                                  <p:stCondLst>
+                                    <p:cond delay="0"/>
+                                  </p:stCondLst>
+                                  <p:childTnLst>
+                                    <p:set>
+                                      <p:cBhvr>
+                                        <p:cTn id="6" dur="1" fill="hold">
+                                          <p:stCondLst>
+                                            <p:cond delay="0"/>
+                                          </p:stCondLst>
+                                        </p:cTn>
+                                        <p:tgtEl>
+                                          <p:spTgt spid="17"/>
+                                        </p:tgtEl>
+                                        <p:attrNameLst>
+                                          <p:attrName>style.visibility</p:attrName>
+                                        </p:attrNameLst>
+                                      </p:cBhvr>
+                                      <p:to>
+                                        <p:strVal val="visible"/>
+                                      </p:to>
+                                    </p:set>
+                                    <p:animEffect transition="in" filter="fade">
+                                      <p:cBhvr>
+                                        <p:cTn id="7" dur="500"/>
+                                        <p:tgtEl>
+                                          <p:spTgt spid="17"/>
+                                        </p:tgtEl>
+                                      </p:cBhvr>
+                                    </p:animEffect>
+                                  </p:childTnLst>
+                                </p:cTn>
+                              </p:par>
+                            </p:childTnLst>
+                          </p:cTn>
+                        </p:par>
+                      </p:childTnLst>
+                    </p:cTn>
+                  </p:par>
+                  <p:par>
+                    <p:cTn id="8" fill="hold">
+                      <p:stCondLst>
+                        <p:cond delay="indefinite"/>
+                      </p:stCondLst>
+                      <p:childTnLst>
+                        <p:par>
+                          <p:cTn id="9" fill="hold">
+                            <p:stCondLst>
+                              <p:cond delay="0"/>
+                            </p:stCondLst>
+                            <p:childTnLst>
+                              <p:par>
+                                <p:cTn id="10" presetID="10" presetClass="entr" presetSubtype="0" fill="hold" nodeType="clickEffect">
+                                  <p:stCondLst>
+                                    <p:cond delay="0"/>
+                                  </p:stCondLst>
+                                  <p:childTnLst>
+                                    <p:set>
+                                      <p:cBhvr>
+                                        <p:cTn id="11" dur="1" fill="hold">
+                                          <p:stCondLst>
+                                            <p:cond delay="0"/>
+                                          </p:stCondLst>
+                                        </p:cTn>
+                                        <p:tgtEl>
+                                          <p:spTgt spid="22"/>
+                                        </p:tgtEl>
+                                        <p:attrNameLst>
+                                          <p:attrName>style.visibility</p:attrName>
+                                        </p:attrNameLst>
+                                      </p:cBhvr>
+                                      <p:to>
+                                        <p:strVal val="visible"/>
+                                      </p:to>
+                                    </p:set>
+                                    <p:animEffect transition="in" filter="fade">
+                                      <p:cBhvr>
+                                        <p:cTn id="12" dur="500"/>
+                                        <p:tgtEl>
+                                          <p:spTgt spid="22"/>
+                                        </p:tgtEl>
+                                      </p:cBhvr>
+                                    </p:animEffect>
+                                  </p:childTnLst>
+                                </p:cTn>
+                              </p:par>
+                              <p:par>
+                                <p:cTn id="13" presetID="10" presetClass="entr" presetSubtype="0" fill="hold" grpId="0" nodeType="withEffect">
+                                  <p:stCondLst>
+                                    <p:cond delay="0"/>
+                                  </p:stCondLst>
+                                  <p:childTnLst>
+                                    <p:set>
+                                      <p:cBhvr>
+                                        <p:cTn id="14" dur="1" fill="hold">
+                                          <p:stCondLst>
+                                            <p:cond delay="0"/>
+                                          </p:stCondLst>
+                                        </p:cTn>
+                                        <p:tgtEl>
+                                          <p:spTgt spid="16"/>
+                                        </p:tgtEl>
+                                        <p:attrNameLst>
+                                          <p:attrName>style.visibility</p:attrName>
+                                        </p:attrNameLst>
+                                      </p:cBhvr>
+                                      <p:to>
+                                        <p:strVal val="visible"/>
+                                      </p:to>
+                                    </p:set>
+                                    <p:animEffect transition="in" filter="fade">
+                                      <p:cBhvr>
+                                        <p:cTn id="15" dur="500"/>
+                                        <p:tgtEl>
+                                          <p:spTgt spid="16"/>
+                                        </p:tgtEl>
+                                      </p:cBhvr>
+                                    </p:animEffect>
+                                  </p:childTnLst>
+                                </p:cTn>
+                              </p:par>
+                            </p:childTnLst>
+                          </p:cTn>
+                        </p:par>
+                      </p:childTnLst>
+                    </p:cTn>
+                  </p:par>
+                </p:childTnLst>
+              </p:cTn>
+              <p:prevCondLst>
+                <p:cond evt="onPrev" delay="0">
+                  <p:tgtEl>
+                    <p:sldTgt/>
+                  </p:tgtEl>
+                </p:cond>
+              </p:prevCondLst>
+              <p:nextCondLst>
+                <p:cond evt="onNext" delay="0">
+                  <p:tgtEl>
+                    <p:sldTgt/>
+                  </p:tgtEl>
+                </p:cond>
+              </p:nextCondLst>
+            </p:seq>
+          </p:childTnLst>
+        </p:cTn>
+      </p:par>
+    </p:tnLst>
+    <p:bldLst>
+      <p:bldP spid="16" grpId="0" animBg="1"/>
+      <p:bldP spid="17" grpId="0" animBg="1"/>
+    </p:bldLst>
+  </p:timing>
+</p:sld>
+</file>
+
+<file path=ppt/slides/slide6.xml><?xml version="1.0" encoding="utf-8"?>
+<p:sld xmlns:a="http://schemas.openxmlformats.org/drawingml/2006/main" xmlns:r="http://schemas.openxmlformats.org/officeDocument/2006/relationships" xmlns:p="http://schemas.openxmlformats.org/presentationml/2006/main">
+  <p:cSld>
+    <p:spTree>
+      <p:nvGrpSpPr>
+        <p:cNvPr id="1" name=""/>
+        <p:cNvGrpSpPr/>
+        <p:nvPr/>
+      </p:nvGrpSpPr>
+      <p:grpSpPr>
+        <a:xfrm>
+          <a:off x="0" y="0"/>
+          <a:ext cx="0" cy="0"/>
+          <a:chOff x="0" y="0"/>
+          <a:chExt cx="0" cy="0"/>
+        </a:xfrm>
+      </p:grpSpPr>
+      <p:sp>
+        <p:nvSpPr>
+          <p:cNvPr id="2" name="Title 1">
+            <a:extLst>
+              <a:ext uri="{FF2B5EF4-FFF2-40B4-BE49-F238E27FC236}">
+                <a16:creationId xmlns:a16="http://schemas.microsoft.com/office/drawing/2014/main" id="{D23803D1-28BF-48B0-A3D2-40049EE4728A}"/>
+              </a:ext>
+            </a:extLst>
+          </p:cNvPr>
+          <p:cNvSpPr>
+            <a:spLocks noGrp="1"/>
+          </p:cNvSpPr>
+          <p:nvPr>
+            <p:ph type="title"/>
+          </p:nvPr>
+        </p:nvSpPr>
+        <p:spPr/>
+        <p:txBody>
+          <a:bodyPr/>
+          <a:lstStyle/>
+          <a:p>
+            <a:r>
+              <a:rPr lang="en-US" dirty="0"/>
+              <a:t>What Just Happened?</a:t>
+            </a:r>
+          </a:p>
+        </p:txBody>
+      </p:sp>
+      <p:sp>
+        <p:nvSpPr>
+          <p:cNvPr id="3" name="Footer Placeholder 2">
+            <a:extLst>
+              <a:ext uri="{FF2B5EF4-FFF2-40B4-BE49-F238E27FC236}">
+                <a16:creationId xmlns:a16="http://schemas.microsoft.com/office/drawing/2014/main" id="{FCF3F4C5-3CD6-418F-8421-3A141D6DCE7F}"/>
+              </a:ext>
+            </a:extLst>
+          </p:cNvPr>
+          <p:cNvSpPr>
+            <a:spLocks noGrp="1"/>
+          </p:cNvSpPr>
+          <p:nvPr>
+            <p:ph type="ftr" sz="quarter" idx="10"/>
+          </p:nvPr>
+        </p:nvSpPr>
+        <p:spPr/>
+        <p:txBody>
+          <a:bodyPr/>
+          <a:lstStyle/>
+          <a:p>
+            <a:r>
+              <a:rPr lang="en-US"/>
+              <a:t>HTMap Workshop 2019-9-16</a:t>
+            </a:r>
+            <a:endParaRPr lang="en-US" dirty="0"/>
+          </a:p>
+        </p:txBody>
+      </p:sp>
+      <p:sp>
+        <p:nvSpPr>
+          <p:cNvPr id="4" name="Slide Number Placeholder 3">
+            <a:extLst>
+              <a:ext uri="{FF2B5EF4-FFF2-40B4-BE49-F238E27FC236}">
+                <a16:creationId xmlns:a16="http://schemas.microsoft.com/office/drawing/2014/main" id="{22D5E63F-4EBF-4719-8A3E-1D599CD42D5C}"/>
+              </a:ext>
+            </a:extLst>
+          </p:cNvPr>
+          <p:cNvSpPr>
+            <a:spLocks noGrp="1"/>
+          </p:cNvSpPr>
+          <p:nvPr>
+            <p:ph type="sldNum" sz="quarter" idx="11"/>
+          </p:nvPr>
+        </p:nvSpPr>
+        <p:spPr/>
+        <p:txBody>
+          <a:bodyPr/>
+          <a:lstStyle/>
+          <a:p>
+            <a:fld id="{65011DE2-3A5B-41D4-A661-103799ABD939}" type="slidenum">
+              <a:rPr lang="en-US" smtClean="0"/>
+              <a:t>6</a:t>
+            </a:fld>
+            <a:endParaRPr lang="en-US"/>
+          </a:p>
+        </p:txBody>
+      </p:sp>
+      <p:sp>
+        <p:nvSpPr>
+          <p:cNvPr id="6" name="Rectangle 5">
+            <a:extLst>
+              <a:ext uri="{FF2B5EF4-FFF2-40B4-BE49-F238E27FC236}">
+                <a16:creationId xmlns:a16="http://schemas.microsoft.com/office/drawing/2014/main" id="{15B535FA-2AE8-41B9-99ED-ED4ECDD2A462}"/>
+              </a:ext>
+            </a:extLst>
+          </p:cNvPr>
+          <p:cNvSpPr/>
+          <p:nvPr/>
+        </p:nvSpPr>
+        <p:spPr>
+          <a:xfrm>
+            <a:off x="609600" y="809644"/>
             <a:ext cx="10972800" cy="2267093"/>
           </a:xfrm>
           <a:prstGeom prst="rect">
@@ -6695,17 +7701,19 @@
           <p:cNvCxnSpPr>
             <a:cxnSpLocks/>
             <a:stCxn id="15" idx="0"/>
-            <a:endCxn id="16" idx="1"/>
+            <a:endCxn id="16" idx="2"/>
           </p:cNvCxnSpPr>
           <p:nvPr/>
         </p:nvCxnSpPr>
         <p:spPr>
           <a:xfrm rot="5400000" flipH="1" flipV="1">
-            <a:off x="7948147" y="1769798"/>
-            <a:ext cx="850999" cy="371925"/>
+            <a:off x="9806277" y="2415697"/>
+            <a:ext cx="500874" cy="12700"/>
           </a:xfrm>
-          <a:prstGeom prst="curvedConnector2">
-            <a:avLst/>
+          <a:prstGeom prst="curvedConnector3">
+            <a:avLst>
+              <a:gd name="adj1" fmla="val 50000"/>
+            </a:avLst>
           </a:prstGeom>
           <a:ln w="88900">
             <a:tailEnd type="triangle"/>
@@ -6857,7 +7865,7 @@
         </p:nvSpPr>
         <p:spPr>
           <a:xfrm>
-            <a:off x="7366003" y="2381259"/>
+            <a:off x="9235033" y="2666134"/>
             <a:ext cx="1643361" cy="2230260"/>
           </a:xfrm>
           <a:prstGeom prst="roundRect">
@@ -7197,19 +8205,17 @@
           <p:cNvCxnSpPr>
             <a:cxnSpLocks/>
             <a:stCxn id="11" idx="7"/>
-            <a:endCxn id="15" idx="2"/>
+            <a:endCxn id="15" idx="1"/>
           </p:cNvCxnSpPr>
           <p:nvPr/>
         </p:nvCxnSpPr>
         <p:spPr>
           <a:xfrm rot="5400000" flipH="1" flipV="1">
-            <a:off x="7581912" y="4427992"/>
-            <a:ext cx="422244" cy="789299"/>
+            <a:off x="7690460" y="3489190"/>
+            <a:ext cx="1252499" cy="1836648"/>
           </a:xfrm>
-          <a:prstGeom prst="curvedConnector3">
-            <a:avLst>
-              <a:gd name="adj1" fmla="val 50000"/>
-            </a:avLst>
+          <a:prstGeom prst="curvedConnector2">
+            <a:avLst/>
           </a:prstGeom>
           <a:ln w="88900">
             <a:solidFill>
@@ -7236,7 +8242,7 @@
     </p:spTree>
     <p:extLst>
       <p:ext uri="{BB962C8B-B14F-4D97-AF65-F5344CB8AC3E}">
-        <p14:creationId xmlns:p14="http://schemas.microsoft.com/office/powerpoint/2010/main" val="2463493504"/>
+        <p14:creationId xmlns:p14="http://schemas.microsoft.com/office/powerpoint/2010/main" val="2009337782"/>
       </p:ext>
     </p:extLst>
   </p:cSld>
@@ -7658,208 +8664,6 @@
 </p:sld>
 </file>
 
-<file path=ppt/slides/slide6.xml><?xml version="1.0" encoding="utf-8"?>
-<p:sld xmlns:a="http://schemas.openxmlformats.org/drawingml/2006/main" xmlns:r="http://schemas.openxmlformats.org/officeDocument/2006/relationships" xmlns:p="http://schemas.openxmlformats.org/presentationml/2006/main">
-  <p:cSld>
-    <p:spTree>
-      <p:nvGrpSpPr>
-        <p:cNvPr id="1" name=""/>
-        <p:cNvGrpSpPr/>
-        <p:nvPr/>
-      </p:nvGrpSpPr>
-      <p:grpSpPr>
-        <a:xfrm>
-          <a:off x="0" y="0"/>
-          <a:ext cx="0" cy="0"/>
-          <a:chOff x="0" y="0"/>
-          <a:chExt cx="0" cy="0"/>
-        </a:xfrm>
-      </p:grpSpPr>
-      <p:sp>
-        <p:nvSpPr>
-          <p:cNvPr id="2" name="Title 1">
-            <a:extLst>
-              <a:ext uri="{FF2B5EF4-FFF2-40B4-BE49-F238E27FC236}">
-                <a16:creationId xmlns:a16="http://schemas.microsoft.com/office/drawing/2014/main" id="{B8DCEF56-AC3E-477F-8BF0-5BE3AFC2269F}"/>
-              </a:ext>
-            </a:extLst>
-          </p:cNvPr>
-          <p:cNvSpPr>
-            <a:spLocks noGrp="1"/>
-          </p:cNvSpPr>
-          <p:nvPr>
-            <p:ph type="title"/>
-          </p:nvPr>
-        </p:nvSpPr>
-        <p:spPr/>
-        <p:txBody>
-          <a:bodyPr/>
-          <a:lstStyle/>
-          <a:p>
-            <a:r>
-              <a:rPr lang="en-US" dirty="0"/>
-              <a:t>Why use HTMap?</a:t>
-            </a:r>
-          </a:p>
-        </p:txBody>
-      </p:sp>
-      <p:sp>
-        <p:nvSpPr>
-          <p:cNvPr id="3" name="Footer Placeholder 2">
-            <a:extLst>
-              <a:ext uri="{FF2B5EF4-FFF2-40B4-BE49-F238E27FC236}">
-                <a16:creationId xmlns:a16="http://schemas.microsoft.com/office/drawing/2014/main" id="{F5C6BACE-1F1D-4609-81F1-76BD7CE9C92C}"/>
-              </a:ext>
-            </a:extLst>
-          </p:cNvPr>
-          <p:cNvSpPr>
-            <a:spLocks noGrp="1"/>
-          </p:cNvSpPr>
-          <p:nvPr>
-            <p:ph type="ftr" sz="quarter" idx="10"/>
-          </p:nvPr>
-        </p:nvSpPr>
-        <p:spPr/>
-        <p:txBody>
-          <a:bodyPr/>
-          <a:lstStyle/>
-          <a:p>
-            <a:r>
-              <a:rPr lang="en-US"/>
-              <a:t>HTMap Workshop 2019-9-16</a:t>
-            </a:r>
-            <a:endParaRPr lang="en-US" dirty="0"/>
-          </a:p>
-        </p:txBody>
-      </p:sp>
-      <p:sp>
-        <p:nvSpPr>
-          <p:cNvPr id="4" name="Slide Number Placeholder 3">
-            <a:extLst>
-              <a:ext uri="{FF2B5EF4-FFF2-40B4-BE49-F238E27FC236}">
-                <a16:creationId xmlns:a16="http://schemas.microsoft.com/office/drawing/2014/main" id="{9F0E4118-7A52-4EE2-9C7B-3A570D484D18}"/>
-              </a:ext>
-            </a:extLst>
-          </p:cNvPr>
-          <p:cNvSpPr>
-            <a:spLocks noGrp="1"/>
-          </p:cNvSpPr>
-          <p:nvPr>
-            <p:ph type="sldNum" sz="quarter" idx="11"/>
-          </p:nvPr>
-        </p:nvSpPr>
-        <p:spPr/>
-        <p:txBody>
-          <a:bodyPr/>
-          <a:lstStyle/>
-          <a:p>
-            <a:fld id="{65011DE2-3A5B-41D4-A661-103799ABD939}" type="slidenum">
-              <a:rPr lang="en-US" smtClean="0"/>
-              <a:t>6</a:t>
-            </a:fld>
-            <a:endParaRPr lang="en-US"/>
-          </a:p>
-        </p:txBody>
-      </p:sp>
-      <p:sp>
-        <p:nvSpPr>
-          <p:cNvPr id="5" name="TextBox 4">
-            <a:extLst>
-              <a:ext uri="{FF2B5EF4-FFF2-40B4-BE49-F238E27FC236}">
-                <a16:creationId xmlns:a16="http://schemas.microsoft.com/office/drawing/2014/main" id="{3610684D-AEFD-47DF-B21F-27E8B2515A1E}"/>
-              </a:ext>
-            </a:extLst>
-          </p:cNvPr>
-          <p:cNvSpPr txBox="1"/>
-          <p:nvPr/>
-        </p:nvSpPr>
-        <p:spPr>
-          <a:xfrm>
-            <a:off x="1211274" y="1668763"/>
-            <a:ext cx="9769452" cy="2518510"/>
-          </a:xfrm>
-          <a:prstGeom prst="rect">
-            <a:avLst/>
-          </a:prstGeom>
-          <a:noFill/>
-        </p:spPr>
-        <p:txBody>
-          <a:bodyPr wrap="square" rtlCol="0">
-            <a:spAutoFit/>
-          </a:bodyPr>
-          <a:lstStyle/>
-          <a:p>
-            <a:pPr algn="ctr"/>
-            <a:r>
-              <a:rPr lang="en-US" sz="3600" b="1" dirty="0">
-                <a:latin typeface="Source Sans Pro" panose="020B0503030403020204" pitchFamily="34" charset="0"/>
-              </a:rPr>
-              <a:t>Your Work is Already Python-Based</a:t>
-            </a:r>
-            <a:endParaRPr lang="en-US" sz="2800" b="1" dirty="0">
-              <a:latin typeface="Source Sans Pro" panose="020B0503030403020204" pitchFamily="34" charset="0"/>
-            </a:endParaRPr>
-          </a:p>
-          <a:p>
-            <a:pPr marL="342900" indent="-342900" algn="ctr">
-              <a:lnSpc>
-                <a:spcPct val="150000"/>
-              </a:lnSpc>
-              <a:buFont typeface="Arial" panose="020B0604020202020204" pitchFamily="34" charset="0"/>
-              <a:buChar char="•"/>
-            </a:pPr>
-            <a:r>
-              <a:rPr lang="en-US" sz="2800" dirty="0">
-                <a:latin typeface="Source Sans Pro" panose="020B0503030403020204" pitchFamily="34" charset="0"/>
-              </a:rPr>
-              <a:t>Run any Python function in the pool with minimal setup</a:t>
-            </a:r>
-          </a:p>
-          <a:p>
-            <a:pPr marL="342900" indent="-342900" algn="ctr">
-              <a:lnSpc>
-                <a:spcPct val="150000"/>
-              </a:lnSpc>
-              <a:buFont typeface="Arial" panose="020B0604020202020204" pitchFamily="34" charset="0"/>
-              <a:buChar char="•"/>
-            </a:pPr>
-            <a:r>
-              <a:rPr lang="en-US" sz="2800" dirty="0">
-                <a:latin typeface="Source Sans Pro" panose="020B0503030403020204" pitchFamily="34" charset="0"/>
-              </a:rPr>
-              <a:t>Use Python to seamlessly set up, execute, and process work</a:t>
-            </a:r>
-          </a:p>
-          <a:p>
-            <a:pPr marL="342900" indent="-342900" algn="ctr">
-              <a:lnSpc>
-                <a:spcPct val="150000"/>
-              </a:lnSpc>
-              <a:buFont typeface="Arial" panose="020B0604020202020204" pitchFamily="34" charset="0"/>
-              <a:buChar char="•"/>
-            </a:pPr>
-            <a:r>
-              <a:rPr lang="en-US" sz="2800" dirty="0">
-                <a:latin typeface="Source Sans Pro" panose="020B0503030403020204" pitchFamily="34" charset="0"/>
-              </a:rPr>
-              <a:t>Hide details of HTCondor where not necessary</a:t>
-            </a:r>
-          </a:p>
-        </p:txBody>
-      </p:sp>
-    </p:spTree>
-    <p:extLst>
-      <p:ext uri="{BB962C8B-B14F-4D97-AF65-F5344CB8AC3E}">
-        <p14:creationId xmlns:p14="http://schemas.microsoft.com/office/powerpoint/2010/main" val="2827798998"/>
-      </p:ext>
-    </p:extLst>
-  </p:cSld>
-  <p:clrMapOvr>
-    <a:masterClrMapping/>
-  </p:clrMapOvr>
-</p:sld>
-</file>
-
 <file path=ppt/slides/slide7.xml><?xml version="1.0" encoding="utf-8"?>
 <p:sld xmlns:a="http://schemas.openxmlformats.org/drawingml/2006/main" xmlns:r="http://schemas.openxmlformats.org/officeDocument/2006/relationships" xmlns:p="http://schemas.openxmlformats.org/presentationml/2006/main">
   <p:cSld>
@@ -7977,8 +8781,8 @@
         </p:nvSpPr>
         <p:spPr>
           <a:xfrm>
-            <a:off x="981480" y="1675638"/>
-            <a:ext cx="10229039" cy="1871025"/>
+            <a:off x="1211274" y="1668763"/>
+            <a:ext cx="9769452" cy="2518510"/>
           </a:xfrm>
           <a:prstGeom prst="rect">
             <a:avLst/>
@@ -7996,7 +8800,7 @@
               <a:rPr lang="en-US" sz="3600" b="1" dirty="0">
                 <a:latin typeface="Source Sans Pro" panose="020B0503030403020204" pitchFamily="34" charset="0"/>
               </a:rPr>
-              <a:t>You Want to Wrap and Manage Jobs using Python</a:t>
+              <a:t>Your Work is Already Python-Based</a:t>
             </a:r>
             <a:endParaRPr lang="en-US" sz="2800" b="1" dirty="0">
               <a:latin typeface="Source Sans Pro" panose="020B0503030403020204" pitchFamily="34" charset="0"/>
@@ -8014,7 +8818,7 @@
               <a:rPr lang="en-US" sz="2800" dirty="0">
                 <a:latin typeface="Source Sans Pro" panose="020B0503030403020204" pitchFamily="34" charset="0"/>
               </a:rPr>
-              <a:t>Wrapper "scripts" in Python instead of Bash</a:t>
+              <a:t>Run any Python function in the pool with minimal setup</a:t>
             </a:r>
           </a:p>
           <a:p>
@@ -8029,13 +8833,22 @@
               <a:rPr lang="en-US" sz="2800" dirty="0">
                 <a:latin typeface="Source Sans Pro" panose="020B0503030403020204" pitchFamily="34" charset="0"/>
               </a:rPr>
-              <a:t>Job management in Python instead of </a:t>
-            </a:r>
+              <a:t>Use Python to seamlessly set up, execute, and process work</a:t>
+            </a:r>
+          </a:p>
+          <a:p>
+            <a:pPr marL="342900" indent="-342900" algn="ctr">
+              <a:lnSpc>
+                <a:spcPct val="150000"/>
+              </a:lnSpc>
+              <a:buFont typeface="Arial" panose="020B0604020202020204" pitchFamily="34" charset="0"/>
+              <a:buChar char="•"/>
+            </a:pPr>
             <a:r>
               <a:rPr lang="en-US" sz="2800" dirty="0">
-                <a:latin typeface="Source Code Pro" panose="020B0509030403020204" pitchFamily="49" charset="0"/>
+                <a:latin typeface="Source Sans Pro" panose="020B0503030403020204" pitchFamily="34" charset="0"/>
               </a:rPr>
-              <a:t>condor_*</a:t>
+              <a:t>Hide details of HTCondor where not necessary</a:t>
             </a:r>
           </a:p>
         </p:txBody>
@@ -8043,7 +8856,7 @@
     </p:spTree>
     <p:extLst>
       <p:ext uri="{BB962C8B-B14F-4D97-AF65-F5344CB8AC3E}">
-        <p14:creationId xmlns:p14="http://schemas.microsoft.com/office/powerpoint/2010/main" val="868836676"/>
+        <p14:creationId xmlns:p14="http://schemas.microsoft.com/office/powerpoint/2010/main" val="2827798998"/>
       </p:ext>
     </p:extLst>
   </p:cSld>
@@ -8075,7 +8888,7 @@
           <p:cNvPr id="2" name="Title 1">
             <a:extLst>
               <a:ext uri="{FF2B5EF4-FFF2-40B4-BE49-F238E27FC236}">
-                <a16:creationId xmlns:a16="http://schemas.microsoft.com/office/drawing/2014/main" id="{F09A4240-021F-4DE5-B2A0-051590DE7260}"/>
+                <a16:creationId xmlns:a16="http://schemas.microsoft.com/office/drawing/2014/main" id="{B8DCEF56-AC3E-477F-8BF0-5BE3AFC2269F}"/>
               </a:ext>
             </a:extLst>
           </p:cNvPr>
@@ -8093,7 +8906,7 @@
           <a:p>
             <a:r>
               <a:rPr lang="en-US" dirty="0"/>
-              <a:t>Tutorial Topics</a:t>
+              <a:t>Why use HTMap?</a:t>
             </a:r>
           </a:p>
         </p:txBody>
@@ -8103,7 +8916,7 @@
           <p:cNvPr id="3" name="Footer Placeholder 2">
             <a:extLst>
               <a:ext uri="{FF2B5EF4-FFF2-40B4-BE49-F238E27FC236}">
-                <a16:creationId xmlns:a16="http://schemas.microsoft.com/office/drawing/2014/main" id="{2EDE52F1-1C1C-4458-B3EE-01CDB1113FDD}"/>
+                <a16:creationId xmlns:a16="http://schemas.microsoft.com/office/drawing/2014/main" id="{F5C6BACE-1F1D-4609-81F1-76BD7CE9C92C}"/>
               </a:ext>
             </a:extLst>
           </p:cNvPr>
@@ -8132,7 +8945,7 @@
           <p:cNvPr id="4" name="Slide Number Placeholder 3">
             <a:extLst>
               <a:ext uri="{FF2B5EF4-FFF2-40B4-BE49-F238E27FC236}">
-                <a16:creationId xmlns:a16="http://schemas.microsoft.com/office/drawing/2014/main" id="{1833090F-1C82-443D-A4D5-16490A581F1D}"/>
+                <a16:creationId xmlns:a16="http://schemas.microsoft.com/office/drawing/2014/main" id="{9F0E4118-7A52-4EE2-9C7B-3A570D484D18}"/>
               </a:ext>
             </a:extLst>
           </p:cNvPr>
@@ -8161,7 +8974,7 @@
           <p:cNvPr id="5" name="TextBox 4">
             <a:extLst>
               <a:ext uri="{FF2B5EF4-FFF2-40B4-BE49-F238E27FC236}">
-                <a16:creationId xmlns:a16="http://schemas.microsoft.com/office/drawing/2014/main" id="{C74DFAE3-68E0-432E-85CD-38A0F42DE08A}"/>
+                <a16:creationId xmlns:a16="http://schemas.microsoft.com/office/drawing/2014/main" id="{3610684D-AEFD-47DF-B21F-27E8B2515A1E}"/>
               </a:ext>
             </a:extLst>
           </p:cNvPr>
@@ -8170,8 +8983,8 @@
         </p:nvSpPr>
         <p:spPr>
           <a:xfrm>
-            <a:off x="2057400" y="1223785"/>
-            <a:ext cx="8668466" cy="3709349"/>
+            <a:off x="981480" y="1675638"/>
+            <a:ext cx="10229039" cy="1871025"/>
           </a:xfrm>
           <a:prstGeom prst="rect">
             <a:avLst/>
@@ -8184,78 +8997,51 @@
           </a:bodyPr>
           <a:lstStyle/>
           <a:p>
-            <a:pPr marL="342900" indent="-342900">
+            <a:pPr algn="ctr"/>
+            <a:r>
+              <a:rPr lang="en-US" sz="3600" b="1" dirty="0">
+                <a:latin typeface="Source Sans Pro" panose="020B0503030403020204" pitchFamily="34" charset="0"/>
+              </a:rPr>
+              <a:t>You Want to Wrap and Manage Jobs using Python</a:t>
+            </a:r>
+            <a:endParaRPr lang="en-US" sz="2800" b="1" dirty="0">
+              <a:latin typeface="Source Sans Pro" panose="020B0503030403020204" pitchFamily="34" charset="0"/>
+            </a:endParaRPr>
+          </a:p>
+          <a:p>
+            <a:pPr marL="342900" indent="-342900" algn="ctr">
               <a:lnSpc>
                 <a:spcPct val="150000"/>
               </a:lnSpc>
-              <a:buFont typeface="+mj-lt"/>
-              <a:buAutoNum type="arabicPeriod"/>
+              <a:buFont typeface="Arial" panose="020B0604020202020204" pitchFamily="34" charset="0"/>
+              <a:buChar char="•"/>
             </a:pPr>
             <a:r>
-              <a:rPr lang="en-US" sz="3200" dirty="0">
+              <a:rPr lang="en-US" sz="2800" dirty="0">
                 <a:latin typeface="Source Sans Pro" panose="020B0503030403020204" pitchFamily="34" charset="0"/>
               </a:rPr>
-              <a:t>Basic Map Creation and Management</a:t>
-            </a:r>
-          </a:p>
-          <a:p>
-            <a:pPr marL="342900" indent="-342900">
+              <a:t>Wrapper "scripts" in Python instead of Bash</a:t>
+            </a:r>
+          </a:p>
+          <a:p>
+            <a:pPr marL="342900" indent="-342900" algn="ctr">
               <a:lnSpc>
                 <a:spcPct val="150000"/>
               </a:lnSpc>
-              <a:buFont typeface="+mj-lt"/>
-              <a:buAutoNum type="arabicPeriod"/>
+              <a:buFont typeface="Arial" panose="020B0604020202020204" pitchFamily="34" charset="0"/>
+              <a:buChar char="•"/>
             </a:pPr>
             <a:r>
-              <a:rPr lang="en-US" sz="3200" dirty="0">
+              <a:rPr lang="en-US" sz="2800" dirty="0">
                 <a:latin typeface="Source Sans Pro" panose="020B0503030403020204" pitchFamily="34" charset="0"/>
               </a:rPr>
-              <a:t>Working with Input/Output Files</a:t>
-            </a:r>
-          </a:p>
-          <a:p>
-            <a:pPr marL="342900" indent="-342900">
-              <a:lnSpc>
-                <a:spcPct val="150000"/>
-              </a:lnSpc>
-              <a:buFont typeface="+mj-lt"/>
-              <a:buAutoNum type="arabicPeriod"/>
-            </a:pPr>
-            <a:r>
-              <a:rPr lang="en-US" sz="3200" dirty="0">
-                <a:latin typeface="Source Sans Pro" panose="020B0503030403020204" pitchFamily="34" charset="0"/>
+              <a:t>Job management in Python instead of </a:t>
+            </a:r>
+            <a:r>
+              <a:rPr lang="en-US" sz="2800" dirty="0">
+                <a:latin typeface="Source Code Pro" panose="020B0509030403020204" pitchFamily="49" charset="0"/>
               </a:rPr>
-              <a:t>Map Options (i.e., Submit Descriptors)</a:t>
-            </a:r>
-          </a:p>
-          <a:p>
-            <a:pPr marL="342900" indent="-342900">
-              <a:lnSpc>
-                <a:spcPct val="150000"/>
-              </a:lnSpc>
-              <a:buFont typeface="+mj-lt"/>
-              <a:buAutoNum type="arabicPeriod"/>
-            </a:pPr>
-            <a:r>
-              <a:rPr lang="en-US" sz="3200" dirty="0">
-                <a:latin typeface="Source Sans Pro" panose="020B0503030403020204" pitchFamily="34" charset="0"/>
-              </a:rPr>
-              <a:t>Advanced Map Creation</a:t>
-            </a:r>
-          </a:p>
-          <a:p>
-            <a:pPr marL="342900" indent="-342900">
-              <a:lnSpc>
-                <a:spcPct val="150000"/>
-              </a:lnSpc>
-              <a:buFont typeface="+mj-lt"/>
-              <a:buAutoNum type="arabicPeriod"/>
-            </a:pPr>
-            <a:r>
-              <a:rPr lang="en-US" sz="3200" dirty="0">
-                <a:latin typeface="Source Sans Pro" panose="020B0503030403020204" pitchFamily="34" charset="0"/>
-              </a:rPr>
-              <a:t>Dealing with Errors</a:t>
+              <a:t>condor_*</a:t>
             </a:r>
           </a:p>
         </p:txBody>
@@ -8263,7 +9049,7 @@
     </p:spTree>
     <p:extLst>
       <p:ext uri="{BB962C8B-B14F-4D97-AF65-F5344CB8AC3E}">
-        <p14:creationId xmlns:p14="http://schemas.microsoft.com/office/powerpoint/2010/main" val="1233298242"/>
+        <p14:creationId xmlns:p14="http://schemas.microsoft.com/office/powerpoint/2010/main" val="868836676"/>
       </p:ext>
     </p:extLst>
   </p:cSld>
@@ -8292,18 +9078,18 @@
       </p:grpSpPr>
       <p:sp>
         <p:nvSpPr>
-          <p:cNvPr id="3" name="Footer Placeholder 2">
-            <a:extLst>
-              <a:ext uri="{FF2B5EF4-FFF2-40B4-BE49-F238E27FC236}">
-                <a16:creationId xmlns:a16="http://schemas.microsoft.com/office/drawing/2014/main" id="{68CD3B55-49E1-4F61-B15F-C9FF4087EFE1}"/>
-              </a:ext>
-            </a:extLst>
-          </p:cNvPr>
-          <p:cNvSpPr>
-            <a:spLocks noGrp="1"/>
-          </p:cNvSpPr>
-          <p:nvPr>
-            <p:ph type="ftr" sz="quarter" idx="10"/>
+          <p:cNvPr id="2" name="Title 1">
+            <a:extLst>
+              <a:ext uri="{FF2B5EF4-FFF2-40B4-BE49-F238E27FC236}">
+                <a16:creationId xmlns:a16="http://schemas.microsoft.com/office/drawing/2014/main" id="{F09A4240-021F-4DE5-B2A0-051590DE7260}"/>
+              </a:ext>
+            </a:extLst>
+          </p:cNvPr>
+          <p:cNvSpPr>
+            <a:spLocks noGrp="1"/>
+          </p:cNvSpPr>
+          <p:nvPr>
+            <p:ph type="title"/>
           </p:nvPr>
         </p:nvSpPr>
         <p:spPr/>
@@ -8312,6 +9098,34 @@
           <a:lstStyle/>
           <a:p>
             <a:r>
+              <a:rPr lang="en-US" dirty="0"/>
+              <a:t>Tutorial Topics</a:t>
+            </a:r>
+          </a:p>
+        </p:txBody>
+      </p:sp>
+      <p:sp>
+        <p:nvSpPr>
+          <p:cNvPr id="3" name="Footer Placeholder 2">
+            <a:extLst>
+              <a:ext uri="{FF2B5EF4-FFF2-40B4-BE49-F238E27FC236}">
+                <a16:creationId xmlns:a16="http://schemas.microsoft.com/office/drawing/2014/main" id="{2EDE52F1-1C1C-4458-B3EE-01CDB1113FDD}"/>
+              </a:ext>
+            </a:extLst>
+          </p:cNvPr>
+          <p:cNvSpPr>
+            <a:spLocks noGrp="1"/>
+          </p:cNvSpPr>
+          <p:nvPr>
+            <p:ph type="ftr" sz="quarter" idx="10"/>
+          </p:nvPr>
+        </p:nvSpPr>
+        <p:spPr/>
+        <p:txBody>
+          <a:bodyPr/>
+          <a:lstStyle/>
+          <a:p>
+            <a:r>
               <a:rPr lang="en-US"/>
               <a:t>HTMap Workshop 2019-9-16</a:t>
             </a:r>
@@ -8324,7 +9138,7 @@
           <p:cNvPr id="4" name="Slide Number Placeholder 3">
             <a:extLst>
               <a:ext uri="{FF2B5EF4-FFF2-40B4-BE49-F238E27FC236}">
-                <a16:creationId xmlns:a16="http://schemas.microsoft.com/office/drawing/2014/main" id="{4908D343-780E-4F9E-BBF7-C030BA74D5FE}"/>
+                <a16:creationId xmlns:a16="http://schemas.microsoft.com/office/drawing/2014/main" id="{1833090F-1C82-443D-A4D5-16490A581F1D}"/>
               </a:ext>
             </a:extLst>
           </p:cNvPr>
@@ -8353,7 +9167,7 @@
           <p:cNvPr id="5" name="TextBox 4">
             <a:extLst>
               <a:ext uri="{FF2B5EF4-FFF2-40B4-BE49-F238E27FC236}">
-                <a16:creationId xmlns:a16="http://schemas.microsoft.com/office/drawing/2014/main" id="{AEF883F7-46DC-48B6-8653-57AA27EBFADD}"/>
+                <a16:creationId xmlns:a16="http://schemas.microsoft.com/office/drawing/2014/main" id="{C74DFAE3-68E0-432E-85CD-38A0F42DE08A}"/>
               </a:ext>
             </a:extLst>
           </p:cNvPr>
@@ -8362,8 +9176,8 @@
         </p:nvSpPr>
         <p:spPr>
           <a:xfrm>
-            <a:off x="1146437" y="812319"/>
-            <a:ext cx="9899125" cy="4271682"/>
+            <a:off x="2057400" y="1223785"/>
+            <a:ext cx="8668466" cy="2230611"/>
           </a:xfrm>
           <a:prstGeom prst="rect">
             <a:avLst/>
@@ -8376,84 +9190,48 @@
           </a:bodyPr>
           <a:lstStyle/>
           <a:p>
-            <a:pPr algn="ctr"/>
-            <a:r>
-              <a:rPr lang="en-US" sz="8000" b="1" dirty="0">
-                <a:latin typeface="Source Sans Pro" panose="020B0503030403020204" pitchFamily="34" charset="0"/>
-                <a:ea typeface="Source Sans Pro" panose="020B0503030403020204" pitchFamily="34" charset="0"/>
-              </a:rPr>
-              <a:t>Break!</a:t>
-            </a:r>
-          </a:p>
-          <a:p>
-            <a:pPr algn="ctr"/>
-            <a:endParaRPr lang="en-US" sz="2800" dirty="0">
-              <a:latin typeface="Source Sans Pro" panose="020B0503030403020204" pitchFamily="34" charset="0"/>
-              <a:ea typeface="Source Sans Pro" panose="020B0503030403020204" pitchFamily="34" charset="0"/>
-            </a:endParaRPr>
-          </a:p>
-          <a:p>
-            <a:pPr marL="285750" indent="-285750">
+            <a:pPr marL="342900" indent="-342900">
               <a:lnSpc>
                 <a:spcPct val="150000"/>
               </a:lnSpc>
-              <a:buFont typeface="Arial" panose="020B0604020202020204" pitchFamily="34" charset="0"/>
-              <a:buChar char="•"/>
+              <a:buFont typeface="+mj-lt"/>
+              <a:buAutoNum type="arabicPeriod"/>
             </a:pPr>
             <a:r>
-              <a:rPr lang="en-US" sz="2800" dirty="0">
-                <a:latin typeface="Source Sans Pro" panose="020B0503030403020204" pitchFamily="34" charset="0"/>
-                <a:ea typeface="Source Sans Pro" panose="020B0503030403020204" pitchFamily="34" charset="0"/>
+              <a:rPr lang="en-US" sz="3200" dirty="0">
+                <a:latin typeface="Source Sans Pro" panose="020B0503030403020204" pitchFamily="34" charset="0"/>
               </a:rPr>
-              <a:t>Get up and stretch your legs</a:t>
-            </a:r>
-          </a:p>
-          <a:p>
-            <a:pPr marL="285750" indent="-285750">
+              <a:t>Map Creation and Management</a:t>
+            </a:r>
+          </a:p>
+          <a:p>
+            <a:pPr marL="342900" indent="-342900">
               <a:lnSpc>
                 <a:spcPct val="150000"/>
               </a:lnSpc>
-              <a:buFont typeface="Arial" panose="020B0604020202020204" pitchFamily="34" charset="0"/>
-              <a:buChar char="•"/>
+              <a:buFont typeface="+mj-lt"/>
+              <a:buAutoNum type="arabicPeriod"/>
             </a:pPr>
             <a:r>
-              <a:rPr lang="en-US" sz="2800" dirty="0">
-                <a:latin typeface="Source Sans Pro" panose="020B0503030403020204" pitchFamily="34" charset="0"/>
-                <a:ea typeface="Source Sans Pro" panose="020B0503030403020204" pitchFamily="34" charset="0"/>
+              <a:rPr lang="en-US" sz="3200" dirty="0">
+                <a:latin typeface="Source Sans Pro" panose="020B0503030403020204" pitchFamily="34" charset="0"/>
               </a:rPr>
-              <a:t>Discuss your current workflows with your table-mates</a:t>
-            </a:r>
-          </a:p>
-          <a:p>
-            <a:pPr marL="285750" indent="-285750">
+              <a:t>Working with Input Files</a:t>
+            </a:r>
+          </a:p>
+          <a:p>
+            <a:pPr marL="342900" indent="-342900">
               <a:lnSpc>
                 <a:spcPct val="150000"/>
               </a:lnSpc>
-              <a:buFont typeface="Arial" panose="020B0604020202020204" pitchFamily="34" charset="0"/>
-              <a:buChar char="•"/>
+              <a:buFont typeface="+mj-lt"/>
+              <a:buAutoNum type="arabicPeriod"/>
             </a:pPr>
             <a:r>
-              <a:rPr lang="en-US" sz="2800" dirty="0">
-                <a:latin typeface="Source Sans Pro" panose="020B0503030403020204" pitchFamily="34" charset="0"/>
-                <a:ea typeface="Source Sans Pro" panose="020B0503030403020204" pitchFamily="34" charset="0"/>
+              <a:rPr lang="en-US" sz="3200" dirty="0">
+                <a:latin typeface="Source Sans Pro" panose="020B0503030403020204" pitchFamily="34" charset="0"/>
               </a:rPr>
-              <a:t>Discuss how HTMap might be useful in current/future work</a:t>
-            </a:r>
-          </a:p>
-          <a:p>
-            <a:pPr marL="285750" indent="-285750">
-              <a:lnSpc>
-                <a:spcPct val="150000"/>
-              </a:lnSpc>
-              <a:buFont typeface="Arial" panose="020B0604020202020204" pitchFamily="34" charset="0"/>
-              <a:buChar char="•"/>
-            </a:pPr>
-            <a:r>
-              <a:rPr lang="en-US" sz="2800" dirty="0">
-                <a:latin typeface="Source Sans Pro" panose="020B0503030403020204" pitchFamily="34" charset="0"/>
-                <a:ea typeface="Source Sans Pro" panose="020B0503030403020204" pitchFamily="34" charset="0"/>
-              </a:rPr>
-              <a:t>Ask me or helpers questions</a:t>
+              <a:t>Dealing with Errors</a:t>
             </a:r>
           </a:p>
         </p:txBody>
@@ -8461,7 +9239,7 @@
     </p:spTree>
     <p:extLst>
       <p:ext uri="{BB962C8B-B14F-4D97-AF65-F5344CB8AC3E}">
-        <p14:creationId xmlns:p14="http://schemas.microsoft.com/office/powerpoint/2010/main" val="1912212947"/>
+        <p14:creationId xmlns:p14="http://schemas.microsoft.com/office/powerpoint/2010/main" val="1233298242"/>
       </p:ext>
     </p:extLst>
   </p:cSld>

</xml_diff>

<commit_message>
add instructions for getting a zip instead
</commit_message>
<xml_diff>
--- a/slides/HTMapWorkshop.pptx
+++ b/slides/HTMapWorkshop.pptx
@@ -6017,7 +6017,7 @@
         <p:spPr>
           <a:xfrm>
             <a:off x="296779" y="1537183"/>
-            <a:ext cx="11598442" cy="1769715"/>
+            <a:ext cx="11598442" cy="4493538"/>
           </a:xfrm>
           <a:prstGeom prst="rect">
             <a:avLst/>
@@ -6058,20 +6058,67 @@
               <a:rPr lang="en-US" sz="2400" dirty="0">
                 <a:latin typeface="Source Code Pro" panose="020B0509030403020204" pitchFamily="49" charset="0"/>
               </a:rPr>
-              <a:t>$ cd </a:t>
-            </a:r>
-            <a:r>
-              <a:rPr lang="en-US" sz="2400" dirty="0" err="1">
+              <a:t>$ cd htmap-workshop-materials</a:t>
+            </a:r>
+          </a:p>
+          <a:p>
+            <a:endParaRPr lang="en-US" sz="2400" dirty="0">
+              <a:latin typeface="Source Code Pro" panose="020B0509030403020204" pitchFamily="49" charset="0"/>
+            </a:endParaRPr>
+          </a:p>
+          <a:p>
+            <a:endParaRPr lang="en-US" sz="2400" dirty="0">
+              <a:latin typeface="Source Code Pro" panose="020B0509030403020204" pitchFamily="49" charset="0"/>
+            </a:endParaRPr>
+          </a:p>
+          <a:p>
+            <a:pPr algn="ctr"/>
+            <a:r>
+              <a:rPr lang="en-US" sz="3600" dirty="0">
+                <a:latin typeface="Source Sans Pro" panose="020B0503030403020204" pitchFamily="34" charset="0"/>
+                <a:ea typeface="Source Sans Pro" panose="020B0503030403020204" pitchFamily="34" charset="0"/>
+              </a:rPr>
+              <a:t>OR</a:t>
+            </a:r>
+          </a:p>
+          <a:p>
+            <a:pPr algn="ctr"/>
+            <a:endParaRPr lang="en-US" sz="2500" dirty="0">
+              <a:latin typeface="Source Code Pro" panose="020B0509030403020204" pitchFamily="49" charset="0"/>
+            </a:endParaRPr>
+          </a:p>
+          <a:p>
+            <a:r>
+              <a:rPr lang="en-US" sz="2000" dirty="0">
                 <a:latin typeface="Source Code Pro" panose="020B0509030403020204" pitchFamily="49" charset="0"/>
               </a:rPr>
-              <a:t>htmap</a:t>
-            </a:r>
+              <a:t>$ </a:t>
+            </a:r>
+            <a:r>
+              <a:rPr lang="en-US" sz="2000" dirty="0" err="1">
+                <a:latin typeface="Source Code Pro" panose="020B0509030403020204" pitchFamily="49" charset="0"/>
+              </a:rPr>
+              <a:t>wget</a:t>
+            </a:r>
+            <a:r>
+              <a:rPr lang="en-US" sz="2000" dirty="0">
+                <a:latin typeface="Source Code Pro" panose="020B0509030403020204" pitchFamily="49" charset="0"/>
+              </a:rPr>
+              <a:t> https://github.com/CHTC/htmap-workshop-materials/archive/master.zip</a:t>
+            </a:r>
+          </a:p>
+          <a:p>
             <a:r>
               <a:rPr lang="en-US" sz="2400" dirty="0">
                 <a:latin typeface="Source Code Pro" panose="020B0509030403020204" pitchFamily="49" charset="0"/>
               </a:rPr>
-              <a:t>-workshop-materials</a:t>
-            </a:r>
+              <a:t>$ cd htmap-workshop-materials-master</a:t>
+            </a:r>
+          </a:p>
+          <a:p>
+            <a:endParaRPr lang="en-US" sz="2400" dirty="0">
+              <a:latin typeface="Source Code Pro" panose="020B0509030403020204" pitchFamily="49" charset="0"/>
+            </a:endParaRPr>
           </a:p>
         </p:txBody>
       </p:sp>

</xml_diff>

<commit_message>
move files around, small tweaks to slides
</commit_message>
<xml_diff>
--- a/slides/HTMapWorkshop.pptx
+++ b/slides/HTMapWorkshop.pptx
@@ -272,7 +272,7 @@
             <a:fld id="{C2190C43-0954-4454-9B3A-7899E18A0806}" type="datetimeFigureOut">
               <a:rPr lang="en-US" smtClean="0"/>
               <a:pPr/>
-              <a:t>9/13/2019</a:t>
+              <a:t>9/14/2019</a:t>
             </a:fld>
             <a:endParaRPr lang="en-US" dirty="0"/>
           </a:p>
@@ -6016,8 +6016,8 @@
         </p:nvSpPr>
         <p:spPr>
           <a:xfrm>
-            <a:off x="296779" y="1537183"/>
-            <a:ext cx="11598442" cy="4493538"/>
+            <a:off x="296779" y="875161"/>
+            <a:ext cx="11598442" cy="5601533"/>
           </a:xfrm>
           <a:prstGeom prst="rect">
             <a:avLst/>
@@ -6032,7 +6032,24 @@
           <a:p>
             <a:pPr algn="ctr"/>
             <a:r>
-              <a:rPr lang="en-US" sz="3600" dirty="0">
+              <a:rPr lang="en-US" sz="3600" b="1" dirty="0">
+                <a:latin typeface="Source Sans Pro" panose="020B0503030403020204" pitchFamily="34" charset="0"/>
+                <a:ea typeface="Source Sans Pro" panose="020B0503030403020204" pitchFamily="34" charset="0"/>
+              </a:rPr>
+              <a:t>Log in to your submit node</a:t>
+            </a:r>
+          </a:p>
+          <a:p>
+            <a:pPr algn="ctr"/>
+            <a:endParaRPr lang="en-US" sz="3600" dirty="0">
+              <a:latin typeface="Source Sans Pro" panose="020B0503030403020204" pitchFamily="34" charset="0"/>
+              <a:ea typeface="Source Sans Pro" panose="020B0503030403020204" pitchFamily="34" charset="0"/>
+            </a:endParaRPr>
+          </a:p>
+          <a:p>
+            <a:pPr algn="ctr"/>
+            <a:r>
+              <a:rPr lang="en-US" sz="3600" b="1" dirty="0">
                 <a:latin typeface="Source Sans Pro" panose="020B0503030403020204" pitchFamily="34" charset="0"/>
                 <a:ea typeface="Source Sans Pro" panose="020B0503030403020204" pitchFamily="34" charset="0"/>
               </a:rPr>
@@ -6067,18 +6084,20 @@
             </a:endParaRPr>
           </a:p>
           <a:p>
-            <a:endParaRPr lang="en-US" sz="2400" dirty="0">
-              <a:latin typeface="Source Code Pro" panose="020B0509030403020204" pitchFamily="49" charset="0"/>
-            </a:endParaRPr>
-          </a:p>
-          <a:p>
             <a:pPr algn="ctr"/>
             <a:r>
-              <a:rPr lang="en-US" sz="3600" dirty="0">
+              <a:rPr lang="en-US" sz="3600" i="1" dirty="0">
                 <a:latin typeface="Source Sans Pro" panose="020B0503030403020204" pitchFamily="34" charset="0"/>
                 <a:ea typeface="Source Sans Pro" panose="020B0503030403020204" pitchFamily="34" charset="0"/>
               </a:rPr>
-              <a:t>OR</a:t>
+              <a:t>Or</a:t>
+            </a:r>
+            <a:r>
+              <a:rPr lang="en-US" sz="3600" dirty="0">
+                <a:latin typeface="Source Sans Pro" panose="020B0503030403020204" pitchFamily="34" charset="0"/>
+                <a:ea typeface="Source Sans Pro" panose="020B0503030403020204" pitchFamily="34" charset="0"/>
+              </a:rPr>
+              <a:t>:</a:t>
             </a:r>
           </a:p>
           <a:p>
@@ -6106,6 +6125,17 @@
               </a:rPr>
               <a:t> https://github.com/CHTC/htmap-workshop-materials/archive/master.zip</a:t>
             </a:r>
+          </a:p>
+          <a:p>
+            <a:r>
+              <a:rPr lang="en-US" sz="2400" dirty="0">
+                <a:latin typeface="Source Code Pro" panose="020B0509030403020204" pitchFamily="49" charset="0"/>
+              </a:rPr>
+              <a:t>$ unzip htmap-workshop-materials-master.zip</a:t>
+            </a:r>
+            <a:endParaRPr lang="en-US" sz="2000" dirty="0">
+              <a:latin typeface="Source Code Pro" panose="020B0509030403020204" pitchFamily="49" charset="0"/>
+            </a:endParaRPr>
           </a:p>
           <a:p>
             <a:r>

</xml_diff>